<commit_message>
Ajuste mapa tema 05
Ajuste mapa tema 05
</commit_message>
<xml_diff>
--- a/fuentes/contenidos/grado06/guion05/MA_06_05_CO_MapaConceptual.pptx
+++ b/fuentes/contenidos/grado06/guion05/MA_06_05_CO_MapaConceptual.pptx
@@ -106,7 +106,7 @@
   </p:defaultTextStyle>
   <p:extLst>
     <p:ext uri="{EFAFB233-063F-42B5-8137-9DF3F51BA10A}">
-      <p15:sldGuideLst xmlns:p15="http://schemas.microsoft.com/office/powerpoint/2012/main" xmlns=""/>
+      <p15:sldGuideLst xmlns="" xmlns:p15="http://schemas.microsoft.com/office/powerpoint/2012/main"/>
     </p:ext>
   </p:extLst>
 </p:presentation>
@@ -244,7 +244,7 @@
             <a:fld id="{C764DE79-268F-4C1A-8933-263129D2AF90}" type="datetimeFigureOut">
               <a:rPr lang="en-US" dirty="0"/>
               <a:pPr/>
-              <a:t>11/13/2015</a:t>
+              <a:t>26/11/15</a:t>
             </a:fld>
             <a:endParaRPr lang="en-US" dirty="0"/>
           </a:p>
@@ -287,7 +287,7 @@
             <a:fld id="{48F63A3B-78C7-47BE-AE5E-E10140E04643}" type="slidenum">
               <a:rPr lang="en-US" dirty="0"/>
               <a:pPr/>
-              <a:t>‹Nº›</a:t>
+              <a:t>‹Nr.›</a:t>
             </a:fld>
             <a:endParaRPr lang="en-US" dirty="0"/>
           </a:p>
@@ -296,7 +296,7 @@
     </p:spTree>
     <p:extLst>
       <p:ext uri="{BB962C8B-B14F-4D97-AF65-F5344CB8AC3E}">
-        <p14:creationId xmlns="" xmlns:p14="http://schemas.microsoft.com/office/powerpoint/2010/main" val="489645164"/>
+        <p14:creationId xmlns:p14="http://schemas.microsoft.com/office/powerpoint/2010/main" val="489645164"/>
       </p:ext>
     </p:extLst>
   </p:cSld>
@@ -416,7 +416,7 @@
             <a:fld id="{C764DE79-268F-4C1A-8933-263129D2AF90}" type="datetimeFigureOut">
               <a:rPr lang="en-US" dirty="0"/>
               <a:pPr/>
-              <a:t>11/13/2015</a:t>
+              <a:t>26/11/15</a:t>
             </a:fld>
             <a:endParaRPr lang="en-US" dirty="0"/>
           </a:p>
@@ -459,7 +459,7 @@
             <a:fld id="{48F63A3B-78C7-47BE-AE5E-E10140E04643}" type="slidenum">
               <a:rPr lang="en-US" dirty="0"/>
               <a:pPr/>
-              <a:t>‹Nº›</a:t>
+              <a:t>‹Nr.›</a:t>
             </a:fld>
             <a:endParaRPr lang="en-US" dirty="0"/>
           </a:p>
@@ -468,7 +468,7 @@
     </p:spTree>
     <p:extLst>
       <p:ext uri="{BB962C8B-B14F-4D97-AF65-F5344CB8AC3E}">
-        <p14:creationId xmlns="" xmlns:p14="http://schemas.microsoft.com/office/powerpoint/2010/main" val="2837344037"/>
+        <p14:creationId xmlns:p14="http://schemas.microsoft.com/office/powerpoint/2010/main" val="2837344037"/>
       </p:ext>
     </p:extLst>
   </p:cSld>
@@ -598,7 +598,7 @@
             <a:fld id="{C764DE79-268F-4C1A-8933-263129D2AF90}" type="datetimeFigureOut">
               <a:rPr lang="en-US" dirty="0"/>
               <a:pPr/>
-              <a:t>11/13/2015</a:t>
+              <a:t>26/11/15</a:t>
             </a:fld>
             <a:endParaRPr lang="en-US" dirty="0"/>
           </a:p>
@@ -641,7 +641,7 @@
             <a:fld id="{48F63A3B-78C7-47BE-AE5E-E10140E04643}" type="slidenum">
               <a:rPr lang="en-US" dirty="0"/>
               <a:pPr/>
-              <a:t>‹Nº›</a:t>
+              <a:t>‹Nr.›</a:t>
             </a:fld>
             <a:endParaRPr lang="en-US" dirty="0"/>
           </a:p>
@@ -650,7 +650,7 @@
     </p:spTree>
     <p:extLst>
       <p:ext uri="{BB962C8B-B14F-4D97-AF65-F5344CB8AC3E}">
-        <p14:creationId xmlns="" xmlns:p14="http://schemas.microsoft.com/office/powerpoint/2010/main" val="83715668"/>
+        <p14:creationId xmlns:p14="http://schemas.microsoft.com/office/powerpoint/2010/main" val="83715668"/>
       </p:ext>
     </p:extLst>
   </p:cSld>
@@ -680,7 +680,7 @@
     </p:spTree>
     <p:extLst>
       <p:ext uri="{BB962C8B-B14F-4D97-AF65-F5344CB8AC3E}">
-        <p14:creationId xmlns="" xmlns:p14="http://schemas.microsoft.com/office/powerpoint/2010/main" val="2000257042"/>
+        <p14:creationId xmlns:p14="http://schemas.microsoft.com/office/powerpoint/2010/main" val="2000257042"/>
       </p:ext>
     </p:extLst>
   </p:cSld>
@@ -690,7 +690,7 @@
   <p:timing>
     <p:tnLst>
       <p:par>
-        <p:cTn id="1" dur="indefinite" restart="never" nodeType="tmRoot"/>
+        <p:cTn xmlns:p14="http://schemas.microsoft.com/office/powerpoint/2010/main" id="1" dur="indefinite" restart="never" nodeType="tmRoot"/>
       </p:par>
     </p:tnLst>
   </p:timing>
@@ -717,7 +717,7 @@
     </p:spTree>
     <p:extLst>
       <p:ext uri="{BB962C8B-B14F-4D97-AF65-F5344CB8AC3E}">
-        <p14:creationId xmlns="" xmlns:p14="http://schemas.microsoft.com/office/powerpoint/2010/main" val="3239374206"/>
+        <p14:creationId xmlns:p14="http://schemas.microsoft.com/office/powerpoint/2010/main" val="3239374206"/>
       </p:ext>
     </p:extLst>
   </p:cSld>
@@ -727,7 +727,7 @@
   <p:timing>
     <p:tnLst>
       <p:par>
-        <p:cTn id="1" dur="indefinite" restart="never" nodeType="tmRoot"/>
+        <p:cTn xmlns:p14="http://schemas.microsoft.com/office/powerpoint/2010/main" id="1" dur="indefinite" restart="never" nodeType="tmRoot"/>
       </p:par>
     </p:tnLst>
   </p:timing>
@@ -754,7 +754,7 @@
     </p:spTree>
     <p:extLst>
       <p:ext uri="{BB962C8B-B14F-4D97-AF65-F5344CB8AC3E}">
-        <p14:creationId xmlns="" xmlns:p14="http://schemas.microsoft.com/office/powerpoint/2010/main" val="307310304"/>
+        <p14:creationId xmlns:p14="http://schemas.microsoft.com/office/powerpoint/2010/main" val="307310304"/>
       </p:ext>
     </p:extLst>
   </p:cSld>
@@ -764,7 +764,7 @@
   <p:timing>
     <p:tnLst>
       <p:par>
-        <p:cTn id="1" dur="indefinite" restart="never" nodeType="tmRoot"/>
+        <p:cTn xmlns:p14="http://schemas.microsoft.com/office/powerpoint/2010/main" id="1" dur="indefinite" restart="never" nodeType="tmRoot"/>
       </p:par>
     </p:tnLst>
   </p:timing>
@@ -791,7 +791,7 @@
     </p:spTree>
     <p:extLst>
       <p:ext uri="{BB962C8B-B14F-4D97-AF65-F5344CB8AC3E}">
-        <p14:creationId xmlns="" xmlns:p14="http://schemas.microsoft.com/office/powerpoint/2010/main" val="3978690955"/>
+        <p14:creationId xmlns:p14="http://schemas.microsoft.com/office/powerpoint/2010/main" val="3978690955"/>
       </p:ext>
     </p:extLst>
   </p:cSld>
@@ -801,7 +801,7 @@
   <p:timing>
     <p:tnLst>
       <p:par>
-        <p:cTn id="1" dur="indefinite" restart="never" nodeType="tmRoot"/>
+        <p:cTn xmlns:p14="http://schemas.microsoft.com/office/powerpoint/2010/main" id="1" dur="indefinite" restart="never" nodeType="tmRoot"/>
       </p:par>
     </p:tnLst>
   </p:timing>
@@ -828,7 +828,7 @@
     </p:spTree>
     <p:extLst>
       <p:ext uri="{BB962C8B-B14F-4D97-AF65-F5344CB8AC3E}">
-        <p14:creationId xmlns="" xmlns:p14="http://schemas.microsoft.com/office/powerpoint/2010/main" val="2351846119"/>
+        <p14:creationId xmlns:p14="http://schemas.microsoft.com/office/powerpoint/2010/main" val="2351846119"/>
       </p:ext>
     </p:extLst>
   </p:cSld>
@@ -838,7 +838,7 @@
   <p:timing>
     <p:tnLst>
       <p:par>
-        <p:cTn id="1" dur="indefinite" restart="never" nodeType="tmRoot"/>
+        <p:cTn xmlns:p14="http://schemas.microsoft.com/office/powerpoint/2010/main" id="1" dur="indefinite" restart="never" nodeType="tmRoot"/>
       </p:par>
     </p:tnLst>
   </p:timing>
@@ -865,7 +865,7 @@
     </p:spTree>
     <p:extLst>
       <p:ext uri="{BB962C8B-B14F-4D97-AF65-F5344CB8AC3E}">
-        <p14:creationId xmlns="" xmlns:p14="http://schemas.microsoft.com/office/powerpoint/2010/main" val="3469546082"/>
+        <p14:creationId xmlns:p14="http://schemas.microsoft.com/office/powerpoint/2010/main" val="3469546082"/>
       </p:ext>
     </p:extLst>
   </p:cSld>
@@ -875,7 +875,7 @@
   <p:timing>
     <p:tnLst>
       <p:par>
-        <p:cTn id="1" dur="indefinite" restart="never" nodeType="tmRoot"/>
+        <p:cTn xmlns:p14="http://schemas.microsoft.com/office/powerpoint/2010/main" id="1" dur="indefinite" restart="never" nodeType="tmRoot"/>
       </p:par>
     </p:tnLst>
   </p:timing>
@@ -902,7 +902,7 @@
     </p:spTree>
     <p:extLst>
       <p:ext uri="{BB962C8B-B14F-4D97-AF65-F5344CB8AC3E}">
-        <p14:creationId xmlns="" xmlns:p14="http://schemas.microsoft.com/office/powerpoint/2010/main" val="1289426299"/>
+        <p14:creationId xmlns:p14="http://schemas.microsoft.com/office/powerpoint/2010/main" val="1289426299"/>
       </p:ext>
     </p:extLst>
   </p:cSld>
@@ -912,7 +912,7 @@
   <p:timing>
     <p:tnLst>
       <p:par>
-        <p:cTn id="1" dur="indefinite" restart="never" nodeType="tmRoot"/>
+        <p:cTn xmlns:p14="http://schemas.microsoft.com/office/powerpoint/2010/main" id="1" dur="indefinite" restart="never" nodeType="tmRoot"/>
       </p:par>
     </p:tnLst>
   </p:timing>
@@ -939,7 +939,7 @@
     </p:spTree>
     <p:extLst>
       <p:ext uri="{BB962C8B-B14F-4D97-AF65-F5344CB8AC3E}">
-        <p14:creationId xmlns="" xmlns:p14="http://schemas.microsoft.com/office/powerpoint/2010/main" val="382388284"/>
+        <p14:creationId xmlns:p14="http://schemas.microsoft.com/office/powerpoint/2010/main" val="382388284"/>
       </p:ext>
     </p:extLst>
   </p:cSld>
@@ -949,7 +949,7 @@
   <p:timing>
     <p:tnLst>
       <p:par>
-        <p:cTn id="1" dur="indefinite" restart="never" nodeType="tmRoot"/>
+        <p:cTn xmlns:p14="http://schemas.microsoft.com/office/powerpoint/2010/main" id="1" dur="indefinite" restart="never" nodeType="tmRoot"/>
       </p:par>
     </p:tnLst>
   </p:timing>
@@ -1066,7 +1066,7 @@
             <a:fld id="{C764DE79-268F-4C1A-8933-263129D2AF90}" type="datetimeFigureOut">
               <a:rPr lang="en-US" dirty="0"/>
               <a:pPr/>
-              <a:t>11/13/2015</a:t>
+              <a:t>26/11/15</a:t>
             </a:fld>
             <a:endParaRPr lang="en-US" dirty="0"/>
           </a:p>
@@ -1109,7 +1109,7 @@
             <a:fld id="{48F63A3B-78C7-47BE-AE5E-E10140E04643}" type="slidenum">
               <a:rPr lang="en-US" dirty="0"/>
               <a:pPr/>
-              <a:t>‹Nº›</a:t>
+              <a:t>‹Nr.›</a:t>
             </a:fld>
             <a:endParaRPr lang="en-US" dirty="0"/>
           </a:p>
@@ -1118,7 +1118,7 @@
     </p:spTree>
     <p:extLst>
       <p:ext uri="{BB962C8B-B14F-4D97-AF65-F5344CB8AC3E}">
-        <p14:creationId xmlns="" xmlns:p14="http://schemas.microsoft.com/office/powerpoint/2010/main" val="2161568360"/>
+        <p14:creationId xmlns:p14="http://schemas.microsoft.com/office/powerpoint/2010/main" val="2161568360"/>
       </p:ext>
     </p:extLst>
   </p:cSld>
@@ -1148,7 +1148,7 @@
     </p:spTree>
     <p:extLst>
       <p:ext uri="{BB962C8B-B14F-4D97-AF65-F5344CB8AC3E}">
-        <p14:creationId xmlns="" xmlns:p14="http://schemas.microsoft.com/office/powerpoint/2010/main" val="1333581381"/>
+        <p14:creationId xmlns:p14="http://schemas.microsoft.com/office/powerpoint/2010/main" val="1333581381"/>
       </p:ext>
     </p:extLst>
   </p:cSld>
@@ -1158,7 +1158,7 @@
   <p:timing>
     <p:tnLst>
       <p:par>
-        <p:cTn id="1" dur="indefinite" restart="never" nodeType="tmRoot"/>
+        <p:cTn xmlns:p14="http://schemas.microsoft.com/office/powerpoint/2010/main" id="1" dur="indefinite" restart="never" nodeType="tmRoot"/>
       </p:par>
     </p:tnLst>
   </p:timing>
@@ -1185,7 +1185,7 @@
     </p:spTree>
     <p:extLst>
       <p:ext uri="{BB962C8B-B14F-4D97-AF65-F5344CB8AC3E}">
-        <p14:creationId xmlns="" xmlns:p14="http://schemas.microsoft.com/office/powerpoint/2010/main" val="1891644360"/>
+        <p14:creationId xmlns:p14="http://schemas.microsoft.com/office/powerpoint/2010/main" val="1891644360"/>
       </p:ext>
     </p:extLst>
   </p:cSld>
@@ -1195,7 +1195,7 @@
   <p:timing>
     <p:tnLst>
       <p:par>
-        <p:cTn id="1" dur="indefinite" restart="never" nodeType="tmRoot"/>
+        <p:cTn xmlns:p14="http://schemas.microsoft.com/office/powerpoint/2010/main" id="1" dur="indefinite" restart="never" nodeType="tmRoot"/>
       </p:par>
     </p:tnLst>
   </p:timing>
@@ -1388,7 +1388,7 @@
             <a:fld id="{C764DE79-268F-4C1A-8933-263129D2AF90}" type="datetimeFigureOut">
               <a:rPr lang="en-US" dirty="0"/>
               <a:pPr/>
-              <a:t>11/13/2015</a:t>
+              <a:t>26/11/15</a:t>
             </a:fld>
             <a:endParaRPr lang="en-US" dirty="0"/>
           </a:p>
@@ -1431,7 +1431,7 @@
             <a:fld id="{48F63A3B-78C7-47BE-AE5E-E10140E04643}" type="slidenum">
               <a:rPr lang="en-US" dirty="0"/>
               <a:pPr/>
-              <a:t>‹Nº›</a:t>
+              <a:t>‹Nr.›</a:t>
             </a:fld>
             <a:endParaRPr lang="en-US" dirty="0"/>
           </a:p>
@@ -1440,7 +1440,7 @@
     </p:spTree>
     <p:extLst>
       <p:ext uri="{BB962C8B-B14F-4D97-AF65-F5344CB8AC3E}">
-        <p14:creationId xmlns="" xmlns:p14="http://schemas.microsoft.com/office/powerpoint/2010/main" val="4277946952"/>
+        <p14:creationId xmlns:p14="http://schemas.microsoft.com/office/powerpoint/2010/main" val="4277946952"/>
       </p:ext>
     </p:extLst>
   </p:cSld>
@@ -1622,7 +1622,7 @@
             <a:fld id="{C764DE79-268F-4C1A-8933-263129D2AF90}" type="datetimeFigureOut">
               <a:rPr lang="en-US" dirty="0"/>
               <a:pPr/>
-              <a:t>11/13/2015</a:t>
+              <a:t>26/11/15</a:t>
             </a:fld>
             <a:endParaRPr lang="en-US" dirty="0"/>
           </a:p>
@@ -1665,7 +1665,7 @@
             <a:fld id="{48F63A3B-78C7-47BE-AE5E-E10140E04643}" type="slidenum">
               <a:rPr lang="en-US" dirty="0"/>
               <a:pPr/>
-              <a:t>‹Nº›</a:t>
+              <a:t>‹Nr.›</a:t>
             </a:fld>
             <a:endParaRPr lang="en-US" dirty="0"/>
           </a:p>
@@ -1674,7 +1674,7 @@
     </p:spTree>
     <p:extLst>
       <p:ext uri="{BB962C8B-B14F-4D97-AF65-F5344CB8AC3E}">
-        <p14:creationId xmlns="" xmlns:p14="http://schemas.microsoft.com/office/powerpoint/2010/main" val="2738790902"/>
+        <p14:creationId xmlns:p14="http://schemas.microsoft.com/office/powerpoint/2010/main" val="2738790902"/>
       </p:ext>
     </p:extLst>
   </p:cSld>
@@ -1991,7 +1991,7 @@
             <a:fld id="{C764DE79-268F-4C1A-8933-263129D2AF90}" type="datetimeFigureOut">
               <a:rPr lang="en-US" dirty="0"/>
               <a:pPr/>
-              <a:t>11/13/2015</a:t>
+              <a:t>26/11/15</a:t>
             </a:fld>
             <a:endParaRPr lang="en-US" dirty="0"/>
           </a:p>
@@ -2034,7 +2034,7 @@
             <a:fld id="{48F63A3B-78C7-47BE-AE5E-E10140E04643}" type="slidenum">
               <a:rPr lang="en-US" dirty="0"/>
               <a:pPr/>
-              <a:t>‹Nº›</a:t>
+              <a:t>‹Nr.›</a:t>
             </a:fld>
             <a:endParaRPr lang="en-US" dirty="0"/>
           </a:p>
@@ -2043,7 +2043,7 @@
     </p:spTree>
     <p:extLst>
       <p:ext uri="{BB962C8B-B14F-4D97-AF65-F5344CB8AC3E}">
-        <p14:creationId xmlns="" xmlns:p14="http://schemas.microsoft.com/office/powerpoint/2010/main" val="3256052139"/>
+        <p14:creationId xmlns:p14="http://schemas.microsoft.com/office/powerpoint/2010/main" val="3256052139"/>
       </p:ext>
     </p:extLst>
   </p:cSld>
@@ -2111,7 +2111,7 @@
             <a:fld id="{C764DE79-268F-4C1A-8933-263129D2AF90}" type="datetimeFigureOut">
               <a:rPr lang="en-US" dirty="0"/>
               <a:pPr/>
-              <a:t>11/13/2015</a:t>
+              <a:t>26/11/15</a:t>
             </a:fld>
             <a:endParaRPr lang="en-US" dirty="0"/>
           </a:p>
@@ -2154,7 +2154,7 @@
             <a:fld id="{48F63A3B-78C7-47BE-AE5E-E10140E04643}" type="slidenum">
               <a:rPr lang="en-US" dirty="0"/>
               <a:pPr/>
-              <a:t>‹Nº›</a:t>
+              <a:t>‹Nr.›</a:t>
             </a:fld>
             <a:endParaRPr lang="en-US" dirty="0"/>
           </a:p>
@@ -2163,7 +2163,7 @@
     </p:spTree>
     <p:extLst>
       <p:ext uri="{BB962C8B-B14F-4D97-AF65-F5344CB8AC3E}">
-        <p14:creationId xmlns="" xmlns:p14="http://schemas.microsoft.com/office/powerpoint/2010/main" val="2351768061"/>
+        <p14:creationId xmlns:p14="http://schemas.microsoft.com/office/powerpoint/2010/main" val="2351768061"/>
       </p:ext>
     </p:extLst>
   </p:cSld>
@@ -2208,7 +2208,7 @@
             <a:fld id="{5001C876-01F7-4317-94B9-1AE222133113}" type="datetimeFigureOut">
               <a:rPr lang="es-ES" smtClean="0"/>
               <a:pPr/>
-              <a:t>13/11/2015</a:t>
+              <a:t>26/11/15</a:t>
             </a:fld>
             <a:endParaRPr lang="es-ES"/>
           </a:p>
@@ -2251,7 +2251,7 @@
             <a:fld id="{58140F73-F5A2-4B82-A2FA-BF1850CF1309}" type="slidenum">
               <a:rPr lang="es-ES" smtClean="0"/>
               <a:pPr/>
-              <a:t>‹Nº›</a:t>
+              <a:t>‹Nr.›</a:t>
             </a:fld>
             <a:endParaRPr lang="es-ES"/>
           </a:p>
@@ -2260,7 +2260,7 @@
     </p:spTree>
     <p:extLst>
       <p:ext uri="{BB962C8B-B14F-4D97-AF65-F5344CB8AC3E}">
-        <p14:creationId xmlns="" xmlns:p14="http://schemas.microsoft.com/office/powerpoint/2010/main" val="3747386585"/>
+        <p14:creationId xmlns:p14="http://schemas.microsoft.com/office/powerpoint/2010/main" val="3747386585"/>
       </p:ext>
     </p:extLst>
   </p:cSld>
@@ -2487,7 +2487,7 @@
             <a:fld id="{C764DE79-268F-4C1A-8933-263129D2AF90}" type="datetimeFigureOut">
               <a:rPr lang="en-US" dirty="0"/>
               <a:pPr/>
-              <a:t>11/13/2015</a:t>
+              <a:t>26/11/15</a:t>
             </a:fld>
             <a:endParaRPr lang="en-US" dirty="0"/>
           </a:p>
@@ -2530,7 +2530,7 @@
             <a:fld id="{48F63A3B-78C7-47BE-AE5E-E10140E04643}" type="slidenum">
               <a:rPr lang="en-US" dirty="0"/>
               <a:pPr/>
-              <a:t>‹Nº›</a:t>
+              <a:t>‹Nr.›</a:t>
             </a:fld>
             <a:endParaRPr lang="en-US" dirty="0"/>
           </a:p>
@@ -2539,7 +2539,7 @@
     </p:spTree>
     <p:extLst>
       <p:ext uri="{BB962C8B-B14F-4D97-AF65-F5344CB8AC3E}">
-        <p14:creationId xmlns="" xmlns:p14="http://schemas.microsoft.com/office/powerpoint/2010/main" val="4278334214"/>
+        <p14:creationId xmlns:p14="http://schemas.microsoft.com/office/powerpoint/2010/main" val="4278334214"/>
       </p:ext>
     </p:extLst>
   </p:cSld>
@@ -2746,7 +2746,7 @@
             <a:fld id="{C764DE79-268F-4C1A-8933-263129D2AF90}" type="datetimeFigureOut">
               <a:rPr lang="en-US" dirty="0"/>
               <a:pPr/>
-              <a:t>11/13/2015</a:t>
+              <a:t>26/11/15</a:t>
             </a:fld>
             <a:endParaRPr lang="en-US" dirty="0"/>
           </a:p>
@@ -2789,7 +2789,7 @@
             <a:fld id="{48F63A3B-78C7-47BE-AE5E-E10140E04643}" type="slidenum">
               <a:rPr lang="en-US" dirty="0"/>
               <a:pPr/>
-              <a:t>‹Nº›</a:t>
+              <a:t>‹Nr.›</a:t>
             </a:fld>
             <a:endParaRPr lang="en-US" dirty="0"/>
           </a:p>
@@ -2798,7 +2798,7 @@
     </p:spTree>
     <p:extLst>
       <p:ext uri="{BB962C8B-B14F-4D97-AF65-F5344CB8AC3E}">
-        <p14:creationId xmlns="" xmlns:p14="http://schemas.microsoft.com/office/powerpoint/2010/main" val="3177704065"/>
+        <p14:creationId xmlns:p14="http://schemas.microsoft.com/office/powerpoint/2010/main" val="3177704065"/>
       </p:ext>
     </p:extLst>
   </p:cSld>
@@ -2961,7 +2961,7 @@
             <a:fld id="{C764DE79-268F-4C1A-8933-263129D2AF90}" type="datetimeFigureOut">
               <a:rPr lang="en-US" dirty="0"/>
               <a:pPr/>
-              <a:t>11/13/2015</a:t>
+              <a:t>26/11/15</a:t>
             </a:fld>
             <a:endParaRPr lang="en-US" dirty="0"/>
           </a:p>
@@ -3040,7 +3040,7 @@
             <a:fld id="{48F63A3B-78C7-47BE-AE5E-E10140E04643}" type="slidenum">
               <a:rPr lang="en-US" dirty="0"/>
               <a:pPr/>
-              <a:t>‹Nº›</a:t>
+              <a:t>‹Nr.›</a:t>
             </a:fld>
             <a:endParaRPr lang="en-US" dirty="0"/>
           </a:p>
@@ -3105,7 +3105,7 @@
           <a:blip r:embed="rId23" cstate="print">
             <a:extLst>
               <a:ext uri="{28A0092B-C50C-407E-A947-70E740481C1C}">
-                <a14:useLocalDpi xmlns="" xmlns:a14="http://schemas.microsoft.com/office/drawing/2010/main" val="0"/>
+                <a14:useLocalDpi xmlns:a14="http://schemas.microsoft.com/office/drawing/2010/main" val="0"/>
               </a:ext>
             </a:extLst>
           </a:blip>
@@ -3126,7 +3126,7 @@
     </p:spTree>
     <p:extLst>
       <p:ext uri="{BB962C8B-B14F-4D97-AF65-F5344CB8AC3E}">
-        <p14:creationId xmlns="" xmlns:p14="http://schemas.microsoft.com/office/powerpoint/2010/main" val="3739264170"/>
+        <p14:creationId xmlns:p14="http://schemas.microsoft.com/office/powerpoint/2010/main" val="3739264170"/>
       </p:ext>
     </p:extLst>
   </p:cSld>
@@ -4166,22 +4166,64 @@
           </a:p>
         </p:txBody>
       </p:sp>
-      <p:sp>
-        <p:nvSpPr>
-          <p:cNvPr id="592" name="Rectángulo 591" descr="Nodo de cuarto nivel&#10;"/>
+      <p:cxnSp>
+        <p:nvCxnSpPr>
+          <p:cNvPr id="593" name="Conector angular 592"/>
+          <p:cNvCxnSpPr>
+            <a:stCxn id="590" idx="2"/>
+            <a:endCxn id="591" idx="0"/>
+          </p:cNvCxnSpPr>
+          <p:nvPr/>
+        </p:nvCxnSpPr>
+        <p:spPr>
+          <a:xfrm rot="5400000">
+            <a:off x="5047531" y="3336074"/>
+            <a:ext cx="249692" cy="918059"/>
+          </a:xfrm>
+          <a:prstGeom prst="bentConnector3">
+            <a:avLst>
+              <a:gd name="adj1" fmla="val 50000"/>
+            </a:avLst>
+          </a:prstGeom>
+          <a:ln w="12700">
+            <a:solidFill>
+              <a:schemeClr val="tx1"/>
+            </a:solidFill>
+          </a:ln>
+        </p:spPr>
+        <p:style>
+          <a:lnRef idx="1">
+            <a:schemeClr val="accent1"/>
+          </a:lnRef>
+          <a:fillRef idx="0">
+            <a:schemeClr val="accent1"/>
+          </a:fillRef>
+          <a:effectRef idx="0">
+            <a:schemeClr val="accent1"/>
+          </a:effectRef>
+          <a:fontRef idx="minor">
+            <a:schemeClr val="tx1"/>
+          </a:fontRef>
+        </p:style>
+      </p:cxnSp>
+      <p:sp>
+        <p:nvSpPr>
+          <p:cNvPr id="594" name="Rectángulo 593" descr="Nodo de segundo nivel"/>
           <p:cNvSpPr/>
           <p:nvPr/>
         </p:nvSpPr>
         <p:spPr>
           <a:xfrm>
-            <a:off x="4292252" y="5139326"/>
-            <a:ext cx="842187" cy="353519"/>
+            <a:off x="5210313" y="2843137"/>
+            <a:ext cx="842187" cy="357473"/>
           </a:xfrm>
           <a:prstGeom prst="rect">
             <a:avLst/>
           </a:prstGeom>
           <a:solidFill>
-            <a:schemeClr val="bg1"/>
+            <a:schemeClr val="bg2">
+              <a:lumMod val="50000"/>
+            </a:schemeClr>
           </a:solidFill>
           <a:ln>
             <a:solidFill>
@@ -4208,100 +4250,6 @@
           <a:lstStyle/>
           <a:p>
             <a:pPr algn="ctr"/>
-            <a:endParaRPr lang="es-ES" sz="900" dirty="0">
-              <a:solidFill>
-                <a:schemeClr val="tx1"/>
-              </a:solidFill>
-              <a:latin typeface="Arial" panose="020B0604020202020204" pitchFamily="34" charset="0"/>
-              <a:cs typeface="Arial" panose="020B0604020202020204" pitchFamily="34" charset="0"/>
-            </a:endParaRPr>
-          </a:p>
-        </p:txBody>
-      </p:sp>
-      <p:cxnSp>
-        <p:nvCxnSpPr>
-          <p:cNvPr id="593" name="Conector angular 592"/>
-          <p:cNvCxnSpPr>
-            <a:stCxn id="590" idx="2"/>
-            <a:endCxn id="591" idx="0"/>
-          </p:cNvCxnSpPr>
-          <p:nvPr/>
-        </p:nvCxnSpPr>
-        <p:spPr>
-          <a:xfrm rot="5400000">
-            <a:off x="5047531" y="3336074"/>
-            <a:ext cx="249692" cy="918059"/>
-          </a:xfrm>
-          <a:prstGeom prst="bentConnector3">
-            <a:avLst>
-              <a:gd name="adj1" fmla="val 50000"/>
-            </a:avLst>
-          </a:prstGeom>
-          <a:ln w="12700">
-            <a:solidFill>
-              <a:schemeClr val="tx1"/>
-            </a:solidFill>
-          </a:ln>
-        </p:spPr>
-        <p:style>
-          <a:lnRef idx="1">
-            <a:schemeClr val="accent1"/>
-          </a:lnRef>
-          <a:fillRef idx="0">
-            <a:schemeClr val="accent1"/>
-          </a:fillRef>
-          <a:effectRef idx="0">
-            <a:schemeClr val="accent1"/>
-          </a:effectRef>
-          <a:fontRef idx="minor">
-            <a:schemeClr val="tx1"/>
-          </a:fontRef>
-        </p:style>
-      </p:cxnSp>
-      <p:sp>
-        <p:nvSpPr>
-          <p:cNvPr id="594" name="Rectángulo 593" descr="Nodo de segundo nivel"/>
-          <p:cNvSpPr/>
-          <p:nvPr/>
-        </p:nvSpPr>
-        <p:spPr>
-          <a:xfrm>
-            <a:off x="5210313" y="2843137"/>
-            <a:ext cx="842187" cy="357473"/>
-          </a:xfrm>
-          <a:prstGeom prst="rect">
-            <a:avLst/>
-          </a:prstGeom>
-          <a:solidFill>
-            <a:schemeClr val="bg2">
-              <a:lumMod val="50000"/>
-            </a:schemeClr>
-          </a:solidFill>
-          <a:ln>
-            <a:solidFill>
-              <a:schemeClr val="tx1"/>
-            </a:solidFill>
-          </a:ln>
-        </p:spPr>
-        <p:style>
-          <a:lnRef idx="2">
-            <a:schemeClr val="accent6"/>
-          </a:lnRef>
-          <a:fillRef idx="1">
-            <a:schemeClr val="lt1"/>
-          </a:fillRef>
-          <a:effectRef idx="0">
-            <a:schemeClr val="accent6"/>
-          </a:effectRef>
-          <a:fontRef idx="minor">
-            <a:schemeClr val="dk1"/>
-          </a:fontRef>
-        </p:style>
-        <p:txBody>
-          <a:bodyPr rtlCol="0" anchor="ctr"/>
-          <a:lstStyle/>
-          <a:p>
-            <a:pPr algn="ctr"/>
             <a:r>
               <a:rPr lang="es-ES" sz="1050" dirty="0">
                 <a:solidFill>
@@ -4372,58 +4320,6 @@
           </a:fontRef>
         </p:style>
       </p:cxnSp>
-      <p:sp>
-        <p:nvSpPr>
-          <p:cNvPr id="596" name="Rectángulo 595" descr="Nodo de cuarto nivel&#10;"/>
-          <p:cNvSpPr/>
-          <p:nvPr/>
-        </p:nvSpPr>
-        <p:spPr>
-          <a:xfrm>
-            <a:off x="5210313" y="5139325"/>
-            <a:ext cx="842187" cy="353519"/>
-          </a:xfrm>
-          <a:prstGeom prst="rect">
-            <a:avLst/>
-          </a:prstGeom>
-          <a:solidFill>
-            <a:schemeClr val="bg1"/>
-          </a:solidFill>
-          <a:ln>
-            <a:solidFill>
-              <a:schemeClr val="tx1"/>
-            </a:solidFill>
-          </a:ln>
-        </p:spPr>
-        <p:style>
-          <a:lnRef idx="2">
-            <a:schemeClr val="accent6"/>
-          </a:lnRef>
-          <a:fillRef idx="1">
-            <a:schemeClr val="lt1"/>
-          </a:fillRef>
-          <a:effectRef idx="0">
-            <a:schemeClr val="accent6"/>
-          </a:effectRef>
-          <a:fontRef idx="minor">
-            <a:schemeClr val="dk1"/>
-          </a:fontRef>
-        </p:style>
-        <p:txBody>
-          <a:bodyPr rtlCol="0" anchor="ctr"/>
-          <a:lstStyle/>
-          <a:p>
-            <a:pPr algn="ctr"/>
-            <a:endParaRPr lang="es-ES" sz="900" dirty="0">
-              <a:solidFill>
-                <a:schemeClr val="tx1"/>
-              </a:solidFill>
-              <a:latin typeface="Arial" panose="020B0604020202020204" pitchFamily="34" charset="0"/>
-              <a:cs typeface="Arial" panose="020B0604020202020204" pitchFamily="34" charset="0"/>
-            </a:endParaRPr>
-          </a:p>
-        </p:txBody>
-      </p:sp>
       <p:cxnSp>
         <p:nvCxnSpPr>
           <p:cNvPr id="597" name="Conector angular 596"/>
@@ -6434,20 +6330,179 @@
       </p:sp>
       <p:sp>
         <p:nvSpPr>
-          <p:cNvPr id="644" name="Rectángulo 643" descr="Nodo de cuarto nivel&#10;"/>
-          <p:cNvSpPr/>
+          <p:cNvPr id="652" name="CuadroTexto 651" descr="Conector entre nodos"/>
+          <p:cNvSpPr txBox="1"/>
           <p:nvPr/>
         </p:nvSpPr>
         <p:spPr>
           <a:xfrm>
-            <a:off x="6160888" y="5123258"/>
-            <a:ext cx="842187" cy="353519"/>
+            <a:off x="5072819" y="4665014"/>
+            <a:ext cx="1117174" cy="230832"/>
           </a:xfrm>
           <a:prstGeom prst="rect">
             <a:avLst/>
           </a:prstGeom>
+          <a:noFill/>
+        </p:spPr>
+        <p:txBody>
+          <a:bodyPr wrap="square" rtlCol="0">
+            <a:spAutoFit/>
+          </a:bodyPr>
+          <a:lstStyle/>
+          <a:p>
+            <a:pPr algn="ctr"/>
+            <a:r>
+              <a:rPr lang="es-ES" sz="900" dirty="0" smtClean="0">
+                <a:latin typeface="Arial" panose="020B0604020202020204" pitchFamily="34" charset="0"/>
+                <a:cs typeface="Arial" panose="020B0604020202020204" pitchFamily="34" charset="0"/>
+              </a:rPr>
+              <a:t>matemáticamente</a:t>
+            </a:r>
+            <a:endParaRPr lang="es-ES" sz="900" dirty="0">
+              <a:latin typeface="Arial" panose="020B0604020202020204" pitchFamily="34" charset="0"/>
+              <a:cs typeface="Arial" panose="020B0604020202020204" pitchFamily="34" charset="0"/>
+            </a:endParaRPr>
+          </a:p>
+        </p:txBody>
+      </p:sp>
+      <p:cxnSp>
+        <p:nvCxnSpPr>
+          <p:cNvPr id="653" name="Conector angular 652"/>
+          <p:cNvCxnSpPr>
+            <a:stCxn id="591" idx="2"/>
+            <a:endCxn id="652" idx="0"/>
+          </p:cNvCxnSpPr>
+          <p:nvPr/>
+        </p:nvCxnSpPr>
+        <p:spPr>
+          <a:xfrm rot="16200000" flipH="1">
+            <a:off x="5073274" y="4106882"/>
+            <a:ext cx="198204" cy="918059"/>
+          </a:xfrm>
+          <a:prstGeom prst="bentConnector3">
+            <a:avLst>
+              <a:gd name="adj1" fmla="val 50000"/>
+            </a:avLst>
+          </a:prstGeom>
+          <a:ln w="12700">
+            <a:solidFill>
+              <a:schemeClr val="tx1"/>
+            </a:solidFill>
+          </a:ln>
+        </p:spPr>
+        <p:style>
+          <a:lnRef idx="1">
+            <a:schemeClr val="accent1"/>
+          </a:lnRef>
+          <a:fillRef idx="0">
+            <a:schemeClr val="accent1"/>
+          </a:fillRef>
+          <a:effectRef idx="0">
+            <a:schemeClr val="accent1"/>
+          </a:effectRef>
+          <a:fontRef idx="minor">
+            <a:schemeClr val="tx1"/>
+          </a:fontRef>
+        </p:style>
+      </p:cxnSp>
+      <p:cxnSp>
+        <p:nvCxnSpPr>
+          <p:cNvPr id="654" name="Conector angular 653"/>
+          <p:cNvCxnSpPr>
+            <a:stCxn id="642" idx="2"/>
+            <a:endCxn id="652" idx="0"/>
+          </p:cNvCxnSpPr>
+          <p:nvPr/>
+        </p:nvCxnSpPr>
+        <p:spPr>
+          <a:xfrm rot="5400000">
+            <a:off x="5532305" y="4565912"/>
+            <a:ext cx="198204" cy="1"/>
+          </a:xfrm>
+          <a:prstGeom prst="bentConnector3">
+            <a:avLst>
+              <a:gd name="adj1" fmla="val 50000"/>
+            </a:avLst>
+          </a:prstGeom>
+          <a:ln w="12700">
+            <a:solidFill>
+              <a:schemeClr val="tx1"/>
+            </a:solidFill>
+          </a:ln>
+        </p:spPr>
+        <p:style>
+          <a:lnRef idx="1">
+            <a:schemeClr val="accent1"/>
+          </a:lnRef>
+          <a:fillRef idx="0">
+            <a:schemeClr val="accent1"/>
+          </a:fillRef>
+          <a:effectRef idx="0">
+            <a:schemeClr val="accent1"/>
+          </a:effectRef>
+          <a:fontRef idx="minor">
+            <a:schemeClr val="tx1"/>
+          </a:fontRef>
+        </p:style>
+      </p:cxnSp>
+      <p:cxnSp>
+        <p:nvCxnSpPr>
+          <p:cNvPr id="655" name="Conector angular 654"/>
+          <p:cNvCxnSpPr>
+            <a:stCxn id="643" idx="2"/>
+            <a:endCxn id="652" idx="0"/>
+          </p:cNvCxnSpPr>
+          <p:nvPr/>
+        </p:nvCxnSpPr>
+        <p:spPr>
+          <a:xfrm rot="5400000">
+            <a:off x="5996477" y="4107041"/>
+            <a:ext cx="192903" cy="923043"/>
+          </a:xfrm>
+          <a:prstGeom prst="bentConnector3">
+            <a:avLst>
+              <a:gd name="adj1" fmla="val 50000"/>
+            </a:avLst>
+          </a:prstGeom>
+          <a:ln w="12700">
+            <a:solidFill>
+              <a:schemeClr val="tx1"/>
+            </a:solidFill>
+          </a:ln>
+        </p:spPr>
+        <p:style>
+          <a:lnRef idx="1">
+            <a:schemeClr val="accent1"/>
+          </a:lnRef>
+          <a:fillRef idx="0">
+            <a:schemeClr val="accent1"/>
+          </a:fillRef>
+          <a:effectRef idx="0">
+            <a:schemeClr val="accent1"/>
+          </a:effectRef>
+          <a:fontRef idx="minor">
+            <a:schemeClr val="tx1"/>
+          </a:fontRef>
+        </p:style>
+      </p:cxnSp>
+      <p:sp>
+        <p:nvSpPr>
+          <p:cNvPr id="664" name="Rectángulo 663" descr="Nodo de segundo nivel"/>
+          <p:cNvSpPr/>
+          <p:nvPr/>
+        </p:nvSpPr>
+        <p:spPr>
+          <a:xfrm>
+            <a:off x="8473757" y="2835584"/>
+            <a:ext cx="1124746" cy="357473"/>
+          </a:xfrm>
+          <a:prstGeom prst="rect">
+            <a:avLst/>
+          </a:prstGeom>
           <a:solidFill>
-            <a:schemeClr val="bg1"/>
+            <a:schemeClr val="bg2">
+              <a:lumMod val="50000"/>
+            </a:schemeClr>
           </a:solidFill>
           <a:ln>
             <a:solidFill>
@@ -6474,9 +6529,19 @@
           <a:lstStyle/>
           <a:p>
             <a:pPr algn="ctr"/>
-            <a:endParaRPr lang="es-ES" sz="900" dirty="0">
+            <a:r>
+              <a:rPr lang="es-ES" sz="1050" dirty="0" smtClean="0">
+                <a:solidFill>
+                  <a:schemeClr val="bg1"/>
+                </a:solidFill>
+                <a:latin typeface="Arial" panose="020B0604020202020204" pitchFamily="34" charset="0"/>
+                <a:cs typeface="Arial" panose="020B0604020202020204" pitchFamily="34" charset="0"/>
+              </a:rPr>
+              <a:t>tienen igual numerador</a:t>
+            </a:r>
+            <a:endParaRPr lang="es-ES" sz="1050" dirty="0">
               <a:solidFill>
-                <a:schemeClr val="tx1"/>
+                <a:schemeClr val="bg1"/>
               </a:solidFill>
               <a:latin typeface="Arial" panose="020B0604020202020204" pitchFamily="34" charset="0"/>
               <a:cs typeface="Arial" panose="020B0604020202020204" pitchFamily="34" charset="0"/>
@@ -6484,55 +6549,24 @@
           </a:p>
         </p:txBody>
       </p:sp>
-      <p:pic>
-        <p:nvPicPr>
-          <p:cNvPr id="645" name="Imagen 644" descr="https://latex.codecogs.com/gif.latex?%5Cdpi%7B300%7D%20%5Cfn_jvn%20%5Clarge%20%5Ctext%20%7BSi%20%7Da%3Cb%5CRightarrow%20%5Cfrac%7Ba%7D%7Bb%7D%3C1"/>
-          <p:cNvPicPr/>
-          <p:nvPr/>
-        </p:nvPicPr>
-        <p:blipFill>
-          <a:blip r:embed="rId2" cstate="print">
-            <a:extLst>
-              <a:ext uri="{28A0092B-C50C-407E-A947-70E740481C1C}">
-                <a14:useLocalDpi xmlns="" xmlns:a14="http://schemas.microsoft.com/office/drawing/2010/main" val="0"/>
-              </a:ext>
-            </a:extLst>
-          </a:blip>
-          <a:srcRect/>
-          <a:stretch>
-            <a:fillRect/>
-          </a:stretch>
-        </p:blipFill>
-        <p:spPr bwMode="auto">
+      <p:sp>
+        <p:nvSpPr>
+          <p:cNvPr id="665" name="Rectángulo 664" descr="Nodo de segundo nivel"/>
+          <p:cNvSpPr/>
+          <p:nvPr/>
+        </p:nvSpPr>
+        <p:spPr>
           <a:xfrm>
-            <a:off x="4348166" y="5221895"/>
-            <a:ext cx="720000" cy="180000"/>
+            <a:off x="9700749" y="2835583"/>
+            <a:ext cx="1630319" cy="357473"/>
           </a:xfrm>
           <a:prstGeom prst="rect">
             <a:avLst/>
           </a:prstGeom>
-          <a:noFill/>
-          <a:ln>
-            <a:noFill/>
-          </a:ln>
-        </p:spPr>
-      </p:pic>
-      <p:sp>
-        <p:nvSpPr>
-          <p:cNvPr id="646" name="Rectángulo 645" descr="Nodo de cuarto nivel&#10;"/>
-          <p:cNvSpPr/>
-          <p:nvPr/>
-        </p:nvSpPr>
-        <p:spPr>
-          <a:xfrm>
-            <a:off x="4292252" y="5630514"/>
-            <a:ext cx="842187" cy="353519"/>
-          </a:xfrm>
-          <a:prstGeom prst="rect">
-            <a:avLst/>
-          </a:prstGeom>
           <a:solidFill>
-            <a:schemeClr val="bg1"/>
+            <a:schemeClr val="bg2">
+              <a:lumMod val="50000"/>
+            </a:schemeClr>
           </a:solidFill>
           <a:ln>
             <a:solidFill>
@@ -6559,9 +6593,19 @@
           <a:lstStyle/>
           <a:p>
             <a:pPr algn="ctr"/>
-            <a:endParaRPr lang="es-ES" sz="900" dirty="0">
+            <a:r>
+              <a:rPr lang="es-ES" sz="1050" dirty="0" smtClean="0">
+                <a:solidFill>
+                  <a:schemeClr val="bg1"/>
+                </a:solidFill>
+                <a:latin typeface="Arial" panose="020B0604020202020204" pitchFamily="34" charset="0"/>
+                <a:cs typeface="Arial" panose="020B0604020202020204" pitchFamily="34" charset="0"/>
+              </a:rPr>
+              <a:t>tienen numerador y denominador diferentes</a:t>
+            </a:r>
+            <a:endParaRPr lang="es-ES" sz="1050" dirty="0">
               <a:solidFill>
-                <a:schemeClr val="tx1"/>
+                <a:schemeClr val="bg1"/>
               </a:solidFill>
               <a:latin typeface="Arial" panose="020B0604020202020204" pitchFamily="34" charset="0"/>
               <a:cs typeface="Arial" panose="020B0604020202020204" pitchFamily="34" charset="0"/>
@@ -6569,22 +6613,142 @@
           </a:p>
         </p:txBody>
       </p:sp>
-      <p:sp>
-        <p:nvSpPr>
-          <p:cNvPr id="647" name="Rectángulo 646" descr="Nodo de cuarto nivel&#10;"/>
+      <p:cxnSp>
+        <p:nvCxnSpPr>
+          <p:cNvPr id="666" name="Conector angular 665"/>
+          <p:cNvCxnSpPr>
+            <a:stCxn id="602" idx="2"/>
+            <a:endCxn id="664" idx="0"/>
+          </p:cNvCxnSpPr>
+          <p:nvPr/>
+        </p:nvCxnSpPr>
+        <p:spPr>
+          <a:xfrm rot="16200000" flipH="1">
+            <a:off x="8894221" y="2693675"/>
+            <a:ext cx="278740" cy="5077"/>
+          </a:xfrm>
+          <a:prstGeom prst="bentConnector3">
+            <a:avLst>
+              <a:gd name="adj1" fmla="val 50000"/>
+            </a:avLst>
+          </a:prstGeom>
+          <a:ln w="12700">
+            <a:solidFill>
+              <a:schemeClr val="tx1"/>
+            </a:solidFill>
+          </a:ln>
+        </p:spPr>
+        <p:style>
+          <a:lnRef idx="1">
+            <a:schemeClr val="accent1"/>
+          </a:lnRef>
+          <a:fillRef idx="0">
+            <a:schemeClr val="accent1"/>
+          </a:fillRef>
+          <a:effectRef idx="0">
+            <a:schemeClr val="accent1"/>
+          </a:effectRef>
+          <a:fontRef idx="minor">
+            <a:schemeClr val="tx1"/>
+          </a:fontRef>
+        </p:style>
+      </p:cxnSp>
+      <p:cxnSp>
+        <p:nvCxnSpPr>
+          <p:cNvPr id="667" name="Conector angular 666"/>
+          <p:cNvCxnSpPr>
+            <a:stCxn id="602" idx="2"/>
+            <a:endCxn id="665" idx="0"/>
+          </p:cNvCxnSpPr>
+          <p:nvPr/>
+        </p:nvCxnSpPr>
+        <p:spPr>
+          <a:xfrm rot="16200000" flipH="1">
+            <a:off x="9634112" y="1953785"/>
+            <a:ext cx="278739" cy="1484856"/>
+          </a:xfrm>
+          <a:prstGeom prst="bentConnector3">
+            <a:avLst>
+              <a:gd name="adj1" fmla="val 50000"/>
+            </a:avLst>
+          </a:prstGeom>
+          <a:ln w="12700">
+            <a:solidFill>
+              <a:schemeClr val="tx1"/>
+            </a:solidFill>
+          </a:ln>
+        </p:spPr>
+        <p:style>
+          <a:lnRef idx="1">
+            <a:schemeClr val="accent1"/>
+          </a:lnRef>
+          <a:fillRef idx="0">
+            <a:schemeClr val="accent1"/>
+          </a:fillRef>
+          <a:effectRef idx="0">
+            <a:schemeClr val="accent1"/>
+          </a:effectRef>
+          <a:fontRef idx="minor">
+            <a:schemeClr val="tx1"/>
+          </a:fontRef>
+        </p:style>
+      </p:cxnSp>
+      <p:cxnSp>
+        <p:nvCxnSpPr>
+          <p:cNvPr id="668" name="Conector recto 667"/>
+          <p:cNvCxnSpPr>
+            <a:stCxn id="607" idx="0"/>
+            <a:endCxn id="603" idx="2"/>
+          </p:cNvCxnSpPr>
+          <p:nvPr/>
+        </p:nvCxnSpPr>
+        <p:spPr>
+          <a:xfrm flipH="1" flipV="1">
+            <a:off x="7796839" y="3193057"/>
+            <a:ext cx="1158" cy="741099"/>
+          </a:xfrm>
+          <a:prstGeom prst="line">
+            <a:avLst/>
+          </a:prstGeom>
+          <a:ln w="12700">
+            <a:solidFill>
+              <a:schemeClr val="tx1"/>
+            </a:solidFill>
+          </a:ln>
+        </p:spPr>
+        <p:style>
+          <a:lnRef idx="1">
+            <a:schemeClr val="accent1"/>
+          </a:lnRef>
+          <a:fillRef idx="0">
+            <a:schemeClr val="accent1"/>
+          </a:fillRef>
+          <a:effectRef idx="0">
+            <a:schemeClr val="accent1"/>
+          </a:effectRef>
+          <a:fontRef idx="minor">
+            <a:schemeClr val="tx1"/>
+          </a:fontRef>
+        </p:style>
+      </p:cxnSp>
+      <p:sp>
+        <p:nvSpPr>
+          <p:cNvPr id="669" name="Rectángulo 668" descr="Nodo de tercer nivel"/>
           <p:cNvSpPr/>
           <p:nvPr/>
         </p:nvSpPr>
         <p:spPr>
           <a:xfrm>
-            <a:off x="5210313" y="5630514"/>
-            <a:ext cx="842187" cy="353519"/>
+            <a:off x="8474915" y="3922522"/>
+            <a:ext cx="1122431" cy="728973"/>
           </a:xfrm>
           <a:prstGeom prst="rect">
             <a:avLst/>
           </a:prstGeom>
           <a:solidFill>
-            <a:schemeClr val="bg1"/>
+            <a:schemeClr val="bg2">
+              <a:lumMod val="90000"/>
+            </a:schemeClr>
           </a:solidFill>
           <a:ln>
             <a:solidFill>
@@ -6611,6 +6775,26 @@
           <a:lstStyle/>
           <a:p>
             <a:pPr algn="ctr"/>
+            <a:r>
+              <a:rPr lang="es-ES" sz="900" dirty="0">
+                <a:solidFill>
+                  <a:schemeClr val="tx1"/>
+                </a:solidFill>
+                <a:latin typeface="Arial" panose="020B0604020202020204" pitchFamily="34" charset="0"/>
+                <a:cs typeface="Arial" panose="020B0604020202020204" pitchFamily="34" charset="0"/>
+              </a:rPr>
+              <a:t>e</a:t>
+            </a:r>
+            <a:r>
+              <a:rPr lang="es-ES" sz="900" dirty="0" smtClean="0">
+                <a:solidFill>
+                  <a:schemeClr val="tx1"/>
+                </a:solidFill>
+                <a:latin typeface="Arial" panose="020B0604020202020204" pitchFamily="34" charset="0"/>
+                <a:cs typeface="Arial" panose="020B0604020202020204" pitchFamily="34" charset="0"/>
+              </a:rPr>
+              <a:t>s mayor la fracción que tiene menor denominador</a:t>
+            </a:r>
             <a:endParaRPr lang="es-ES" sz="900" dirty="0">
               <a:solidFill>
                 <a:schemeClr val="tx1"/>
@@ -6623,20 +6807,22 @@
       </p:sp>
       <p:sp>
         <p:nvSpPr>
-          <p:cNvPr id="648" name="Rectángulo 647" descr="Nodo de cuarto nivel&#10;"/>
+          <p:cNvPr id="670" name="Rectángulo 669" descr="Nodo de tercer nivel"/>
           <p:cNvSpPr/>
           <p:nvPr/>
         </p:nvSpPr>
         <p:spPr>
           <a:xfrm>
-            <a:off x="6165089" y="5630514"/>
-            <a:ext cx="842187" cy="353519"/>
+            <a:off x="9700749" y="3934156"/>
+            <a:ext cx="1630319" cy="717339"/>
           </a:xfrm>
           <a:prstGeom prst="rect">
             <a:avLst/>
           </a:prstGeom>
           <a:solidFill>
-            <a:schemeClr val="bg1"/>
+            <a:schemeClr val="bg2">
+              <a:lumMod val="90000"/>
+            </a:schemeClr>
           </a:solidFill>
           <a:ln>
             <a:solidFill>
@@ -6663,936 +6849,6 @@
           <a:lstStyle/>
           <a:p>
             <a:pPr algn="ctr"/>
-            <a:endParaRPr lang="es-ES" sz="900" dirty="0">
-              <a:solidFill>
-                <a:schemeClr val="tx1"/>
-              </a:solidFill>
-              <a:latin typeface="Arial" panose="020B0604020202020204" pitchFamily="34" charset="0"/>
-              <a:cs typeface="Arial" panose="020B0604020202020204" pitchFamily="34" charset="0"/>
-            </a:endParaRPr>
-          </a:p>
-        </p:txBody>
-      </p:sp>
-      <p:cxnSp>
-        <p:nvCxnSpPr>
-          <p:cNvPr id="649" name="Conector recto 648"/>
-          <p:cNvCxnSpPr>
-            <a:stCxn id="646" idx="0"/>
-            <a:endCxn id="592" idx="2"/>
-          </p:cNvCxnSpPr>
-          <p:nvPr/>
-        </p:nvCxnSpPr>
-        <p:spPr>
-          <a:xfrm flipV="1">
-            <a:off x="4713346" y="5492845"/>
-            <a:ext cx="0" cy="137669"/>
-          </a:xfrm>
-          <a:prstGeom prst="line">
-            <a:avLst/>
-          </a:prstGeom>
-          <a:ln w="12700">
-            <a:solidFill>
-              <a:schemeClr val="tx1"/>
-            </a:solidFill>
-          </a:ln>
-        </p:spPr>
-        <p:style>
-          <a:lnRef idx="1">
-            <a:schemeClr val="accent1"/>
-          </a:lnRef>
-          <a:fillRef idx="0">
-            <a:schemeClr val="accent1"/>
-          </a:fillRef>
-          <a:effectRef idx="0">
-            <a:schemeClr val="accent1"/>
-          </a:effectRef>
-          <a:fontRef idx="minor">
-            <a:schemeClr val="tx1"/>
-          </a:fontRef>
-        </p:style>
-      </p:cxnSp>
-      <p:cxnSp>
-        <p:nvCxnSpPr>
-          <p:cNvPr id="650" name="Conector recto 649"/>
-          <p:cNvCxnSpPr>
-            <a:stCxn id="647" idx="0"/>
-            <a:endCxn id="596" idx="2"/>
-          </p:cNvCxnSpPr>
-          <p:nvPr/>
-        </p:nvCxnSpPr>
-        <p:spPr>
-          <a:xfrm flipV="1">
-            <a:off x="5631407" y="5492844"/>
-            <a:ext cx="0" cy="137670"/>
-          </a:xfrm>
-          <a:prstGeom prst="line">
-            <a:avLst/>
-          </a:prstGeom>
-          <a:ln w="12700">
-            <a:solidFill>
-              <a:schemeClr val="tx1"/>
-            </a:solidFill>
-          </a:ln>
-        </p:spPr>
-        <p:style>
-          <a:lnRef idx="1">
-            <a:schemeClr val="accent1"/>
-          </a:lnRef>
-          <a:fillRef idx="0">
-            <a:schemeClr val="accent1"/>
-          </a:fillRef>
-          <a:effectRef idx="0">
-            <a:schemeClr val="accent1"/>
-          </a:effectRef>
-          <a:fontRef idx="minor">
-            <a:schemeClr val="tx1"/>
-          </a:fontRef>
-        </p:style>
-      </p:cxnSp>
-      <p:cxnSp>
-        <p:nvCxnSpPr>
-          <p:cNvPr id="651" name="Conector recto 650"/>
-          <p:cNvCxnSpPr>
-            <a:stCxn id="648" idx="0"/>
-            <a:endCxn id="644" idx="2"/>
-          </p:cNvCxnSpPr>
-          <p:nvPr/>
-        </p:nvCxnSpPr>
-        <p:spPr>
-          <a:xfrm flipH="1" flipV="1">
-            <a:off x="6581982" y="5476777"/>
-            <a:ext cx="4201" cy="153737"/>
-          </a:xfrm>
-          <a:prstGeom prst="line">
-            <a:avLst/>
-          </a:prstGeom>
-          <a:ln w="12700">
-            <a:solidFill>
-              <a:schemeClr val="tx1"/>
-            </a:solidFill>
-          </a:ln>
-        </p:spPr>
-        <p:style>
-          <a:lnRef idx="1">
-            <a:schemeClr val="accent1"/>
-          </a:lnRef>
-          <a:fillRef idx="0">
-            <a:schemeClr val="accent1"/>
-          </a:fillRef>
-          <a:effectRef idx="0">
-            <a:schemeClr val="accent1"/>
-          </a:effectRef>
-          <a:fontRef idx="minor">
-            <a:schemeClr val="tx1"/>
-          </a:fontRef>
-        </p:style>
-      </p:cxnSp>
-      <p:sp>
-        <p:nvSpPr>
-          <p:cNvPr id="652" name="CuadroTexto 651" descr="Conector entre nodos"/>
-          <p:cNvSpPr txBox="1"/>
-          <p:nvPr/>
-        </p:nvSpPr>
-        <p:spPr>
-          <a:xfrm>
-            <a:off x="5072819" y="4665014"/>
-            <a:ext cx="1117174" cy="230832"/>
-          </a:xfrm>
-          <a:prstGeom prst="rect">
-            <a:avLst/>
-          </a:prstGeom>
-          <a:noFill/>
-        </p:spPr>
-        <p:txBody>
-          <a:bodyPr wrap="square" rtlCol="0">
-            <a:spAutoFit/>
-          </a:bodyPr>
-          <a:lstStyle/>
-          <a:p>
-            <a:pPr algn="ctr"/>
-            <a:r>
-              <a:rPr lang="es-ES" sz="900" dirty="0" smtClean="0">
-                <a:latin typeface="Arial" panose="020B0604020202020204" pitchFamily="34" charset="0"/>
-                <a:cs typeface="Arial" panose="020B0604020202020204" pitchFamily="34" charset="0"/>
-              </a:rPr>
-              <a:t>matemáticamente</a:t>
-            </a:r>
-            <a:endParaRPr lang="es-ES" sz="900" dirty="0">
-              <a:latin typeface="Arial" panose="020B0604020202020204" pitchFamily="34" charset="0"/>
-              <a:cs typeface="Arial" panose="020B0604020202020204" pitchFamily="34" charset="0"/>
-            </a:endParaRPr>
-          </a:p>
-        </p:txBody>
-      </p:sp>
-      <p:cxnSp>
-        <p:nvCxnSpPr>
-          <p:cNvPr id="653" name="Conector angular 652"/>
-          <p:cNvCxnSpPr>
-            <a:stCxn id="591" idx="2"/>
-            <a:endCxn id="652" idx="0"/>
-          </p:cNvCxnSpPr>
-          <p:nvPr/>
-        </p:nvCxnSpPr>
-        <p:spPr>
-          <a:xfrm rot="16200000" flipH="1">
-            <a:off x="5073274" y="4106882"/>
-            <a:ext cx="198204" cy="918059"/>
-          </a:xfrm>
-          <a:prstGeom prst="bentConnector3">
-            <a:avLst>
-              <a:gd name="adj1" fmla="val 50000"/>
-            </a:avLst>
-          </a:prstGeom>
-          <a:ln w="12700">
-            <a:solidFill>
-              <a:schemeClr val="tx1"/>
-            </a:solidFill>
-          </a:ln>
-        </p:spPr>
-        <p:style>
-          <a:lnRef idx="1">
-            <a:schemeClr val="accent1"/>
-          </a:lnRef>
-          <a:fillRef idx="0">
-            <a:schemeClr val="accent1"/>
-          </a:fillRef>
-          <a:effectRef idx="0">
-            <a:schemeClr val="accent1"/>
-          </a:effectRef>
-          <a:fontRef idx="minor">
-            <a:schemeClr val="tx1"/>
-          </a:fontRef>
-        </p:style>
-      </p:cxnSp>
-      <p:cxnSp>
-        <p:nvCxnSpPr>
-          <p:cNvPr id="654" name="Conector angular 653"/>
-          <p:cNvCxnSpPr>
-            <a:stCxn id="642" idx="2"/>
-            <a:endCxn id="652" idx="0"/>
-          </p:cNvCxnSpPr>
-          <p:nvPr/>
-        </p:nvCxnSpPr>
-        <p:spPr>
-          <a:xfrm rot="5400000">
-            <a:off x="5532305" y="4565912"/>
-            <a:ext cx="198204" cy="1"/>
-          </a:xfrm>
-          <a:prstGeom prst="bentConnector3">
-            <a:avLst>
-              <a:gd name="adj1" fmla="val 50000"/>
-            </a:avLst>
-          </a:prstGeom>
-          <a:ln w="12700">
-            <a:solidFill>
-              <a:schemeClr val="tx1"/>
-            </a:solidFill>
-          </a:ln>
-        </p:spPr>
-        <p:style>
-          <a:lnRef idx="1">
-            <a:schemeClr val="accent1"/>
-          </a:lnRef>
-          <a:fillRef idx="0">
-            <a:schemeClr val="accent1"/>
-          </a:fillRef>
-          <a:effectRef idx="0">
-            <a:schemeClr val="accent1"/>
-          </a:effectRef>
-          <a:fontRef idx="minor">
-            <a:schemeClr val="tx1"/>
-          </a:fontRef>
-        </p:style>
-      </p:cxnSp>
-      <p:cxnSp>
-        <p:nvCxnSpPr>
-          <p:cNvPr id="655" name="Conector angular 654"/>
-          <p:cNvCxnSpPr>
-            <a:stCxn id="643" idx="2"/>
-            <a:endCxn id="652" idx="0"/>
-          </p:cNvCxnSpPr>
-          <p:nvPr/>
-        </p:nvCxnSpPr>
-        <p:spPr>
-          <a:xfrm rot="5400000">
-            <a:off x="5996477" y="4107041"/>
-            <a:ext cx="192903" cy="923043"/>
-          </a:xfrm>
-          <a:prstGeom prst="bentConnector3">
-            <a:avLst>
-              <a:gd name="adj1" fmla="val 50000"/>
-            </a:avLst>
-          </a:prstGeom>
-          <a:ln w="12700">
-            <a:solidFill>
-              <a:schemeClr val="tx1"/>
-            </a:solidFill>
-          </a:ln>
-        </p:spPr>
-        <p:style>
-          <a:lnRef idx="1">
-            <a:schemeClr val="accent1"/>
-          </a:lnRef>
-          <a:fillRef idx="0">
-            <a:schemeClr val="accent1"/>
-          </a:fillRef>
-          <a:effectRef idx="0">
-            <a:schemeClr val="accent1"/>
-          </a:effectRef>
-          <a:fontRef idx="minor">
-            <a:schemeClr val="tx1"/>
-          </a:fontRef>
-        </p:style>
-      </p:cxnSp>
-      <p:cxnSp>
-        <p:nvCxnSpPr>
-          <p:cNvPr id="656" name="Conector angular 655"/>
-          <p:cNvCxnSpPr>
-            <a:stCxn id="652" idx="2"/>
-            <a:endCxn id="644" idx="0"/>
-          </p:cNvCxnSpPr>
-          <p:nvPr/>
-        </p:nvCxnSpPr>
-        <p:spPr>
-          <a:xfrm rot="16200000" flipH="1">
-            <a:off x="5992988" y="4534264"/>
-            <a:ext cx="227412" cy="950576"/>
-          </a:xfrm>
-          <a:prstGeom prst="bentConnector3">
-            <a:avLst>
-              <a:gd name="adj1" fmla="val 50000"/>
-            </a:avLst>
-          </a:prstGeom>
-          <a:ln w="12700">
-            <a:solidFill>
-              <a:schemeClr val="tx1"/>
-            </a:solidFill>
-          </a:ln>
-        </p:spPr>
-        <p:style>
-          <a:lnRef idx="1">
-            <a:schemeClr val="accent1"/>
-          </a:lnRef>
-          <a:fillRef idx="0">
-            <a:schemeClr val="accent1"/>
-          </a:fillRef>
-          <a:effectRef idx="0">
-            <a:schemeClr val="accent1"/>
-          </a:effectRef>
-          <a:fontRef idx="minor">
-            <a:schemeClr val="tx1"/>
-          </a:fontRef>
-        </p:style>
-      </p:cxnSp>
-      <p:cxnSp>
-        <p:nvCxnSpPr>
-          <p:cNvPr id="657" name="Conector angular 656"/>
-          <p:cNvCxnSpPr>
-            <a:stCxn id="652" idx="2"/>
-            <a:endCxn id="596" idx="0"/>
-          </p:cNvCxnSpPr>
-          <p:nvPr/>
-        </p:nvCxnSpPr>
-        <p:spPr>
-          <a:xfrm rot="16200000" flipH="1">
-            <a:off x="5509667" y="5017584"/>
-            <a:ext cx="243479" cy="1"/>
-          </a:xfrm>
-          <a:prstGeom prst="bentConnector3">
-            <a:avLst>
-              <a:gd name="adj1" fmla="val 50000"/>
-            </a:avLst>
-          </a:prstGeom>
-          <a:ln w="12700">
-            <a:solidFill>
-              <a:schemeClr val="tx1"/>
-            </a:solidFill>
-          </a:ln>
-        </p:spPr>
-        <p:style>
-          <a:lnRef idx="1">
-            <a:schemeClr val="accent1"/>
-          </a:lnRef>
-          <a:fillRef idx="0">
-            <a:schemeClr val="accent1"/>
-          </a:fillRef>
-          <a:effectRef idx="0">
-            <a:schemeClr val="accent1"/>
-          </a:effectRef>
-          <a:fontRef idx="minor">
-            <a:schemeClr val="tx1"/>
-          </a:fontRef>
-        </p:style>
-      </p:cxnSp>
-      <p:cxnSp>
-        <p:nvCxnSpPr>
-          <p:cNvPr id="658" name="Conector angular 657"/>
-          <p:cNvCxnSpPr>
-            <a:stCxn id="652" idx="2"/>
-            <a:endCxn id="592" idx="0"/>
-          </p:cNvCxnSpPr>
-          <p:nvPr/>
-        </p:nvCxnSpPr>
-        <p:spPr>
-          <a:xfrm rot="5400000">
-            <a:off x="5050636" y="4558556"/>
-            <a:ext cx="243480" cy="918060"/>
-          </a:xfrm>
-          <a:prstGeom prst="bentConnector3">
-            <a:avLst>
-              <a:gd name="adj1" fmla="val 50000"/>
-            </a:avLst>
-          </a:prstGeom>
-          <a:ln w="12700">
-            <a:solidFill>
-              <a:schemeClr val="tx1"/>
-            </a:solidFill>
-          </a:ln>
-        </p:spPr>
-        <p:style>
-          <a:lnRef idx="1">
-            <a:schemeClr val="accent1"/>
-          </a:lnRef>
-          <a:fillRef idx="0">
-            <a:schemeClr val="accent1"/>
-          </a:fillRef>
-          <a:effectRef idx="0">
-            <a:schemeClr val="accent1"/>
-          </a:effectRef>
-          <a:fontRef idx="minor">
-            <a:schemeClr val="tx1"/>
-          </a:fontRef>
-        </p:style>
-      </p:cxnSp>
-      <p:pic>
-        <p:nvPicPr>
-          <p:cNvPr id="659" name="Imagen 658" descr="https://latex.codecogs.com/gif.latex?%5Cdpi%7B300%7D%20%5Cfn_jvn%20%5Clarge%20%5Ctext%20%7BSi%20%7Da%3Eb%5CRightarrow%20%5Cfrac%7Ba%7D%7Bb%7D%3E1"/>
-          <p:cNvPicPr/>
-          <p:nvPr/>
-        </p:nvPicPr>
-        <p:blipFill>
-          <a:blip r:embed="rId3" cstate="print">
-            <a:extLst>
-              <a:ext uri="{28A0092B-C50C-407E-A947-70E740481C1C}">
-                <a14:useLocalDpi xmlns="" xmlns:a14="http://schemas.microsoft.com/office/drawing/2010/main" val="0"/>
-              </a:ext>
-            </a:extLst>
-          </a:blip>
-          <a:srcRect/>
-          <a:stretch>
-            <a:fillRect/>
-          </a:stretch>
-        </p:blipFill>
-        <p:spPr bwMode="auto">
-          <a:xfrm>
-            <a:off x="5277757" y="5210017"/>
-            <a:ext cx="720000" cy="180000"/>
-          </a:xfrm>
-          <a:prstGeom prst="rect">
-            <a:avLst/>
-          </a:prstGeom>
-          <a:noFill/>
-          <a:ln>
-            <a:noFill/>
-          </a:ln>
-        </p:spPr>
-      </p:pic>
-      <p:pic>
-        <p:nvPicPr>
-          <p:cNvPr id="660" name="Imagen 659" descr="https://latex.codecogs.com/gif.latex?%5Cdpi%7B300%7D%20%5Cfn_jvn%20%5Clarge%20%5Ctext%7BSi%20%7Da%3Da%5CRightarrow%20%5Cfrac%7Ba%7D%7Ba%7D%3D1"/>
-          <p:cNvPicPr/>
-          <p:nvPr/>
-        </p:nvPicPr>
-        <p:blipFill>
-          <a:blip r:embed="rId4" cstate="print">
-            <a:extLst>
-              <a:ext uri="{28A0092B-C50C-407E-A947-70E740481C1C}">
-                <a14:useLocalDpi xmlns="" xmlns:a14="http://schemas.microsoft.com/office/drawing/2010/main" val="0"/>
-              </a:ext>
-            </a:extLst>
-          </a:blip>
-          <a:srcRect/>
-          <a:stretch>
-            <a:fillRect/>
-          </a:stretch>
-        </p:blipFill>
-        <p:spPr bwMode="auto">
-          <a:xfrm>
-            <a:off x="6236166" y="5216275"/>
-            <a:ext cx="720000" cy="180000"/>
-          </a:xfrm>
-          <a:prstGeom prst="rect">
-            <a:avLst/>
-          </a:prstGeom>
-          <a:noFill/>
-          <a:ln>
-            <a:noFill/>
-          </a:ln>
-        </p:spPr>
-      </p:pic>
-      <p:pic>
-        <p:nvPicPr>
-          <p:cNvPr id="661" name="Imagen 660" descr="https://latex.codecogs.com/gif.latex?%5Cdpi%7B300%7D%20%5Cfn_jvn%20%5Clarge%20%5Ctext%20%7BComo%20%7D4%3C6%5CRightarrow%20%5Cfrac%7B4%7D%7B6%7D%3C1"/>
-          <p:cNvPicPr/>
-          <p:nvPr/>
-        </p:nvPicPr>
-        <p:blipFill>
-          <a:blip r:embed="rId5" cstate="print">
-            <a:extLst>
-              <a:ext uri="{28A0092B-C50C-407E-A947-70E740481C1C}">
-                <a14:useLocalDpi xmlns="" xmlns:a14="http://schemas.microsoft.com/office/drawing/2010/main" val="0"/>
-              </a:ext>
-            </a:extLst>
-          </a:blip>
-          <a:srcRect/>
-          <a:stretch>
-            <a:fillRect/>
-          </a:stretch>
-        </p:blipFill>
-        <p:spPr bwMode="auto">
-          <a:xfrm>
-            <a:off x="4349268" y="5688425"/>
-            <a:ext cx="720000" cy="180000"/>
-          </a:xfrm>
-          <a:prstGeom prst="rect">
-            <a:avLst/>
-          </a:prstGeom>
-          <a:noFill/>
-          <a:ln>
-            <a:noFill/>
-          </a:ln>
-        </p:spPr>
-      </p:pic>
-      <p:pic>
-        <p:nvPicPr>
-          <p:cNvPr id="662" name="Imagen 661" descr="https://latex.codecogs.com/gif.latex?%5Cdpi%7B300%7D%20%5Cfn_jvn%20%5Clarge%20%5Ctext%20%7BComo%20%7D9%3E6%5CRightarrow%20%5Cfrac%7B9%7D%7B6%7D%3E1"/>
-          <p:cNvPicPr/>
-          <p:nvPr/>
-        </p:nvPicPr>
-        <p:blipFill>
-          <a:blip r:embed="rId6" cstate="print">
-            <a:extLst>
-              <a:ext uri="{28A0092B-C50C-407E-A947-70E740481C1C}">
-                <a14:useLocalDpi xmlns="" xmlns:a14="http://schemas.microsoft.com/office/drawing/2010/main" val="0"/>
-              </a:ext>
-            </a:extLst>
-          </a:blip>
-          <a:srcRect/>
-          <a:stretch>
-            <a:fillRect/>
-          </a:stretch>
-        </p:blipFill>
-        <p:spPr bwMode="auto">
-          <a:xfrm>
-            <a:off x="5271407" y="5688425"/>
-            <a:ext cx="720000" cy="180000"/>
-          </a:xfrm>
-          <a:prstGeom prst="rect">
-            <a:avLst/>
-          </a:prstGeom>
-          <a:noFill/>
-          <a:ln>
-            <a:noFill/>
-          </a:ln>
-        </p:spPr>
-      </p:pic>
-      <p:pic>
-        <p:nvPicPr>
-          <p:cNvPr id="663" name="Imagen 662" descr="https://latex.codecogs.com/gif.latex?%5Cdpi%7B300%7D%20%5Cfn_jvn%20%5Clarge%20%5Ctext%20%7BComo%20%7D6%3D6%5CRightarrow%20%5Cfrac%7B6%7D%7B6%7D%3D1"/>
-          <p:cNvPicPr/>
-          <p:nvPr/>
-        </p:nvPicPr>
-        <p:blipFill>
-          <a:blip r:embed="rId7" cstate="print">
-            <a:extLst>
-              <a:ext uri="{28A0092B-C50C-407E-A947-70E740481C1C}">
-                <a14:useLocalDpi xmlns="" xmlns:a14="http://schemas.microsoft.com/office/drawing/2010/main" val="0"/>
-              </a:ext>
-            </a:extLst>
-          </a:blip>
-          <a:srcRect/>
-          <a:stretch>
-            <a:fillRect/>
-          </a:stretch>
-        </p:blipFill>
-        <p:spPr bwMode="auto">
-          <a:xfrm>
-            <a:off x="6221981" y="5717273"/>
-            <a:ext cx="720000" cy="180000"/>
-          </a:xfrm>
-          <a:prstGeom prst="rect">
-            <a:avLst/>
-          </a:prstGeom>
-          <a:noFill/>
-          <a:ln>
-            <a:noFill/>
-          </a:ln>
-        </p:spPr>
-      </p:pic>
-      <p:sp>
-        <p:nvSpPr>
-          <p:cNvPr id="664" name="Rectángulo 663" descr="Nodo de segundo nivel"/>
-          <p:cNvSpPr/>
-          <p:nvPr/>
-        </p:nvSpPr>
-        <p:spPr>
-          <a:xfrm>
-            <a:off x="8473757" y="2835584"/>
-            <a:ext cx="1124746" cy="357473"/>
-          </a:xfrm>
-          <a:prstGeom prst="rect">
-            <a:avLst/>
-          </a:prstGeom>
-          <a:solidFill>
-            <a:schemeClr val="bg2">
-              <a:lumMod val="50000"/>
-            </a:schemeClr>
-          </a:solidFill>
-          <a:ln>
-            <a:solidFill>
-              <a:schemeClr val="tx1"/>
-            </a:solidFill>
-          </a:ln>
-        </p:spPr>
-        <p:style>
-          <a:lnRef idx="2">
-            <a:schemeClr val="accent6"/>
-          </a:lnRef>
-          <a:fillRef idx="1">
-            <a:schemeClr val="lt1"/>
-          </a:fillRef>
-          <a:effectRef idx="0">
-            <a:schemeClr val="accent6"/>
-          </a:effectRef>
-          <a:fontRef idx="minor">
-            <a:schemeClr val="dk1"/>
-          </a:fontRef>
-        </p:style>
-        <p:txBody>
-          <a:bodyPr rtlCol="0" anchor="ctr"/>
-          <a:lstStyle/>
-          <a:p>
-            <a:pPr algn="ctr"/>
-            <a:r>
-              <a:rPr lang="es-ES" sz="1050" dirty="0" smtClean="0">
-                <a:solidFill>
-                  <a:schemeClr val="bg1"/>
-                </a:solidFill>
-                <a:latin typeface="Arial" panose="020B0604020202020204" pitchFamily="34" charset="0"/>
-                <a:cs typeface="Arial" panose="020B0604020202020204" pitchFamily="34" charset="0"/>
-              </a:rPr>
-              <a:t>tienen igual numerador</a:t>
-            </a:r>
-            <a:endParaRPr lang="es-ES" sz="1050" dirty="0">
-              <a:solidFill>
-                <a:schemeClr val="bg1"/>
-              </a:solidFill>
-              <a:latin typeface="Arial" panose="020B0604020202020204" pitchFamily="34" charset="0"/>
-              <a:cs typeface="Arial" panose="020B0604020202020204" pitchFamily="34" charset="0"/>
-            </a:endParaRPr>
-          </a:p>
-        </p:txBody>
-      </p:sp>
-      <p:sp>
-        <p:nvSpPr>
-          <p:cNvPr id="665" name="Rectángulo 664" descr="Nodo de segundo nivel"/>
-          <p:cNvSpPr/>
-          <p:nvPr/>
-        </p:nvSpPr>
-        <p:spPr>
-          <a:xfrm>
-            <a:off x="9700749" y="2835583"/>
-            <a:ext cx="1630319" cy="357473"/>
-          </a:xfrm>
-          <a:prstGeom prst="rect">
-            <a:avLst/>
-          </a:prstGeom>
-          <a:solidFill>
-            <a:schemeClr val="bg2">
-              <a:lumMod val="50000"/>
-            </a:schemeClr>
-          </a:solidFill>
-          <a:ln>
-            <a:solidFill>
-              <a:schemeClr val="tx1"/>
-            </a:solidFill>
-          </a:ln>
-        </p:spPr>
-        <p:style>
-          <a:lnRef idx="2">
-            <a:schemeClr val="accent6"/>
-          </a:lnRef>
-          <a:fillRef idx="1">
-            <a:schemeClr val="lt1"/>
-          </a:fillRef>
-          <a:effectRef idx="0">
-            <a:schemeClr val="accent6"/>
-          </a:effectRef>
-          <a:fontRef idx="minor">
-            <a:schemeClr val="dk1"/>
-          </a:fontRef>
-        </p:style>
-        <p:txBody>
-          <a:bodyPr rtlCol="0" anchor="ctr"/>
-          <a:lstStyle/>
-          <a:p>
-            <a:pPr algn="ctr"/>
-            <a:r>
-              <a:rPr lang="es-ES" sz="1050" dirty="0" smtClean="0">
-                <a:solidFill>
-                  <a:schemeClr val="bg1"/>
-                </a:solidFill>
-                <a:latin typeface="Arial" panose="020B0604020202020204" pitchFamily="34" charset="0"/>
-                <a:cs typeface="Arial" panose="020B0604020202020204" pitchFamily="34" charset="0"/>
-              </a:rPr>
-              <a:t>tienen numerador y denominador diferentes</a:t>
-            </a:r>
-            <a:endParaRPr lang="es-ES" sz="1050" dirty="0">
-              <a:solidFill>
-                <a:schemeClr val="bg1"/>
-              </a:solidFill>
-              <a:latin typeface="Arial" panose="020B0604020202020204" pitchFamily="34" charset="0"/>
-              <a:cs typeface="Arial" panose="020B0604020202020204" pitchFamily="34" charset="0"/>
-            </a:endParaRPr>
-          </a:p>
-        </p:txBody>
-      </p:sp>
-      <p:cxnSp>
-        <p:nvCxnSpPr>
-          <p:cNvPr id="666" name="Conector angular 665"/>
-          <p:cNvCxnSpPr>
-            <a:stCxn id="602" idx="2"/>
-            <a:endCxn id="664" idx="0"/>
-          </p:cNvCxnSpPr>
-          <p:nvPr/>
-        </p:nvCxnSpPr>
-        <p:spPr>
-          <a:xfrm rot="16200000" flipH="1">
-            <a:off x="8894221" y="2693675"/>
-            <a:ext cx="278740" cy="5077"/>
-          </a:xfrm>
-          <a:prstGeom prst="bentConnector3">
-            <a:avLst>
-              <a:gd name="adj1" fmla="val 50000"/>
-            </a:avLst>
-          </a:prstGeom>
-          <a:ln w="12700">
-            <a:solidFill>
-              <a:schemeClr val="tx1"/>
-            </a:solidFill>
-          </a:ln>
-        </p:spPr>
-        <p:style>
-          <a:lnRef idx="1">
-            <a:schemeClr val="accent1"/>
-          </a:lnRef>
-          <a:fillRef idx="0">
-            <a:schemeClr val="accent1"/>
-          </a:fillRef>
-          <a:effectRef idx="0">
-            <a:schemeClr val="accent1"/>
-          </a:effectRef>
-          <a:fontRef idx="minor">
-            <a:schemeClr val="tx1"/>
-          </a:fontRef>
-        </p:style>
-      </p:cxnSp>
-      <p:cxnSp>
-        <p:nvCxnSpPr>
-          <p:cNvPr id="667" name="Conector angular 666"/>
-          <p:cNvCxnSpPr>
-            <a:stCxn id="602" idx="2"/>
-            <a:endCxn id="665" idx="0"/>
-          </p:cNvCxnSpPr>
-          <p:nvPr/>
-        </p:nvCxnSpPr>
-        <p:spPr>
-          <a:xfrm rot="16200000" flipH="1">
-            <a:off x="9634112" y="1953785"/>
-            <a:ext cx="278739" cy="1484856"/>
-          </a:xfrm>
-          <a:prstGeom prst="bentConnector3">
-            <a:avLst>
-              <a:gd name="adj1" fmla="val 50000"/>
-            </a:avLst>
-          </a:prstGeom>
-          <a:ln w="12700">
-            <a:solidFill>
-              <a:schemeClr val="tx1"/>
-            </a:solidFill>
-          </a:ln>
-        </p:spPr>
-        <p:style>
-          <a:lnRef idx="1">
-            <a:schemeClr val="accent1"/>
-          </a:lnRef>
-          <a:fillRef idx="0">
-            <a:schemeClr val="accent1"/>
-          </a:fillRef>
-          <a:effectRef idx="0">
-            <a:schemeClr val="accent1"/>
-          </a:effectRef>
-          <a:fontRef idx="minor">
-            <a:schemeClr val="tx1"/>
-          </a:fontRef>
-        </p:style>
-      </p:cxnSp>
-      <p:cxnSp>
-        <p:nvCxnSpPr>
-          <p:cNvPr id="668" name="Conector recto 667"/>
-          <p:cNvCxnSpPr>
-            <a:stCxn id="607" idx="0"/>
-            <a:endCxn id="603" idx="2"/>
-          </p:cNvCxnSpPr>
-          <p:nvPr/>
-        </p:nvCxnSpPr>
-        <p:spPr>
-          <a:xfrm flipH="1" flipV="1">
-            <a:off x="7796839" y="3193057"/>
-            <a:ext cx="1158" cy="741099"/>
-          </a:xfrm>
-          <a:prstGeom prst="line">
-            <a:avLst/>
-          </a:prstGeom>
-          <a:ln w="12700">
-            <a:solidFill>
-              <a:schemeClr val="tx1"/>
-            </a:solidFill>
-          </a:ln>
-        </p:spPr>
-        <p:style>
-          <a:lnRef idx="1">
-            <a:schemeClr val="accent1"/>
-          </a:lnRef>
-          <a:fillRef idx="0">
-            <a:schemeClr val="accent1"/>
-          </a:fillRef>
-          <a:effectRef idx="0">
-            <a:schemeClr val="accent1"/>
-          </a:effectRef>
-          <a:fontRef idx="minor">
-            <a:schemeClr val="tx1"/>
-          </a:fontRef>
-        </p:style>
-      </p:cxnSp>
-      <p:sp>
-        <p:nvSpPr>
-          <p:cNvPr id="669" name="Rectángulo 668" descr="Nodo de tercer nivel"/>
-          <p:cNvSpPr/>
-          <p:nvPr/>
-        </p:nvSpPr>
-        <p:spPr>
-          <a:xfrm>
-            <a:off x="8474915" y="3922522"/>
-            <a:ext cx="1122431" cy="728973"/>
-          </a:xfrm>
-          <a:prstGeom prst="rect">
-            <a:avLst/>
-          </a:prstGeom>
-          <a:solidFill>
-            <a:schemeClr val="bg2">
-              <a:lumMod val="90000"/>
-            </a:schemeClr>
-          </a:solidFill>
-          <a:ln>
-            <a:solidFill>
-              <a:schemeClr val="tx1"/>
-            </a:solidFill>
-          </a:ln>
-        </p:spPr>
-        <p:style>
-          <a:lnRef idx="2">
-            <a:schemeClr val="accent6"/>
-          </a:lnRef>
-          <a:fillRef idx="1">
-            <a:schemeClr val="lt1"/>
-          </a:fillRef>
-          <a:effectRef idx="0">
-            <a:schemeClr val="accent6"/>
-          </a:effectRef>
-          <a:fontRef idx="minor">
-            <a:schemeClr val="dk1"/>
-          </a:fontRef>
-        </p:style>
-        <p:txBody>
-          <a:bodyPr rtlCol="0" anchor="ctr"/>
-          <a:lstStyle/>
-          <a:p>
-            <a:pPr algn="ctr"/>
-            <a:r>
-              <a:rPr lang="es-ES" sz="900" dirty="0">
-                <a:solidFill>
-                  <a:schemeClr val="tx1"/>
-                </a:solidFill>
-                <a:latin typeface="Arial" panose="020B0604020202020204" pitchFamily="34" charset="0"/>
-                <a:cs typeface="Arial" panose="020B0604020202020204" pitchFamily="34" charset="0"/>
-              </a:rPr>
-              <a:t>e</a:t>
-            </a:r>
-            <a:r>
-              <a:rPr lang="es-ES" sz="900" dirty="0" smtClean="0">
-                <a:solidFill>
-                  <a:schemeClr val="tx1"/>
-                </a:solidFill>
-                <a:latin typeface="Arial" panose="020B0604020202020204" pitchFamily="34" charset="0"/>
-                <a:cs typeface="Arial" panose="020B0604020202020204" pitchFamily="34" charset="0"/>
-              </a:rPr>
-              <a:t>s mayor la fracción que tiene menor denominador</a:t>
-            </a:r>
-            <a:endParaRPr lang="es-ES" sz="900" dirty="0">
-              <a:solidFill>
-                <a:schemeClr val="tx1"/>
-              </a:solidFill>
-              <a:latin typeface="Arial" panose="020B0604020202020204" pitchFamily="34" charset="0"/>
-              <a:cs typeface="Arial" panose="020B0604020202020204" pitchFamily="34" charset="0"/>
-            </a:endParaRPr>
-          </a:p>
-        </p:txBody>
-      </p:sp>
-      <p:sp>
-        <p:nvSpPr>
-          <p:cNvPr id="670" name="Rectángulo 669" descr="Nodo de tercer nivel"/>
-          <p:cNvSpPr/>
-          <p:nvPr/>
-        </p:nvSpPr>
-        <p:spPr>
-          <a:xfrm>
-            <a:off x="9700749" y="3934156"/>
-            <a:ext cx="1630319" cy="717339"/>
-          </a:xfrm>
-          <a:prstGeom prst="rect">
-            <a:avLst/>
-          </a:prstGeom>
-          <a:solidFill>
-            <a:schemeClr val="bg2">
-              <a:lumMod val="90000"/>
-            </a:schemeClr>
-          </a:solidFill>
-          <a:ln>
-            <a:solidFill>
-              <a:schemeClr val="tx1"/>
-            </a:solidFill>
-          </a:ln>
-        </p:spPr>
-        <p:style>
-          <a:lnRef idx="2">
-            <a:schemeClr val="accent6"/>
-          </a:lnRef>
-          <a:fillRef idx="1">
-            <a:schemeClr val="lt1"/>
-          </a:fillRef>
-          <a:effectRef idx="0">
-            <a:schemeClr val="accent6"/>
-          </a:effectRef>
-          <a:fontRef idx="minor">
-            <a:schemeClr val="dk1"/>
-          </a:fontRef>
-        </p:style>
-        <p:txBody>
-          <a:bodyPr rtlCol="0" anchor="ctr"/>
-          <a:lstStyle/>
-          <a:p>
-            <a:pPr algn="ctr"/>
             <a:r>
               <a:rPr lang="es-ES" sz="900" dirty="0">
                 <a:solidFill>
@@ -7621,17 +6877,7 @@
                 <a:latin typeface="Arial" panose="020B0604020202020204" pitchFamily="34" charset="0"/>
                 <a:cs typeface="Arial" panose="020B0604020202020204" pitchFamily="34" charset="0"/>
               </a:rPr>
-              <a:t>como </a:t>
-            </a:r>
-            <a:r>
-              <a:rPr lang="es-ES" sz="900" smtClean="0">
-                <a:solidFill>
-                  <a:schemeClr val="tx1"/>
-                </a:solidFill>
-                <a:latin typeface="Arial" panose="020B0604020202020204" pitchFamily="34" charset="0"/>
-                <a:cs typeface="Arial" panose="020B0604020202020204" pitchFamily="34" charset="0"/>
-              </a:rPr>
-              <a:t>en el </a:t>
+              <a:t>como en el </a:t>
             </a:r>
             <a:r>
               <a:rPr lang="es-ES" sz="900" dirty="0" smtClean="0">
@@ -8903,7 +8149,7 @@
         </p:nvSpPr>
         <p:spPr>
           <a:xfrm>
-            <a:off x="4807661" y="6134346"/>
+            <a:off x="4790729" y="5101473"/>
             <a:ext cx="1634035" cy="230832"/>
           </a:xfrm>
           <a:prstGeom prst="rect">
@@ -8930,7 +8176,21 @@
                 <a:latin typeface="Arial" panose="020B0604020202020204" pitchFamily="34" charset="0"/>
                 <a:cs typeface="Arial" panose="020B0604020202020204" pitchFamily="34" charset="0"/>
               </a:rPr>
-              <a:t>e pueden escribir como</a:t>
+              <a:t>e pueden </a:t>
+            </a:r>
+            <a:r>
+              <a:rPr lang="es-ES" sz="900" dirty="0" smtClean="0">
+                <a:latin typeface="Arial" panose="020B0604020202020204" pitchFamily="34" charset="0"/>
+                <a:cs typeface="Arial" panose="020B0604020202020204" pitchFamily="34" charset="0"/>
+              </a:rPr>
+              <a:t>escribir </a:t>
+            </a:r>
+            <a:r>
+              <a:rPr lang="es-ES" sz="900" dirty="0" smtClean="0">
+                <a:latin typeface="Arial" panose="020B0604020202020204" pitchFamily="34" charset="0"/>
+                <a:cs typeface="Arial" panose="020B0604020202020204" pitchFamily="34" charset="0"/>
+              </a:rPr>
+              <a:t>como</a:t>
             </a:r>
             <a:endParaRPr lang="es-ES" sz="900" dirty="0">
               <a:latin typeface="Arial" panose="020B0604020202020204" pitchFamily="34" charset="0"/>
@@ -8942,15 +8202,12 @@
       <p:cxnSp>
         <p:nvCxnSpPr>
           <p:cNvPr id="698" name="Conector recto 697"/>
-          <p:cNvCxnSpPr>
-            <a:stCxn id="697" idx="0"/>
-            <a:endCxn id="647" idx="2"/>
-          </p:cNvCxnSpPr>
+          <p:cNvCxnSpPr/>
           <p:nvPr/>
         </p:nvCxnSpPr>
         <p:spPr>
           <a:xfrm flipV="1">
-            <a:off x="5624679" y="5984033"/>
+            <a:off x="5616212" y="4951159"/>
             <a:ext cx="6728" cy="150313"/>
           </a:xfrm>
           <a:prstGeom prst="line">
@@ -8985,7 +8242,7 @@
         </p:nvSpPr>
         <p:spPr>
           <a:xfrm>
-            <a:off x="5008331" y="6487864"/>
+            <a:off x="4991399" y="5454991"/>
             <a:ext cx="1246151" cy="353519"/>
           </a:xfrm>
           <a:prstGeom prst="rect">
@@ -9060,7 +8317,7 @@
         </p:nvCxnSpPr>
         <p:spPr>
           <a:xfrm flipH="1" flipV="1">
-            <a:off x="5624679" y="6365178"/>
+            <a:off x="5607747" y="5332305"/>
             <a:ext cx="6728" cy="122686"/>
           </a:xfrm>
           <a:prstGeom prst="line">
@@ -9095,7 +8352,7 @@
         </p:nvSpPr>
         <p:spPr>
           <a:xfrm>
-            <a:off x="5014681" y="7020427"/>
+            <a:off x="4997749" y="5987554"/>
             <a:ext cx="1246151" cy="711029"/>
           </a:xfrm>
           <a:prstGeom prst="rect">
@@ -9170,7 +8427,7 @@
         </p:nvCxnSpPr>
         <p:spPr>
           <a:xfrm flipH="1" flipV="1">
-            <a:off x="5631407" y="6841383"/>
+            <a:off x="5614475" y="5808510"/>
             <a:ext cx="6350" cy="179044"/>
           </a:xfrm>
           <a:prstGeom prst="line">
@@ -9200,7 +8457,7 @@
     </p:spTree>
     <p:extLst>
       <p:ext uri="{BB962C8B-B14F-4D97-AF65-F5344CB8AC3E}">
-        <p14:creationId xmlns="" xmlns:p14="http://schemas.microsoft.com/office/powerpoint/2010/main" val="1461478617"/>
+        <p14:creationId xmlns:p14="http://schemas.microsoft.com/office/powerpoint/2010/main" val="1461478617"/>
       </p:ext>
     </p:extLst>
   </p:cSld>
@@ -9210,7 +8467,7 @@
   <p:timing>
     <p:tnLst>
       <p:par>
-        <p:cTn id="1" dur="indefinite" restart="never" nodeType="tmRoot"/>
+        <p:cTn xmlns:p14="http://schemas.microsoft.com/office/powerpoint/2010/main" id="1" dur="indefinite" restart="never" nodeType="tmRoot"/>
       </p:par>
     </p:tnLst>
   </p:timing>
@@ -9472,7 +8729,7 @@
   <a:extraClrSchemeLst/>
   <a:extLst>
     <a:ext uri="{05A4C25C-085E-4340-85A3-A5531E510DB2}">
-      <thm15:themeFamily xmlns:thm15="http://schemas.microsoft.com/office/thememl/2012/main" xmlns="" name="Office Theme" id="{62F939B6-93AF-4DB8-9C6B-D6C7DFDC589F}" vid="{4A3C46E8-61CC-4603-A589-7422A47A8E4A}"/>
+      <thm15:themeFamily xmlns="" xmlns:thm15="http://schemas.microsoft.com/office/thememl/2012/main" name="Office Theme" id="{62F939B6-93AF-4DB8-9C6B-D6C7DFDC589F}" vid="{4A3C46E8-61CC-4603-A589-7422A47A8E4A}"/>
     </a:ext>
   </a:extLst>
 </a:theme>

</xml_diff>

<commit_message>
Ajuste de mapa conceptual
Ajuste de mapa tema 05
</commit_message>
<xml_diff>
--- a/fuentes/contenidos/grado06/guion05/MA_06_05_CO_MapaConceptual.pptx
+++ b/fuentes/contenidos/grado06/guion05/MA_06_05_CO_MapaConceptual.pptx
@@ -106,7 +106,7 @@
   </p:defaultTextStyle>
   <p:extLst>
     <p:ext uri="{EFAFB233-063F-42B5-8137-9DF3F51BA10A}">
-      <p15:sldGuideLst xmlns="" xmlns:p15="http://schemas.microsoft.com/office/powerpoint/2012/main"/>
+      <p15:sldGuideLst xmlns:p15="http://schemas.microsoft.com/office/powerpoint/2012/main" xmlns=""/>
     </p:ext>
   </p:extLst>
 </p:presentation>
@@ -244,7 +244,7 @@
             <a:fld id="{C764DE79-268F-4C1A-8933-263129D2AF90}" type="datetimeFigureOut">
               <a:rPr lang="en-US" dirty="0"/>
               <a:pPr/>
-              <a:t>26/11/15</a:t>
+              <a:t>27/11/15</a:t>
             </a:fld>
             <a:endParaRPr lang="en-US" dirty="0"/>
           </a:p>
@@ -416,7 +416,7 @@
             <a:fld id="{C764DE79-268F-4C1A-8933-263129D2AF90}" type="datetimeFigureOut">
               <a:rPr lang="en-US" dirty="0"/>
               <a:pPr/>
-              <a:t>26/11/15</a:t>
+              <a:t>27/11/15</a:t>
             </a:fld>
             <a:endParaRPr lang="en-US" dirty="0"/>
           </a:p>
@@ -598,7 +598,7 @@
             <a:fld id="{C764DE79-268F-4C1A-8933-263129D2AF90}" type="datetimeFigureOut">
               <a:rPr lang="en-US" dirty="0"/>
               <a:pPr/>
-              <a:t>26/11/15</a:t>
+              <a:t>27/11/15</a:t>
             </a:fld>
             <a:endParaRPr lang="en-US" dirty="0"/>
           </a:p>
@@ -1066,7 +1066,7 @@
             <a:fld id="{C764DE79-268F-4C1A-8933-263129D2AF90}" type="datetimeFigureOut">
               <a:rPr lang="en-US" dirty="0"/>
               <a:pPr/>
-              <a:t>26/11/15</a:t>
+              <a:t>27/11/15</a:t>
             </a:fld>
             <a:endParaRPr lang="en-US" dirty="0"/>
           </a:p>
@@ -1388,7 +1388,7 @@
             <a:fld id="{C764DE79-268F-4C1A-8933-263129D2AF90}" type="datetimeFigureOut">
               <a:rPr lang="en-US" dirty="0"/>
               <a:pPr/>
-              <a:t>26/11/15</a:t>
+              <a:t>27/11/15</a:t>
             </a:fld>
             <a:endParaRPr lang="en-US" dirty="0"/>
           </a:p>
@@ -1622,7 +1622,7 @@
             <a:fld id="{C764DE79-268F-4C1A-8933-263129D2AF90}" type="datetimeFigureOut">
               <a:rPr lang="en-US" dirty="0"/>
               <a:pPr/>
-              <a:t>26/11/15</a:t>
+              <a:t>27/11/15</a:t>
             </a:fld>
             <a:endParaRPr lang="en-US" dirty="0"/>
           </a:p>
@@ -1991,7 +1991,7 @@
             <a:fld id="{C764DE79-268F-4C1A-8933-263129D2AF90}" type="datetimeFigureOut">
               <a:rPr lang="en-US" dirty="0"/>
               <a:pPr/>
-              <a:t>26/11/15</a:t>
+              <a:t>27/11/15</a:t>
             </a:fld>
             <a:endParaRPr lang="en-US" dirty="0"/>
           </a:p>
@@ -2111,7 +2111,7 @@
             <a:fld id="{C764DE79-268F-4C1A-8933-263129D2AF90}" type="datetimeFigureOut">
               <a:rPr lang="en-US" dirty="0"/>
               <a:pPr/>
-              <a:t>26/11/15</a:t>
+              <a:t>27/11/15</a:t>
             </a:fld>
             <a:endParaRPr lang="en-US" dirty="0"/>
           </a:p>
@@ -2208,7 +2208,7 @@
             <a:fld id="{5001C876-01F7-4317-94B9-1AE222133113}" type="datetimeFigureOut">
               <a:rPr lang="es-ES" smtClean="0"/>
               <a:pPr/>
-              <a:t>26/11/15</a:t>
+              <a:t>27/11/15</a:t>
             </a:fld>
             <a:endParaRPr lang="es-ES"/>
           </a:p>
@@ -2487,7 +2487,7 @@
             <a:fld id="{C764DE79-268F-4C1A-8933-263129D2AF90}" type="datetimeFigureOut">
               <a:rPr lang="en-US" dirty="0"/>
               <a:pPr/>
-              <a:t>26/11/15</a:t>
+              <a:t>27/11/15</a:t>
             </a:fld>
             <a:endParaRPr lang="en-US" dirty="0"/>
           </a:p>
@@ -2746,7 +2746,7 @@
             <a:fld id="{C764DE79-268F-4C1A-8933-263129D2AF90}" type="datetimeFigureOut">
               <a:rPr lang="en-US" dirty="0"/>
               <a:pPr/>
-              <a:t>26/11/15</a:t>
+              <a:t>27/11/15</a:t>
             </a:fld>
             <a:endParaRPr lang="en-US" dirty="0"/>
           </a:p>
@@ -2961,7 +2961,7 @@
             <a:fld id="{C764DE79-268F-4C1A-8933-263129D2AF90}" type="datetimeFigureOut">
               <a:rPr lang="en-US" dirty="0"/>
               <a:pPr/>
-              <a:t>26/11/15</a:t>
+              <a:t>27/11/15</a:t>
             </a:fld>
             <a:endParaRPr lang="en-US" dirty="0"/>
           </a:p>
@@ -4057,50 +4057,13 @@
       </p:cxnSp>
       <p:sp>
         <p:nvSpPr>
-          <p:cNvPr id="590" name="CuadroTexto 589" descr="Conector entre nodos"/>
-          <p:cNvSpPr txBox="1"/>
-          <p:nvPr/>
-        </p:nvSpPr>
-        <p:spPr>
-          <a:xfrm>
-            <a:off x="5072819" y="3439425"/>
-            <a:ext cx="1117174" cy="230832"/>
-          </a:xfrm>
-          <a:prstGeom prst="rect">
-            <a:avLst/>
-          </a:prstGeom>
-          <a:noFill/>
-        </p:spPr>
-        <p:txBody>
-          <a:bodyPr wrap="square" rtlCol="0">
-            <a:spAutoFit/>
-          </a:bodyPr>
-          <a:lstStyle/>
-          <a:p>
-            <a:pPr algn="ctr"/>
-            <a:r>
-              <a:rPr lang="es-ES" sz="900" dirty="0" smtClean="0">
-                <a:latin typeface="Arial" panose="020B0604020202020204" pitchFamily="34" charset="0"/>
-                <a:cs typeface="Arial" panose="020B0604020202020204" pitchFamily="34" charset="0"/>
-              </a:rPr>
-              <a:t>representan</a:t>
-            </a:r>
-            <a:endParaRPr lang="es-ES" sz="900" dirty="0">
-              <a:latin typeface="Arial" panose="020B0604020202020204" pitchFamily="34" charset="0"/>
-              <a:cs typeface="Arial" panose="020B0604020202020204" pitchFamily="34" charset="0"/>
-            </a:endParaRPr>
-          </a:p>
-        </p:txBody>
-      </p:sp>
-      <p:sp>
-        <p:nvSpPr>
           <p:cNvPr id="591" name="Rectángulo 590" descr="Nodo de tercer nivel"/>
           <p:cNvSpPr/>
           <p:nvPr/>
         </p:nvSpPr>
         <p:spPr>
           <a:xfrm>
-            <a:off x="4292253" y="3919949"/>
+            <a:off x="4292253" y="3428921"/>
             <a:ext cx="842187" cy="546861"/>
           </a:xfrm>
           <a:prstGeom prst="rect">
@@ -4166,46 +4129,6 @@
           </a:p>
         </p:txBody>
       </p:sp>
-      <p:cxnSp>
-        <p:nvCxnSpPr>
-          <p:cNvPr id="593" name="Conector angular 592"/>
-          <p:cNvCxnSpPr>
-            <a:stCxn id="590" idx="2"/>
-            <a:endCxn id="591" idx="0"/>
-          </p:cNvCxnSpPr>
-          <p:nvPr/>
-        </p:nvCxnSpPr>
-        <p:spPr>
-          <a:xfrm rot="5400000">
-            <a:off x="5047531" y="3336074"/>
-            <a:ext cx="249692" cy="918059"/>
-          </a:xfrm>
-          <a:prstGeom prst="bentConnector3">
-            <a:avLst>
-              <a:gd name="adj1" fmla="val 50000"/>
-            </a:avLst>
-          </a:prstGeom>
-          <a:ln w="12700">
-            <a:solidFill>
-              <a:schemeClr val="tx1"/>
-            </a:solidFill>
-          </a:ln>
-        </p:spPr>
-        <p:style>
-          <a:lnRef idx="1">
-            <a:schemeClr val="accent1"/>
-          </a:lnRef>
-          <a:fillRef idx="0">
-            <a:schemeClr val="accent1"/>
-          </a:fillRef>
-          <a:effectRef idx="0">
-            <a:schemeClr val="accent1"/>
-          </a:effectRef>
-          <a:fontRef idx="minor">
-            <a:schemeClr val="tx1"/>
-          </a:fontRef>
-        </p:style>
-      </p:cxnSp>
       <p:sp>
         <p:nvSpPr>
           <p:cNvPr id="594" name="Rectángulo 593" descr="Nodo de segundo nivel"/>
@@ -4280,86 +4203,6 @@
           </a:p>
         </p:txBody>
       </p:sp>
-      <p:cxnSp>
-        <p:nvCxnSpPr>
-          <p:cNvPr id="595" name="Conector angular 594"/>
-          <p:cNvCxnSpPr>
-            <a:stCxn id="590" idx="2"/>
-            <a:endCxn id="642" idx="0"/>
-          </p:cNvCxnSpPr>
-          <p:nvPr/>
-        </p:nvCxnSpPr>
-        <p:spPr>
-          <a:xfrm rot="16200000" flipH="1">
-            <a:off x="5506560" y="3795102"/>
-            <a:ext cx="249692" cy="1"/>
-          </a:xfrm>
-          <a:prstGeom prst="bentConnector3">
-            <a:avLst>
-              <a:gd name="adj1" fmla="val 50000"/>
-            </a:avLst>
-          </a:prstGeom>
-          <a:ln w="12700">
-            <a:solidFill>
-              <a:schemeClr val="tx1"/>
-            </a:solidFill>
-          </a:ln>
-        </p:spPr>
-        <p:style>
-          <a:lnRef idx="1">
-            <a:schemeClr val="accent1"/>
-          </a:lnRef>
-          <a:fillRef idx="0">
-            <a:schemeClr val="accent1"/>
-          </a:fillRef>
-          <a:effectRef idx="0">
-            <a:schemeClr val="accent1"/>
-          </a:effectRef>
-          <a:fontRef idx="minor">
-            <a:schemeClr val="tx1"/>
-          </a:fontRef>
-        </p:style>
-      </p:cxnSp>
-      <p:cxnSp>
-        <p:nvCxnSpPr>
-          <p:cNvPr id="597" name="Conector angular 596"/>
-          <p:cNvCxnSpPr>
-            <a:stCxn id="590" idx="2"/>
-            <a:endCxn id="643" idx="0"/>
-          </p:cNvCxnSpPr>
-          <p:nvPr/>
-        </p:nvCxnSpPr>
-        <p:spPr>
-          <a:xfrm rot="16200000" flipH="1">
-            <a:off x="5965431" y="3336231"/>
-            <a:ext cx="254993" cy="923043"/>
-          </a:xfrm>
-          <a:prstGeom prst="bentConnector3">
-            <a:avLst>
-              <a:gd name="adj1" fmla="val 50000"/>
-            </a:avLst>
-          </a:prstGeom>
-          <a:ln w="12700">
-            <a:solidFill>
-              <a:schemeClr val="tx1"/>
-            </a:solidFill>
-          </a:ln>
-        </p:spPr>
-        <p:style>
-          <a:lnRef idx="1">
-            <a:schemeClr val="accent1"/>
-          </a:lnRef>
-          <a:fillRef idx="0">
-            <a:schemeClr val="accent1"/>
-          </a:fillRef>
-          <a:effectRef idx="0">
-            <a:schemeClr val="accent1"/>
-          </a:effectRef>
-          <a:fontRef idx="minor">
-            <a:schemeClr val="tx1"/>
-          </a:fontRef>
-        </p:style>
-      </p:cxnSp>
       <p:sp>
         <p:nvSpPr>
           <p:cNvPr id="598" name="Rectángulo 597" descr="Nodo de primer nivel"/>
@@ -5205,7 +5048,7 @@
         </p:nvSpPr>
         <p:spPr>
           <a:xfrm>
-            <a:off x="2040274" y="3439425"/>
+            <a:off x="804188" y="3422492"/>
             <a:ext cx="774618" cy="230832"/>
           </a:xfrm>
           <a:prstGeom prst="rect">
@@ -5742,377 +5585,16 @@
       </p:cxnSp>
       <p:cxnSp>
         <p:nvCxnSpPr>
-          <p:cNvPr id="631" name="Conector angular 630"/>
-          <p:cNvCxnSpPr>
-            <a:stCxn id="611" idx="2"/>
-            <a:endCxn id="618" idx="0"/>
-          </p:cNvCxnSpPr>
-          <p:nvPr/>
-        </p:nvCxnSpPr>
-        <p:spPr>
-          <a:xfrm rot="5400000">
-            <a:off x="2512739" y="3109714"/>
-            <a:ext cx="244555" cy="414866"/>
-          </a:xfrm>
-          <a:prstGeom prst="bentConnector3">
-            <a:avLst>
-              <a:gd name="adj1" fmla="val 50000"/>
-            </a:avLst>
-          </a:prstGeom>
-          <a:ln w="12700">
-            <a:solidFill>
-              <a:schemeClr val="tx1"/>
-            </a:solidFill>
-          </a:ln>
-        </p:spPr>
-        <p:style>
-          <a:lnRef idx="1">
-            <a:schemeClr val="accent1"/>
-          </a:lnRef>
-          <a:fillRef idx="0">
-            <a:schemeClr val="accent1"/>
-          </a:fillRef>
-          <a:effectRef idx="0">
-            <a:schemeClr val="accent1"/>
-          </a:effectRef>
-          <a:fontRef idx="minor">
-            <a:schemeClr val="tx1"/>
-          </a:fontRef>
-        </p:style>
-      </p:cxnSp>
-      <p:cxnSp>
-        <p:nvCxnSpPr>
-          <p:cNvPr id="632" name="Conector angular 631"/>
-          <p:cNvCxnSpPr>
-            <a:stCxn id="610" idx="2"/>
-            <a:endCxn id="618" idx="0"/>
-          </p:cNvCxnSpPr>
-          <p:nvPr/>
-        </p:nvCxnSpPr>
-        <p:spPr>
-          <a:xfrm rot="16200000" flipH="1">
-            <a:off x="2106245" y="3118086"/>
-            <a:ext cx="244555" cy="398121"/>
-          </a:xfrm>
-          <a:prstGeom prst="bentConnector3">
-            <a:avLst>
-              <a:gd name="adj1" fmla="val 50000"/>
-            </a:avLst>
-          </a:prstGeom>
-          <a:ln w="12700">
-            <a:solidFill>
-              <a:schemeClr val="tx1"/>
-            </a:solidFill>
-          </a:ln>
-        </p:spPr>
-        <p:style>
-          <a:lnRef idx="1">
-            <a:schemeClr val="accent1"/>
-          </a:lnRef>
-          <a:fillRef idx="0">
-            <a:schemeClr val="accent1"/>
-          </a:fillRef>
-          <a:effectRef idx="0">
-            <a:schemeClr val="accent1"/>
-          </a:effectRef>
-          <a:fontRef idx="minor">
-            <a:schemeClr val="tx1"/>
-          </a:fontRef>
-        </p:style>
-      </p:cxnSp>
-      <p:cxnSp>
-        <p:nvCxnSpPr>
           <p:cNvPr id="633" name="Conector angular 632"/>
           <p:cNvCxnSpPr>
             <a:stCxn id="583" idx="2"/>
-            <a:endCxn id="618" idx="0"/>
           </p:cNvCxnSpPr>
           <p:nvPr/>
         </p:nvCxnSpPr>
         <p:spPr>
-          <a:xfrm rot="16200000" flipH="1">
-            <a:off x="1697880" y="2709721"/>
-            <a:ext cx="244555" cy="1214851"/>
-          </a:xfrm>
-          <a:prstGeom prst="bentConnector3">
-            <a:avLst>
-              <a:gd name="adj1" fmla="val 50000"/>
-            </a:avLst>
-          </a:prstGeom>
-          <a:ln w="12700">
-            <a:solidFill>
-              <a:schemeClr val="tx1"/>
-            </a:solidFill>
-          </a:ln>
-        </p:spPr>
-        <p:style>
-          <a:lnRef idx="1">
-            <a:schemeClr val="accent1"/>
-          </a:lnRef>
-          <a:fillRef idx="0">
-            <a:schemeClr val="accent1"/>
-          </a:fillRef>
-          <a:effectRef idx="0">
-            <a:schemeClr val="accent1"/>
-          </a:effectRef>
-          <a:fontRef idx="minor">
-            <a:schemeClr val="tx1"/>
-          </a:fontRef>
-        </p:style>
-      </p:cxnSp>
-      <p:cxnSp>
-        <p:nvCxnSpPr>
-          <p:cNvPr id="634" name="Conector angular 633"/>
-          <p:cNvCxnSpPr>
-            <a:stCxn id="612" idx="2"/>
-            <a:endCxn id="618" idx="0"/>
-          </p:cNvCxnSpPr>
-          <p:nvPr/>
-        </p:nvCxnSpPr>
-        <p:spPr>
           <a:xfrm rot="5400000">
-            <a:off x="2917068" y="2705385"/>
-            <a:ext cx="244555" cy="1223524"/>
-          </a:xfrm>
-          <a:prstGeom prst="bentConnector3">
-            <a:avLst>
-              <a:gd name="adj1" fmla="val 50000"/>
-            </a:avLst>
-          </a:prstGeom>
-          <a:ln w="12700">
-            <a:solidFill>
-              <a:schemeClr val="tx1"/>
-            </a:solidFill>
-          </a:ln>
-        </p:spPr>
-        <p:style>
-          <a:lnRef idx="1">
-            <a:schemeClr val="accent1"/>
-          </a:lnRef>
-          <a:fillRef idx="0">
-            <a:schemeClr val="accent1"/>
-          </a:fillRef>
-          <a:effectRef idx="0">
-            <a:schemeClr val="accent1"/>
-          </a:effectRef>
-          <a:fontRef idx="minor">
-            <a:schemeClr val="tx1"/>
-          </a:fontRef>
-        </p:style>
-      </p:cxnSp>
-      <p:cxnSp>
-        <p:nvCxnSpPr>
-          <p:cNvPr id="635" name="Conector angular 634"/>
-          <p:cNvCxnSpPr>
-            <a:stCxn id="617" idx="0"/>
-            <a:endCxn id="618" idx="2"/>
-          </p:cNvCxnSpPr>
-          <p:nvPr/>
-        </p:nvCxnSpPr>
-        <p:spPr>
-          <a:xfrm rot="16200000" flipV="1">
-            <a:off x="2920317" y="3177524"/>
-            <a:ext cx="238057" cy="1223524"/>
-          </a:xfrm>
-          <a:prstGeom prst="bentConnector3">
-            <a:avLst>
-              <a:gd name="adj1" fmla="val 50000"/>
-            </a:avLst>
-          </a:prstGeom>
-          <a:ln w="12700">
-            <a:solidFill>
-              <a:schemeClr val="tx1"/>
-            </a:solidFill>
-          </a:ln>
-        </p:spPr>
-        <p:style>
-          <a:lnRef idx="1">
-            <a:schemeClr val="accent1"/>
-          </a:lnRef>
-          <a:fillRef idx="0">
-            <a:schemeClr val="accent1"/>
-          </a:fillRef>
-          <a:effectRef idx="0">
-            <a:schemeClr val="accent1"/>
-          </a:effectRef>
-          <a:fontRef idx="minor">
-            <a:schemeClr val="tx1"/>
-          </a:fontRef>
-        </p:style>
-      </p:cxnSp>
-      <p:cxnSp>
-        <p:nvCxnSpPr>
-          <p:cNvPr id="636" name="Conector angular 635"/>
-          <p:cNvCxnSpPr>
-            <a:stCxn id="615" idx="0"/>
-            <a:endCxn id="618" idx="2"/>
-          </p:cNvCxnSpPr>
-          <p:nvPr/>
-        </p:nvCxnSpPr>
-        <p:spPr>
-          <a:xfrm rot="5400000" flipH="1" flipV="1">
-            <a:off x="2109163" y="3590556"/>
-            <a:ext cx="238718" cy="398121"/>
-          </a:xfrm>
-          <a:prstGeom prst="bentConnector3">
-            <a:avLst>
-              <a:gd name="adj1" fmla="val 50000"/>
-            </a:avLst>
-          </a:prstGeom>
-          <a:ln w="12700">
-            <a:solidFill>
-              <a:schemeClr val="tx1"/>
-            </a:solidFill>
-          </a:ln>
-        </p:spPr>
-        <p:style>
-          <a:lnRef idx="1">
-            <a:schemeClr val="accent1"/>
-          </a:lnRef>
-          <a:fillRef idx="0">
-            <a:schemeClr val="accent1"/>
-          </a:fillRef>
-          <a:effectRef idx="0">
-            <a:schemeClr val="accent1"/>
-          </a:effectRef>
-          <a:fontRef idx="minor">
-            <a:schemeClr val="tx1"/>
-          </a:fontRef>
-        </p:style>
-      </p:cxnSp>
-      <p:cxnSp>
-        <p:nvCxnSpPr>
-          <p:cNvPr id="637" name="Conector angular 636"/>
-          <p:cNvCxnSpPr>
-            <a:stCxn id="585" idx="0"/>
-            <a:endCxn id="618" idx="2"/>
-          </p:cNvCxnSpPr>
-          <p:nvPr/>
-        </p:nvCxnSpPr>
-        <p:spPr>
-          <a:xfrm rot="5400000" flipH="1" flipV="1">
-            <a:off x="1700798" y="3182191"/>
-            <a:ext cx="238718" cy="1214851"/>
-          </a:xfrm>
-          <a:prstGeom prst="bentConnector3">
-            <a:avLst>
-              <a:gd name="adj1" fmla="val 50000"/>
-            </a:avLst>
-          </a:prstGeom>
-          <a:ln w="12700">
-            <a:solidFill>
-              <a:schemeClr val="tx1"/>
-            </a:solidFill>
-          </a:ln>
-        </p:spPr>
-        <p:style>
-          <a:lnRef idx="1">
-            <a:schemeClr val="accent1"/>
-          </a:lnRef>
-          <a:fillRef idx="0">
-            <a:schemeClr val="accent1"/>
-          </a:fillRef>
-          <a:effectRef idx="0">
-            <a:schemeClr val="accent1"/>
-          </a:effectRef>
-          <a:fontRef idx="minor">
-            <a:schemeClr val="tx1"/>
-          </a:fontRef>
-        </p:style>
-      </p:cxnSp>
-      <p:cxnSp>
-        <p:nvCxnSpPr>
-          <p:cNvPr id="638" name="Conector angular 637"/>
-          <p:cNvCxnSpPr>
-            <a:stCxn id="616" idx="0"/>
-            <a:endCxn id="618" idx="2"/>
-          </p:cNvCxnSpPr>
-          <p:nvPr/>
-        </p:nvCxnSpPr>
-        <p:spPr>
-          <a:xfrm rot="16200000" flipV="1">
-            <a:off x="2515658" y="3582183"/>
-            <a:ext cx="238717" cy="414866"/>
-          </a:xfrm>
-          <a:prstGeom prst="bentConnector3">
-            <a:avLst>
-              <a:gd name="adj1" fmla="val 50000"/>
-            </a:avLst>
-          </a:prstGeom>
-          <a:ln w="12700">
-            <a:solidFill>
-              <a:schemeClr val="tx1"/>
-            </a:solidFill>
-          </a:ln>
-        </p:spPr>
-        <p:style>
-          <a:lnRef idx="1">
-            <a:schemeClr val="accent1"/>
-          </a:lnRef>
-          <a:fillRef idx="0">
-            <a:schemeClr val="accent1"/>
-          </a:fillRef>
-          <a:effectRef idx="0">
-            <a:schemeClr val="accent1"/>
-          </a:effectRef>
-          <a:fontRef idx="minor">
-            <a:schemeClr val="tx1"/>
-          </a:fontRef>
-        </p:style>
-      </p:cxnSp>
-      <p:cxnSp>
-        <p:nvCxnSpPr>
-          <p:cNvPr id="639" name="Conector angular 638"/>
-          <p:cNvCxnSpPr>
-            <a:stCxn id="628" idx="2"/>
-            <a:endCxn id="590" idx="0"/>
-          </p:cNvCxnSpPr>
-          <p:nvPr/>
-        </p:nvCxnSpPr>
-        <p:spPr>
-          <a:xfrm rot="5400000">
-            <a:off x="5990765" y="2841251"/>
-            <a:ext cx="238816" cy="957533"/>
-          </a:xfrm>
-          <a:prstGeom prst="bentConnector3">
-            <a:avLst>
-              <a:gd name="adj1" fmla="val 50000"/>
-            </a:avLst>
-          </a:prstGeom>
-          <a:ln w="12700">
-            <a:solidFill>
-              <a:schemeClr val="tx1"/>
-            </a:solidFill>
-          </a:ln>
-        </p:spPr>
-        <p:style>
-          <a:lnRef idx="1">
-            <a:schemeClr val="accent1"/>
-          </a:lnRef>
-          <a:fillRef idx="0">
-            <a:schemeClr val="accent1"/>
-          </a:fillRef>
-          <a:effectRef idx="0">
-            <a:schemeClr val="accent1"/>
-          </a:effectRef>
-          <a:fontRef idx="minor">
-            <a:schemeClr val="tx1"/>
-          </a:fontRef>
-        </p:style>
-      </p:cxnSp>
-      <p:cxnSp>
-        <p:nvCxnSpPr>
-          <p:cNvPr id="640" name="Conector angular 639"/>
-          <p:cNvCxnSpPr>
-            <a:stCxn id="588" idx="2"/>
-            <a:endCxn id="590" idx="0"/>
-          </p:cNvCxnSpPr>
-          <p:nvPr/>
-        </p:nvCxnSpPr>
-        <p:spPr>
-          <a:xfrm rot="16200000" flipH="1">
-            <a:off x="5049193" y="2857211"/>
-            <a:ext cx="246367" cy="918059"/>
+            <a:off x="1082048" y="3323512"/>
+            <a:ext cx="259327" cy="2043"/>
           </a:xfrm>
           <a:prstGeom prst="bentConnector3">
             <a:avLst>
@@ -6145,7 +5627,6 @@
           <p:cNvPr id="641" name="Conector angular 640"/>
           <p:cNvCxnSpPr>
             <a:stCxn id="594" idx="2"/>
-            <a:endCxn id="590" idx="0"/>
           </p:cNvCxnSpPr>
           <p:nvPr/>
         </p:nvCxnSpPr>
@@ -6188,7 +5669,7 @@
         </p:nvSpPr>
         <p:spPr>
           <a:xfrm>
-            <a:off x="5210313" y="3919949"/>
+            <a:off x="5210313" y="3428921"/>
             <a:ext cx="842187" cy="546861"/>
           </a:xfrm>
           <a:prstGeom prst="rect">
@@ -6262,7 +5743,7 @@
         </p:nvSpPr>
         <p:spPr>
           <a:xfrm>
-            <a:off x="6133355" y="3925250"/>
+            <a:off x="6133355" y="3434222"/>
             <a:ext cx="842187" cy="546861"/>
           </a:xfrm>
           <a:prstGeom prst="rect">
@@ -6336,7 +5817,7 @@
         </p:nvSpPr>
         <p:spPr>
           <a:xfrm>
-            <a:off x="5072819" y="4665014"/>
+            <a:off x="5072819" y="4173986"/>
             <a:ext cx="1117174" cy="230832"/>
           </a:xfrm>
           <a:prstGeom prst="rect">
@@ -6365,46 +5846,6 @@
           </a:p>
         </p:txBody>
       </p:sp>
-      <p:cxnSp>
-        <p:nvCxnSpPr>
-          <p:cNvPr id="653" name="Conector angular 652"/>
-          <p:cNvCxnSpPr>
-            <a:stCxn id="591" idx="2"/>
-            <a:endCxn id="652" idx="0"/>
-          </p:cNvCxnSpPr>
-          <p:nvPr/>
-        </p:nvCxnSpPr>
-        <p:spPr>
-          <a:xfrm rot="16200000" flipH="1">
-            <a:off x="5073274" y="4106882"/>
-            <a:ext cx="198204" cy="918059"/>
-          </a:xfrm>
-          <a:prstGeom prst="bentConnector3">
-            <a:avLst>
-              <a:gd name="adj1" fmla="val 50000"/>
-            </a:avLst>
-          </a:prstGeom>
-          <a:ln w="12700">
-            <a:solidFill>
-              <a:schemeClr val="tx1"/>
-            </a:solidFill>
-          </a:ln>
-        </p:spPr>
-        <p:style>
-          <a:lnRef idx="1">
-            <a:schemeClr val="accent1"/>
-          </a:lnRef>
-          <a:fillRef idx="0">
-            <a:schemeClr val="accent1"/>
-          </a:fillRef>
-          <a:effectRef idx="0">
-            <a:schemeClr val="accent1"/>
-          </a:effectRef>
-          <a:fontRef idx="minor">
-            <a:schemeClr val="tx1"/>
-          </a:fontRef>
-        </p:style>
-      </p:cxnSp>
       <p:cxnSp>
         <p:nvCxnSpPr>
           <p:cNvPr id="654" name="Conector angular 653"/>
@@ -6416,48 +5857,8 @@
         </p:nvCxnSpPr>
         <p:spPr>
           <a:xfrm rot="5400000">
-            <a:off x="5532305" y="4565912"/>
+            <a:off x="5532305" y="4074884"/>
             <a:ext cx="198204" cy="1"/>
-          </a:xfrm>
-          <a:prstGeom prst="bentConnector3">
-            <a:avLst>
-              <a:gd name="adj1" fmla="val 50000"/>
-            </a:avLst>
-          </a:prstGeom>
-          <a:ln w="12700">
-            <a:solidFill>
-              <a:schemeClr val="tx1"/>
-            </a:solidFill>
-          </a:ln>
-        </p:spPr>
-        <p:style>
-          <a:lnRef idx="1">
-            <a:schemeClr val="accent1"/>
-          </a:lnRef>
-          <a:fillRef idx="0">
-            <a:schemeClr val="accent1"/>
-          </a:fillRef>
-          <a:effectRef idx="0">
-            <a:schemeClr val="accent1"/>
-          </a:effectRef>
-          <a:fontRef idx="minor">
-            <a:schemeClr val="tx1"/>
-          </a:fontRef>
-        </p:style>
-      </p:cxnSp>
-      <p:cxnSp>
-        <p:nvCxnSpPr>
-          <p:cNvPr id="655" name="Conector angular 654"/>
-          <p:cNvCxnSpPr>
-            <a:stCxn id="643" idx="2"/>
-            <a:endCxn id="652" idx="0"/>
-          </p:cNvCxnSpPr>
-          <p:nvPr/>
-        </p:nvCxnSpPr>
-        <p:spPr>
-          <a:xfrm rot="5400000">
-            <a:off x="5996477" y="4107041"/>
-            <a:ext cx="192903" cy="923043"/>
           </a:xfrm>
           <a:prstGeom prst="bentConnector3">
             <a:avLst>
@@ -8149,7 +7550,7 @@
         </p:nvSpPr>
         <p:spPr>
           <a:xfrm>
-            <a:off x="4790729" y="5101473"/>
+            <a:off x="4790729" y="4610445"/>
             <a:ext cx="1634035" cy="230832"/>
           </a:xfrm>
           <a:prstGeom prst="rect">
@@ -8176,21 +7577,7 @@
                 <a:latin typeface="Arial" panose="020B0604020202020204" pitchFamily="34" charset="0"/>
                 <a:cs typeface="Arial" panose="020B0604020202020204" pitchFamily="34" charset="0"/>
               </a:rPr>
-              <a:t>e pueden </a:t>
-            </a:r>
-            <a:r>
-              <a:rPr lang="es-ES" sz="900" dirty="0" smtClean="0">
-                <a:latin typeface="Arial" panose="020B0604020202020204" pitchFamily="34" charset="0"/>
-                <a:cs typeface="Arial" panose="020B0604020202020204" pitchFamily="34" charset="0"/>
-              </a:rPr>
-              <a:t>escribir </a:t>
-            </a:r>
-            <a:r>
-              <a:rPr lang="es-ES" sz="900" dirty="0" smtClean="0">
-                <a:latin typeface="Arial" panose="020B0604020202020204" pitchFamily="34" charset="0"/>
-                <a:cs typeface="Arial" panose="020B0604020202020204" pitchFamily="34" charset="0"/>
-              </a:rPr>
-              <a:t>como</a:t>
+              <a:t>e pueden escribir como</a:t>
             </a:r>
             <a:endParaRPr lang="es-ES" sz="900" dirty="0">
               <a:latin typeface="Arial" panose="020B0604020202020204" pitchFamily="34" charset="0"/>
@@ -8207,7 +7594,7 @@
         </p:nvCxnSpPr>
         <p:spPr>
           <a:xfrm flipV="1">
-            <a:off x="5616212" y="4951159"/>
+            <a:off x="5616212" y="4460131"/>
             <a:ext cx="6728" cy="150313"/>
           </a:xfrm>
           <a:prstGeom prst="line">
@@ -8242,7 +7629,7 @@
         </p:nvSpPr>
         <p:spPr>
           <a:xfrm>
-            <a:off x="4991399" y="5454991"/>
+            <a:off x="4991399" y="4963963"/>
             <a:ext cx="1246151" cy="353519"/>
           </a:xfrm>
           <a:prstGeom prst="rect">
@@ -8317,7 +7704,7 @@
         </p:nvCxnSpPr>
         <p:spPr>
           <a:xfrm flipH="1" flipV="1">
-            <a:off x="5607747" y="5332305"/>
+            <a:off x="5607747" y="4841277"/>
             <a:ext cx="6728" cy="122686"/>
           </a:xfrm>
           <a:prstGeom prst="line">
@@ -8352,7 +7739,7 @@
         </p:nvSpPr>
         <p:spPr>
           <a:xfrm>
-            <a:off x="4997749" y="5987554"/>
+            <a:off x="4997749" y="5496526"/>
             <a:ext cx="1246151" cy="711029"/>
           </a:xfrm>
           <a:prstGeom prst="rect">
@@ -8427,11 +7814,455 @@
         </p:nvCxnSpPr>
         <p:spPr>
           <a:xfrm flipH="1" flipV="1">
-            <a:off x="5614475" y="5808510"/>
+            <a:off x="5614475" y="5317482"/>
             <a:ext cx="6350" cy="179044"/>
           </a:xfrm>
           <a:prstGeom prst="line">
             <a:avLst/>
+          </a:prstGeom>
+          <a:ln w="12700">
+            <a:solidFill>
+              <a:schemeClr val="tx1"/>
+            </a:solidFill>
+          </a:ln>
+        </p:spPr>
+        <p:style>
+          <a:lnRef idx="1">
+            <a:schemeClr val="accent1"/>
+          </a:lnRef>
+          <a:fillRef idx="0">
+            <a:schemeClr val="accent1"/>
+          </a:fillRef>
+          <a:effectRef idx="0">
+            <a:schemeClr val="accent1"/>
+          </a:effectRef>
+          <a:fontRef idx="minor">
+            <a:schemeClr val="tx1"/>
+          </a:fontRef>
+        </p:style>
+      </p:cxnSp>
+      <p:cxnSp>
+        <p:nvCxnSpPr>
+          <p:cNvPr id="112" name="Conector angular 111"/>
+          <p:cNvCxnSpPr/>
+          <p:nvPr/>
+        </p:nvCxnSpPr>
+        <p:spPr>
+          <a:xfrm rot="5400000">
+            <a:off x="1945622" y="3331987"/>
+            <a:ext cx="259327" cy="2043"/>
+          </a:xfrm>
+          <a:prstGeom prst="bentConnector3">
+            <a:avLst>
+              <a:gd name="adj1" fmla="val 50000"/>
+            </a:avLst>
+          </a:prstGeom>
+          <a:ln w="12700">
+            <a:solidFill>
+              <a:schemeClr val="tx1"/>
+            </a:solidFill>
+          </a:ln>
+        </p:spPr>
+        <p:style>
+          <a:lnRef idx="1">
+            <a:schemeClr val="accent1"/>
+          </a:lnRef>
+          <a:fillRef idx="0">
+            <a:schemeClr val="accent1"/>
+          </a:fillRef>
+          <a:effectRef idx="0">
+            <a:schemeClr val="accent1"/>
+          </a:effectRef>
+          <a:fontRef idx="minor">
+            <a:schemeClr val="tx1"/>
+          </a:fontRef>
+        </p:style>
+      </p:cxnSp>
+      <p:cxnSp>
+        <p:nvCxnSpPr>
+          <p:cNvPr id="113" name="Conector angular 112"/>
+          <p:cNvCxnSpPr/>
+          <p:nvPr/>
+        </p:nvCxnSpPr>
+        <p:spPr>
+          <a:xfrm rot="5400000">
+            <a:off x="2732992" y="3315067"/>
+            <a:ext cx="259327" cy="2043"/>
+          </a:xfrm>
+          <a:prstGeom prst="bentConnector3">
+            <a:avLst>
+              <a:gd name="adj1" fmla="val 50000"/>
+            </a:avLst>
+          </a:prstGeom>
+          <a:ln w="12700">
+            <a:solidFill>
+              <a:schemeClr val="tx1"/>
+            </a:solidFill>
+          </a:ln>
+        </p:spPr>
+        <p:style>
+          <a:lnRef idx="1">
+            <a:schemeClr val="accent1"/>
+          </a:lnRef>
+          <a:fillRef idx="0">
+            <a:schemeClr val="accent1"/>
+          </a:fillRef>
+          <a:effectRef idx="0">
+            <a:schemeClr val="accent1"/>
+          </a:effectRef>
+          <a:fontRef idx="minor">
+            <a:schemeClr val="tx1"/>
+          </a:fontRef>
+        </p:style>
+      </p:cxnSp>
+      <p:cxnSp>
+        <p:nvCxnSpPr>
+          <p:cNvPr id="114" name="Conector angular 113"/>
+          <p:cNvCxnSpPr/>
+          <p:nvPr/>
+        </p:nvCxnSpPr>
+        <p:spPr>
+          <a:xfrm rot="5400000">
+            <a:off x="3554234" y="3332008"/>
+            <a:ext cx="259327" cy="2043"/>
+          </a:xfrm>
+          <a:prstGeom prst="bentConnector3">
+            <a:avLst>
+              <a:gd name="adj1" fmla="val 50000"/>
+            </a:avLst>
+          </a:prstGeom>
+          <a:ln w="12700">
+            <a:solidFill>
+              <a:schemeClr val="tx1"/>
+            </a:solidFill>
+          </a:ln>
+        </p:spPr>
+        <p:style>
+          <a:lnRef idx="1">
+            <a:schemeClr val="accent1"/>
+          </a:lnRef>
+          <a:fillRef idx="0">
+            <a:schemeClr val="accent1"/>
+          </a:fillRef>
+          <a:effectRef idx="0">
+            <a:schemeClr val="accent1"/>
+          </a:effectRef>
+          <a:fontRef idx="minor">
+            <a:schemeClr val="tx1"/>
+          </a:fontRef>
+        </p:style>
+      </p:cxnSp>
+      <p:sp>
+        <p:nvSpPr>
+          <p:cNvPr id="119" name="CuadroTexto 118" descr="Conector entre nodos"/>
+          <p:cNvSpPr txBox="1"/>
+          <p:nvPr/>
+        </p:nvSpPr>
+        <p:spPr>
+          <a:xfrm>
+            <a:off x="1642363" y="3422492"/>
+            <a:ext cx="774618" cy="230832"/>
+          </a:xfrm>
+          <a:prstGeom prst="rect">
+            <a:avLst/>
+          </a:prstGeom>
+          <a:noFill/>
+        </p:spPr>
+        <p:txBody>
+          <a:bodyPr wrap="square" rtlCol="0">
+            <a:spAutoFit/>
+          </a:bodyPr>
+          <a:lstStyle/>
+          <a:p>
+            <a:pPr algn="ctr"/>
+            <a:r>
+              <a:rPr lang="es-ES" sz="900" dirty="0" smtClean="0">
+                <a:latin typeface="Arial" panose="020B0604020202020204" pitchFamily="34" charset="0"/>
+                <a:cs typeface="Arial" panose="020B0604020202020204" pitchFamily="34" charset="0"/>
+              </a:rPr>
+              <a:t>cuando</a:t>
+            </a:r>
+            <a:endParaRPr lang="es-ES" sz="900" dirty="0">
+              <a:latin typeface="Arial" panose="020B0604020202020204" pitchFamily="34" charset="0"/>
+              <a:cs typeface="Arial" panose="020B0604020202020204" pitchFamily="34" charset="0"/>
+            </a:endParaRPr>
+          </a:p>
+        </p:txBody>
+      </p:sp>
+      <p:sp>
+        <p:nvSpPr>
+          <p:cNvPr id="120" name="CuadroTexto 119" descr="Conector entre nodos"/>
+          <p:cNvSpPr txBox="1"/>
+          <p:nvPr/>
+        </p:nvSpPr>
+        <p:spPr>
+          <a:xfrm>
+            <a:off x="2412801" y="3422502"/>
+            <a:ext cx="774618" cy="230832"/>
+          </a:xfrm>
+          <a:prstGeom prst="rect">
+            <a:avLst/>
+          </a:prstGeom>
+          <a:noFill/>
+        </p:spPr>
+        <p:txBody>
+          <a:bodyPr wrap="square" rtlCol="0">
+            <a:spAutoFit/>
+          </a:bodyPr>
+          <a:lstStyle/>
+          <a:p>
+            <a:pPr algn="ctr"/>
+            <a:r>
+              <a:rPr lang="es-ES" sz="900" dirty="0" smtClean="0">
+                <a:latin typeface="Arial" panose="020B0604020202020204" pitchFamily="34" charset="0"/>
+                <a:cs typeface="Arial" panose="020B0604020202020204" pitchFamily="34" charset="0"/>
+              </a:rPr>
+              <a:t>cuando</a:t>
+            </a:r>
+            <a:endParaRPr lang="es-ES" sz="900" dirty="0">
+              <a:latin typeface="Arial" panose="020B0604020202020204" pitchFamily="34" charset="0"/>
+              <a:cs typeface="Arial" panose="020B0604020202020204" pitchFamily="34" charset="0"/>
+            </a:endParaRPr>
+          </a:p>
+        </p:txBody>
+      </p:sp>
+      <p:sp>
+        <p:nvSpPr>
+          <p:cNvPr id="121" name="CuadroTexto 120" descr="Conector entre nodos"/>
+          <p:cNvSpPr txBox="1"/>
+          <p:nvPr/>
+        </p:nvSpPr>
+        <p:spPr>
+          <a:xfrm>
+            <a:off x="3250976" y="3422502"/>
+            <a:ext cx="774618" cy="230832"/>
+          </a:xfrm>
+          <a:prstGeom prst="rect">
+            <a:avLst/>
+          </a:prstGeom>
+          <a:noFill/>
+        </p:spPr>
+        <p:txBody>
+          <a:bodyPr wrap="square" rtlCol="0">
+            <a:spAutoFit/>
+          </a:bodyPr>
+          <a:lstStyle/>
+          <a:p>
+            <a:pPr algn="ctr"/>
+            <a:r>
+              <a:rPr lang="es-ES" sz="900" dirty="0" smtClean="0">
+                <a:latin typeface="Arial" panose="020B0604020202020204" pitchFamily="34" charset="0"/>
+                <a:cs typeface="Arial" panose="020B0604020202020204" pitchFamily="34" charset="0"/>
+              </a:rPr>
+              <a:t>cuando</a:t>
+            </a:r>
+            <a:endParaRPr lang="es-ES" sz="900" dirty="0">
+              <a:latin typeface="Arial" panose="020B0604020202020204" pitchFamily="34" charset="0"/>
+              <a:cs typeface="Arial" panose="020B0604020202020204" pitchFamily="34" charset="0"/>
+            </a:endParaRPr>
+          </a:p>
+        </p:txBody>
+      </p:sp>
+      <p:cxnSp>
+        <p:nvCxnSpPr>
+          <p:cNvPr id="122" name="Conector angular 121"/>
+          <p:cNvCxnSpPr/>
+          <p:nvPr/>
+        </p:nvCxnSpPr>
+        <p:spPr>
+          <a:xfrm rot="5400000">
+            <a:off x="1082060" y="3772222"/>
+            <a:ext cx="259327" cy="2043"/>
+          </a:xfrm>
+          <a:prstGeom prst="bentConnector3">
+            <a:avLst>
+              <a:gd name="adj1" fmla="val 50000"/>
+            </a:avLst>
+          </a:prstGeom>
+          <a:ln w="12700">
+            <a:solidFill>
+              <a:schemeClr val="tx1"/>
+            </a:solidFill>
+          </a:ln>
+        </p:spPr>
+        <p:style>
+          <a:lnRef idx="1">
+            <a:schemeClr val="accent1"/>
+          </a:lnRef>
+          <a:fillRef idx="0">
+            <a:schemeClr val="accent1"/>
+          </a:fillRef>
+          <a:effectRef idx="0">
+            <a:schemeClr val="accent1"/>
+          </a:effectRef>
+          <a:fontRef idx="minor">
+            <a:schemeClr val="tx1"/>
+          </a:fontRef>
+        </p:style>
+      </p:cxnSp>
+      <p:cxnSp>
+        <p:nvCxnSpPr>
+          <p:cNvPr id="123" name="Conector angular 122"/>
+          <p:cNvCxnSpPr/>
+          <p:nvPr/>
+        </p:nvCxnSpPr>
+        <p:spPr>
+          <a:xfrm rot="5400000">
+            <a:off x="1945634" y="3780697"/>
+            <a:ext cx="259327" cy="2043"/>
+          </a:xfrm>
+          <a:prstGeom prst="bentConnector3">
+            <a:avLst>
+              <a:gd name="adj1" fmla="val 50000"/>
+            </a:avLst>
+          </a:prstGeom>
+          <a:ln w="12700">
+            <a:solidFill>
+              <a:schemeClr val="tx1"/>
+            </a:solidFill>
+          </a:ln>
+        </p:spPr>
+        <p:style>
+          <a:lnRef idx="1">
+            <a:schemeClr val="accent1"/>
+          </a:lnRef>
+          <a:fillRef idx="0">
+            <a:schemeClr val="accent1"/>
+          </a:fillRef>
+          <a:effectRef idx="0">
+            <a:schemeClr val="accent1"/>
+          </a:effectRef>
+          <a:fontRef idx="minor">
+            <a:schemeClr val="tx1"/>
+          </a:fontRef>
+        </p:style>
+      </p:cxnSp>
+      <p:cxnSp>
+        <p:nvCxnSpPr>
+          <p:cNvPr id="124" name="Conector angular 123"/>
+          <p:cNvCxnSpPr/>
+          <p:nvPr/>
+        </p:nvCxnSpPr>
+        <p:spPr>
+          <a:xfrm rot="5400000">
+            <a:off x="2733004" y="3763777"/>
+            <a:ext cx="259327" cy="2043"/>
+          </a:xfrm>
+          <a:prstGeom prst="bentConnector3">
+            <a:avLst>
+              <a:gd name="adj1" fmla="val 50000"/>
+            </a:avLst>
+          </a:prstGeom>
+          <a:ln w="12700">
+            <a:solidFill>
+              <a:schemeClr val="tx1"/>
+            </a:solidFill>
+          </a:ln>
+        </p:spPr>
+        <p:style>
+          <a:lnRef idx="1">
+            <a:schemeClr val="accent1"/>
+          </a:lnRef>
+          <a:fillRef idx="0">
+            <a:schemeClr val="accent1"/>
+          </a:fillRef>
+          <a:effectRef idx="0">
+            <a:schemeClr val="accent1"/>
+          </a:effectRef>
+          <a:fontRef idx="minor">
+            <a:schemeClr val="tx1"/>
+          </a:fontRef>
+        </p:style>
+      </p:cxnSp>
+      <p:cxnSp>
+        <p:nvCxnSpPr>
+          <p:cNvPr id="125" name="Conector angular 124"/>
+          <p:cNvCxnSpPr/>
+          <p:nvPr/>
+        </p:nvCxnSpPr>
+        <p:spPr>
+          <a:xfrm rot="5400000">
+            <a:off x="3554246" y="3780718"/>
+            <a:ext cx="259327" cy="2043"/>
+          </a:xfrm>
+          <a:prstGeom prst="bentConnector3">
+            <a:avLst>
+              <a:gd name="adj1" fmla="val 50000"/>
+            </a:avLst>
+          </a:prstGeom>
+          <a:ln w="12700">
+            <a:solidFill>
+              <a:schemeClr val="tx1"/>
+            </a:solidFill>
+          </a:ln>
+        </p:spPr>
+        <p:style>
+          <a:lnRef idx="1">
+            <a:schemeClr val="accent1"/>
+          </a:lnRef>
+          <a:fillRef idx="0">
+            <a:schemeClr val="accent1"/>
+          </a:fillRef>
+          <a:effectRef idx="0">
+            <a:schemeClr val="accent1"/>
+          </a:effectRef>
+          <a:fontRef idx="minor">
+            <a:schemeClr val="tx1"/>
+          </a:fontRef>
+        </p:style>
+      </p:cxnSp>
+      <p:cxnSp>
+        <p:nvCxnSpPr>
+          <p:cNvPr id="126" name="Conector angular 125"/>
+          <p:cNvCxnSpPr/>
+          <p:nvPr/>
+        </p:nvCxnSpPr>
+        <p:spPr>
+          <a:xfrm rot="5400000">
+            <a:off x="4614571" y="3311560"/>
+            <a:ext cx="238815" cy="1"/>
+          </a:xfrm>
+          <a:prstGeom prst="bentConnector3">
+            <a:avLst>
+              <a:gd name="adj1" fmla="val 50000"/>
+            </a:avLst>
+          </a:prstGeom>
+          <a:ln w="12700">
+            <a:solidFill>
+              <a:schemeClr val="tx1"/>
+            </a:solidFill>
+          </a:ln>
+        </p:spPr>
+        <p:style>
+          <a:lnRef idx="1">
+            <a:schemeClr val="accent1"/>
+          </a:lnRef>
+          <a:fillRef idx="0">
+            <a:schemeClr val="accent1"/>
+          </a:fillRef>
+          <a:effectRef idx="0">
+            <a:schemeClr val="accent1"/>
+          </a:effectRef>
+          <a:fontRef idx="minor">
+            <a:schemeClr val="tx1"/>
+          </a:fontRef>
+        </p:style>
+      </p:cxnSp>
+      <p:cxnSp>
+        <p:nvCxnSpPr>
+          <p:cNvPr id="127" name="Conector angular 126"/>
+          <p:cNvCxnSpPr/>
+          <p:nvPr/>
+        </p:nvCxnSpPr>
+        <p:spPr>
+          <a:xfrm rot="5400000">
+            <a:off x="6494108" y="3328501"/>
+            <a:ext cx="238815" cy="1"/>
+          </a:xfrm>
+          <a:prstGeom prst="bentConnector3">
+            <a:avLst>
+              <a:gd name="adj1" fmla="val 50000"/>
+            </a:avLst>
           </a:prstGeom>
           <a:ln w="12700">
             <a:solidFill>
@@ -8729,7 +8560,7 @@
   <a:extraClrSchemeLst/>
   <a:extLst>
     <a:ext uri="{05A4C25C-085E-4340-85A3-A5531E510DB2}">
-      <thm15:themeFamily xmlns="" xmlns:thm15="http://schemas.microsoft.com/office/thememl/2012/main" name="Office Theme" id="{62F939B6-93AF-4DB8-9C6B-D6C7DFDC589F}" vid="{4A3C46E8-61CC-4603-A589-7422A47A8E4A}"/>
+      <thm15:themeFamily xmlns:thm15="http://schemas.microsoft.com/office/thememl/2012/main" xmlns="" name="Office Theme" id="{62F939B6-93AF-4DB8-9C6B-D6C7DFDC589F}" vid="{4A3C46E8-61CC-4603-A589-7422A47A8E4A}"/>
     </a:ext>
   </a:extLst>
 </a:theme>

</xml_diff>

<commit_message>
Mapa Tema 05 sexto
Ajusto de mapa
</commit_message>
<xml_diff>
--- a/fuentes/contenidos/grado06/guion05/MA_06_05_CO_MapaConceptual.pptx
+++ b/fuentes/contenidos/grado06/guion05/MA_06_05_CO_MapaConceptual.pptx
@@ -106,7 +106,7 @@
   </p:defaultTextStyle>
   <p:extLst>
     <p:ext uri="{EFAFB233-063F-42B5-8137-9DF3F51BA10A}">
-      <p15:sldGuideLst xmlns:p15="http://schemas.microsoft.com/office/powerpoint/2012/main" xmlns=""/>
+      <p15:sldGuideLst xmlns="" xmlns:p15="http://schemas.microsoft.com/office/powerpoint/2012/main"/>
     </p:ext>
   </p:extLst>
 </p:presentation>
@@ -8560,7 +8560,7 @@
   <a:extraClrSchemeLst/>
   <a:extLst>
     <a:ext uri="{05A4C25C-085E-4340-85A3-A5531E510DB2}">
-      <thm15:themeFamily xmlns:thm15="http://schemas.microsoft.com/office/thememl/2012/main" xmlns="" name="Office Theme" id="{62F939B6-93AF-4DB8-9C6B-D6C7DFDC589F}" vid="{4A3C46E8-61CC-4603-A589-7422A47A8E4A}"/>
+      <thm15:themeFamily xmlns="" xmlns:thm15="http://schemas.microsoft.com/office/thememl/2012/main" name="Office Theme" id="{62F939B6-93AF-4DB8-9C6B-D6C7DFDC589F}" vid="{4A3C46E8-61CC-4603-A589-7422A47A8E4A}"/>
     </a:ext>
   </a:extLst>
 </a:theme>

</xml_diff>

<commit_message>
Revisión de mapa conceptual mat 6 tema 5
</commit_message>
<xml_diff>
--- a/fuentes/contenidos/grado06/guion05/MA_06_05_CO_MapaConceptual.pptx
+++ b/fuentes/contenidos/grado06/guion05/MA_06_05_CO_MapaConceptual.pptx
@@ -4,6 +4,9 @@
   <p:sldMasterIdLst>
     <p:sldMasterId id="2147483672" r:id="rId1"/>
   </p:sldMasterIdLst>
+  <p:notesMasterIdLst>
+    <p:notesMasterId r:id="rId3"/>
+  </p:notesMasterIdLst>
   <p:sldIdLst>
     <p:sldId id="257" r:id="rId2"/>
   </p:sldIdLst>
@@ -106,10 +109,371 @@
   </p:defaultTextStyle>
   <p:extLst>
     <p:ext uri="{EFAFB233-063F-42B5-8137-9DF3F51BA10A}">
-      <p15:sldGuideLst xmlns="" xmlns:p15="http://schemas.microsoft.com/office/powerpoint/2012/main"/>
+      <p15:sldGuideLst xmlns:p15="http://schemas.microsoft.com/office/powerpoint/2012/main">
+        <p15:guide id="1" orient="horz" pos="2834">
+          <p15:clr>
+            <a:srgbClr val="A4A3A4"/>
+          </p15:clr>
+        </p15:guide>
+        <p15:guide id="2" pos="4535">
+          <p15:clr>
+            <a:srgbClr val="A4A3A4"/>
+          </p15:clr>
+        </p15:guide>
+      </p15:sldGuideLst>
     </p:ext>
   </p:extLst>
 </p:presentation>
+</file>
+
+<file path=ppt/notesMasters/notesMaster1.xml><?xml version="1.0" encoding="utf-8"?>
+<p:notesMaster xmlns:a="http://schemas.openxmlformats.org/drawingml/2006/main" xmlns:r="http://schemas.openxmlformats.org/officeDocument/2006/relationships" xmlns:p="http://schemas.openxmlformats.org/presentationml/2006/main">
+  <p:cSld>
+    <p:bg>
+      <p:bgRef idx="1001">
+        <a:schemeClr val="bg1"/>
+      </p:bgRef>
+    </p:bg>
+    <p:spTree>
+      <p:nvGrpSpPr>
+        <p:cNvPr id="1" name=""/>
+        <p:cNvGrpSpPr/>
+        <p:nvPr/>
+      </p:nvGrpSpPr>
+      <p:grpSpPr>
+        <a:xfrm>
+          <a:off x="0" y="0"/>
+          <a:ext cx="0" cy="0"/>
+          <a:chOff x="0" y="0"/>
+          <a:chExt cx="0" cy="0"/>
+        </a:xfrm>
+      </p:grpSpPr>
+      <p:sp>
+        <p:nvSpPr>
+          <p:cNvPr id="2" name="Marcador de encabezado 1"/>
+          <p:cNvSpPr>
+            <a:spLocks noGrp="1"/>
+          </p:cNvSpPr>
+          <p:nvPr>
+            <p:ph type="hdr" sz="quarter"/>
+          </p:nvPr>
+        </p:nvSpPr>
+        <p:spPr>
+          <a:xfrm>
+            <a:off x="0" y="0"/>
+            <a:ext cx="2944813" cy="496888"/>
+          </a:xfrm>
+          <a:prstGeom prst="rect">
+            <a:avLst/>
+          </a:prstGeom>
+        </p:spPr>
+        <p:txBody>
+          <a:bodyPr vert="horz" lIns="91440" tIns="45720" rIns="91440" bIns="45720" rtlCol="0"/>
+          <a:lstStyle>
+            <a:lvl1pPr algn="l">
+              <a:defRPr sz="1200"/>
+            </a:lvl1pPr>
+          </a:lstStyle>
+          <a:p>
+            <a:endParaRPr lang="es-CO"/>
+          </a:p>
+        </p:txBody>
+      </p:sp>
+      <p:sp>
+        <p:nvSpPr>
+          <p:cNvPr id="3" name="Marcador de fecha 2"/>
+          <p:cNvSpPr>
+            <a:spLocks noGrp="1"/>
+          </p:cNvSpPr>
+          <p:nvPr>
+            <p:ph type="dt" idx="1"/>
+          </p:nvPr>
+        </p:nvSpPr>
+        <p:spPr>
+          <a:xfrm>
+            <a:off x="3848100" y="0"/>
+            <a:ext cx="2944813" cy="496888"/>
+          </a:xfrm>
+          <a:prstGeom prst="rect">
+            <a:avLst/>
+          </a:prstGeom>
+        </p:spPr>
+        <p:txBody>
+          <a:bodyPr vert="horz" lIns="91440" tIns="45720" rIns="91440" bIns="45720" rtlCol="0"/>
+          <a:lstStyle>
+            <a:lvl1pPr algn="r">
+              <a:defRPr sz="1200"/>
+            </a:lvl1pPr>
+          </a:lstStyle>
+          <a:p>
+            <a:fld id="{D68BE78D-F83B-4DE7-824E-1B8806EC0F75}" type="datetimeFigureOut">
+              <a:rPr lang="es-CO" smtClean="0"/>
+              <a:t>07/12/2015</a:t>
+            </a:fld>
+            <a:endParaRPr lang="es-CO"/>
+          </a:p>
+        </p:txBody>
+      </p:sp>
+      <p:sp>
+        <p:nvSpPr>
+          <p:cNvPr id="4" name="Marcador de imagen de diapositiva 3"/>
+          <p:cNvSpPr>
+            <a:spLocks noGrp="1" noRot="1" noChangeAspect="1"/>
+          </p:cNvSpPr>
+          <p:nvPr>
+            <p:ph type="sldImg" idx="2"/>
+          </p:nvPr>
+        </p:nvSpPr>
+        <p:spPr>
+          <a:xfrm>
+            <a:off x="719138" y="1239838"/>
+            <a:ext cx="5356225" cy="3348037"/>
+          </a:xfrm>
+          <a:prstGeom prst="rect">
+            <a:avLst/>
+          </a:prstGeom>
+          <a:noFill/>
+          <a:ln w="12700">
+            <a:solidFill>
+              <a:prstClr val="black"/>
+            </a:solidFill>
+          </a:ln>
+        </p:spPr>
+        <p:txBody>
+          <a:bodyPr vert="horz" lIns="91440" tIns="45720" rIns="91440" bIns="45720" rtlCol="0" anchor="ctr"/>
+          <a:lstStyle/>
+          <a:p>
+            <a:endParaRPr lang="es-CO"/>
+          </a:p>
+        </p:txBody>
+      </p:sp>
+      <p:sp>
+        <p:nvSpPr>
+          <p:cNvPr id="5" name="Marcador de notas 4"/>
+          <p:cNvSpPr>
+            <a:spLocks noGrp="1"/>
+          </p:cNvSpPr>
+          <p:nvPr>
+            <p:ph type="body" sz="quarter" idx="3"/>
+          </p:nvPr>
+        </p:nvSpPr>
+        <p:spPr>
+          <a:xfrm>
+            <a:off x="679450" y="4773613"/>
+            <a:ext cx="5435600" cy="3905250"/>
+          </a:xfrm>
+          <a:prstGeom prst="rect">
+            <a:avLst/>
+          </a:prstGeom>
+        </p:spPr>
+        <p:txBody>
+          <a:bodyPr vert="horz" lIns="91440" tIns="45720" rIns="91440" bIns="45720" rtlCol="0"/>
+          <a:lstStyle/>
+          <a:p>
+            <a:pPr lvl="0"/>
+            <a:r>
+              <a:rPr lang="es-ES" smtClean="0"/>
+              <a:t>Haga clic para modificar el estilo de texto del patrón</a:t>
+            </a:r>
+          </a:p>
+          <a:p>
+            <a:pPr lvl="1"/>
+            <a:r>
+              <a:rPr lang="es-ES" smtClean="0"/>
+              <a:t>Segundo nivel</a:t>
+            </a:r>
+          </a:p>
+          <a:p>
+            <a:pPr lvl="2"/>
+            <a:r>
+              <a:rPr lang="es-ES" smtClean="0"/>
+              <a:t>Tercer nivel</a:t>
+            </a:r>
+          </a:p>
+          <a:p>
+            <a:pPr lvl="3"/>
+            <a:r>
+              <a:rPr lang="es-ES" smtClean="0"/>
+              <a:t>Cuarto nivel</a:t>
+            </a:r>
+          </a:p>
+          <a:p>
+            <a:pPr lvl="4"/>
+            <a:r>
+              <a:rPr lang="es-ES" smtClean="0"/>
+              <a:t>Quinto nivel</a:t>
+            </a:r>
+            <a:endParaRPr lang="es-CO"/>
+          </a:p>
+        </p:txBody>
+      </p:sp>
+      <p:sp>
+        <p:nvSpPr>
+          <p:cNvPr id="6" name="Marcador de pie de página 5"/>
+          <p:cNvSpPr>
+            <a:spLocks noGrp="1"/>
+          </p:cNvSpPr>
+          <p:nvPr>
+            <p:ph type="ftr" sz="quarter" idx="4"/>
+          </p:nvPr>
+        </p:nvSpPr>
+        <p:spPr>
+          <a:xfrm>
+            <a:off x="0" y="9421813"/>
+            <a:ext cx="2944813" cy="496887"/>
+          </a:xfrm>
+          <a:prstGeom prst="rect">
+            <a:avLst/>
+          </a:prstGeom>
+        </p:spPr>
+        <p:txBody>
+          <a:bodyPr vert="horz" lIns="91440" tIns="45720" rIns="91440" bIns="45720" rtlCol="0" anchor="b"/>
+          <a:lstStyle>
+            <a:lvl1pPr algn="l">
+              <a:defRPr sz="1200"/>
+            </a:lvl1pPr>
+          </a:lstStyle>
+          <a:p>
+            <a:endParaRPr lang="es-CO"/>
+          </a:p>
+        </p:txBody>
+      </p:sp>
+      <p:sp>
+        <p:nvSpPr>
+          <p:cNvPr id="7" name="Marcador de número de diapositiva 6"/>
+          <p:cNvSpPr>
+            <a:spLocks noGrp="1"/>
+          </p:cNvSpPr>
+          <p:nvPr>
+            <p:ph type="sldNum" sz="quarter" idx="5"/>
+          </p:nvPr>
+        </p:nvSpPr>
+        <p:spPr>
+          <a:xfrm>
+            <a:off x="3848100" y="9421813"/>
+            <a:ext cx="2944813" cy="496887"/>
+          </a:xfrm>
+          <a:prstGeom prst="rect">
+            <a:avLst/>
+          </a:prstGeom>
+        </p:spPr>
+        <p:txBody>
+          <a:bodyPr vert="horz" lIns="91440" tIns="45720" rIns="91440" bIns="45720" rtlCol="0" anchor="b"/>
+          <a:lstStyle>
+            <a:lvl1pPr algn="r">
+              <a:defRPr sz="1200"/>
+            </a:lvl1pPr>
+          </a:lstStyle>
+          <a:p>
+            <a:fld id="{564031D4-5B74-43BB-9D54-9499A72B8998}" type="slidenum">
+              <a:rPr lang="es-CO" smtClean="0"/>
+              <a:t>‹Nº›</a:t>
+            </a:fld>
+            <a:endParaRPr lang="es-CO"/>
+          </a:p>
+        </p:txBody>
+      </p:sp>
+    </p:spTree>
+    <p:extLst>
+      <p:ext uri="{BB962C8B-B14F-4D97-AF65-F5344CB8AC3E}">
+        <p14:creationId xmlns:p14="http://schemas.microsoft.com/office/powerpoint/2010/main" val="3050541604"/>
+      </p:ext>
+    </p:extLst>
+  </p:cSld>
+  <p:clrMap bg1="lt1" tx1="dk1" bg2="lt2" tx2="dk2" accent1="accent1" accent2="accent2" accent3="accent3" accent4="accent4" accent5="accent5" accent6="accent6" hlink="hlink" folHlink="folHlink"/>
+  <p:notesStyle>
+    <a:lvl1pPr marL="0" algn="l" defTabSz="914400" rtl="0" eaLnBrk="1" latinLnBrk="0" hangingPunct="1">
+      <a:defRPr sz="1200" kern="1200">
+        <a:solidFill>
+          <a:schemeClr val="tx1"/>
+        </a:solidFill>
+        <a:latin typeface="+mn-lt"/>
+        <a:ea typeface="+mn-ea"/>
+        <a:cs typeface="+mn-cs"/>
+      </a:defRPr>
+    </a:lvl1pPr>
+    <a:lvl2pPr marL="457200" algn="l" defTabSz="914400" rtl="0" eaLnBrk="1" latinLnBrk="0" hangingPunct="1">
+      <a:defRPr sz="1200" kern="1200">
+        <a:solidFill>
+          <a:schemeClr val="tx1"/>
+        </a:solidFill>
+        <a:latin typeface="+mn-lt"/>
+        <a:ea typeface="+mn-ea"/>
+        <a:cs typeface="+mn-cs"/>
+      </a:defRPr>
+    </a:lvl2pPr>
+    <a:lvl3pPr marL="914400" algn="l" defTabSz="914400" rtl="0" eaLnBrk="1" latinLnBrk="0" hangingPunct="1">
+      <a:defRPr sz="1200" kern="1200">
+        <a:solidFill>
+          <a:schemeClr val="tx1"/>
+        </a:solidFill>
+        <a:latin typeface="+mn-lt"/>
+        <a:ea typeface="+mn-ea"/>
+        <a:cs typeface="+mn-cs"/>
+      </a:defRPr>
+    </a:lvl3pPr>
+    <a:lvl4pPr marL="1371600" algn="l" defTabSz="914400" rtl="0" eaLnBrk="1" latinLnBrk="0" hangingPunct="1">
+      <a:defRPr sz="1200" kern="1200">
+        <a:solidFill>
+          <a:schemeClr val="tx1"/>
+        </a:solidFill>
+        <a:latin typeface="+mn-lt"/>
+        <a:ea typeface="+mn-ea"/>
+        <a:cs typeface="+mn-cs"/>
+      </a:defRPr>
+    </a:lvl4pPr>
+    <a:lvl5pPr marL="1828800" algn="l" defTabSz="914400" rtl="0" eaLnBrk="1" latinLnBrk="0" hangingPunct="1">
+      <a:defRPr sz="1200" kern="1200">
+        <a:solidFill>
+          <a:schemeClr val="tx1"/>
+        </a:solidFill>
+        <a:latin typeface="+mn-lt"/>
+        <a:ea typeface="+mn-ea"/>
+        <a:cs typeface="+mn-cs"/>
+      </a:defRPr>
+    </a:lvl5pPr>
+    <a:lvl6pPr marL="2286000" algn="l" defTabSz="914400" rtl="0" eaLnBrk="1" latinLnBrk="0" hangingPunct="1">
+      <a:defRPr sz="1200" kern="1200">
+        <a:solidFill>
+          <a:schemeClr val="tx1"/>
+        </a:solidFill>
+        <a:latin typeface="+mn-lt"/>
+        <a:ea typeface="+mn-ea"/>
+        <a:cs typeface="+mn-cs"/>
+      </a:defRPr>
+    </a:lvl6pPr>
+    <a:lvl7pPr marL="2743200" algn="l" defTabSz="914400" rtl="0" eaLnBrk="1" latinLnBrk="0" hangingPunct="1">
+      <a:defRPr sz="1200" kern="1200">
+        <a:solidFill>
+          <a:schemeClr val="tx1"/>
+        </a:solidFill>
+        <a:latin typeface="+mn-lt"/>
+        <a:ea typeface="+mn-ea"/>
+        <a:cs typeface="+mn-cs"/>
+      </a:defRPr>
+    </a:lvl7pPr>
+    <a:lvl8pPr marL="3200400" algn="l" defTabSz="914400" rtl="0" eaLnBrk="1" latinLnBrk="0" hangingPunct="1">
+      <a:defRPr sz="1200" kern="1200">
+        <a:solidFill>
+          <a:schemeClr val="tx1"/>
+        </a:solidFill>
+        <a:latin typeface="+mn-lt"/>
+        <a:ea typeface="+mn-ea"/>
+        <a:cs typeface="+mn-cs"/>
+      </a:defRPr>
+    </a:lvl8pPr>
+    <a:lvl9pPr marL="3657600" algn="l" defTabSz="914400" rtl="0" eaLnBrk="1" latinLnBrk="0" hangingPunct="1">
+      <a:defRPr sz="1200" kern="1200">
+        <a:solidFill>
+          <a:schemeClr val="tx1"/>
+        </a:solidFill>
+        <a:latin typeface="+mn-lt"/>
+        <a:ea typeface="+mn-ea"/>
+        <a:cs typeface="+mn-cs"/>
+      </a:defRPr>
+    </a:lvl9pPr>
+  </p:notesStyle>
+</p:notesMaster>
 </file>
 
 <file path=ppt/slideLayouts/slideLayout1.xml><?xml version="1.0" encoding="utf-8"?>
@@ -244,7 +608,7 @@
             <a:fld id="{C764DE79-268F-4C1A-8933-263129D2AF90}" type="datetimeFigureOut">
               <a:rPr lang="en-US" dirty="0"/>
               <a:pPr/>
-              <a:t>27/11/15</a:t>
+              <a:t>12/7/2015</a:t>
             </a:fld>
             <a:endParaRPr lang="en-US" dirty="0"/>
           </a:p>
@@ -287,7 +651,7 @@
             <a:fld id="{48F63A3B-78C7-47BE-AE5E-E10140E04643}" type="slidenum">
               <a:rPr lang="en-US" dirty="0"/>
               <a:pPr/>
-              <a:t>‹Nr.›</a:t>
+              <a:t>‹Nº›</a:t>
             </a:fld>
             <a:endParaRPr lang="en-US" dirty="0"/>
           </a:p>
@@ -416,7 +780,7 @@
             <a:fld id="{C764DE79-268F-4C1A-8933-263129D2AF90}" type="datetimeFigureOut">
               <a:rPr lang="en-US" dirty="0"/>
               <a:pPr/>
-              <a:t>27/11/15</a:t>
+              <a:t>12/7/2015</a:t>
             </a:fld>
             <a:endParaRPr lang="en-US" dirty="0"/>
           </a:p>
@@ -459,7 +823,7 @@
             <a:fld id="{48F63A3B-78C7-47BE-AE5E-E10140E04643}" type="slidenum">
               <a:rPr lang="en-US" dirty="0"/>
               <a:pPr/>
-              <a:t>‹Nr.›</a:t>
+              <a:t>‹Nº›</a:t>
             </a:fld>
             <a:endParaRPr lang="en-US" dirty="0"/>
           </a:p>
@@ -598,7 +962,7 @@
             <a:fld id="{C764DE79-268F-4C1A-8933-263129D2AF90}" type="datetimeFigureOut">
               <a:rPr lang="en-US" dirty="0"/>
               <a:pPr/>
-              <a:t>27/11/15</a:t>
+              <a:t>12/7/2015</a:t>
             </a:fld>
             <a:endParaRPr lang="en-US" dirty="0"/>
           </a:p>
@@ -641,7 +1005,7 @@
             <a:fld id="{48F63A3B-78C7-47BE-AE5E-E10140E04643}" type="slidenum">
               <a:rPr lang="en-US" dirty="0"/>
               <a:pPr/>
-              <a:t>‹Nr.›</a:t>
+              <a:t>‹Nº›</a:t>
             </a:fld>
             <a:endParaRPr lang="en-US" dirty="0"/>
           </a:p>
@@ -690,7 +1054,7 @@
   <p:timing>
     <p:tnLst>
       <p:par>
-        <p:cTn xmlns:p14="http://schemas.microsoft.com/office/powerpoint/2010/main" id="1" dur="indefinite" restart="never" nodeType="tmRoot"/>
+        <p:cTn id="1" dur="indefinite" restart="never" nodeType="tmRoot"/>
       </p:par>
     </p:tnLst>
   </p:timing>
@@ -727,7 +1091,7 @@
   <p:timing>
     <p:tnLst>
       <p:par>
-        <p:cTn xmlns:p14="http://schemas.microsoft.com/office/powerpoint/2010/main" id="1" dur="indefinite" restart="never" nodeType="tmRoot"/>
+        <p:cTn id="1" dur="indefinite" restart="never" nodeType="tmRoot"/>
       </p:par>
     </p:tnLst>
   </p:timing>
@@ -764,7 +1128,7 @@
   <p:timing>
     <p:tnLst>
       <p:par>
-        <p:cTn xmlns:p14="http://schemas.microsoft.com/office/powerpoint/2010/main" id="1" dur="indefinite" restart="never" nodeType="tmRoot"/>
+        <p:cTn id="1" dur="indefinite" restart="never" nodeType="tmRoot"/>
       </p:par>
     </p:tnLst>
   </p:timing>
@@ -801,7 +1165,7 @@
   <p:timing>
     <p:tnLst>
       <p:par>
-        <p:cTn xmlns:p14="http://schemas.microsoft.com/office/powerpoint/2010/main" id="1" dur="indefinite" restart="never" nodeType="tmRoot"/>
+        <p:cTn id="1" dur="indefinite" restart="never" nodeType="tmRoot"/>
       </p:par>
     </p:tnLst>
   </p:timing>
@@ -838,7 +1202,7 @@
   <p:timing>
     <p:tnLst>
       <p:par>
-        <p:cTn xmlns:p14="http://schemas.microsoft.com/office/powerpoint/2010/main" id="1" dur="indefinite" restart="never" nodeType="tmRoot"/>
+        <p:cTn id="1" dur="indefinite" restart="never" nodeType="tmRoot"/>
       </p:par>
     </p:tnLst>
   </p:timing>
@@ -875,7 +1239,7 @@
   <p:timing>
     <p:tnLst>
       <p:par>
-        <p:cTn xmlns:p14="http://schemas.microsoft.com/office/powerpoint/2010/main" id="1" dur="indefinite" restart="never" nodeType="tmRoot"/>
+        <p:cTn id="1" dur="indefinite" restart="never" nodeType="tmRoot"/>
       </p:par>
     </p:tnLst>
   </p:timing>
@@ -912,7 +1276,7 @@
   <p:timing>
     <p:tnLst>
       <p:par>
-        <p:cTn xmlns:p14="http://schemas.microsoft.com/office/powerpoint/2010/main" id="1" dur="indefinite" restart="never" nodeType="tmRoot"/>
+        <p:cTn id="1" dur="indefinite" restart="never" nodeType="tmRoot"/>
       </p:par>
     </p:tnLst>
   </p:timing>
@@ -949,7 +1313,7 @@
   <p:timing>
     <p:tnLst>
       <p:par>
-        <p:cTn xmlns:p14="http://schemas.microsoft.com/office/powerpoint/2010/main" id="1" dur="indefinite" restart="never" nodeType="tmRoot"/>
+        <p:cTn id="1" dur="indefinite" restart="never" nodeType="tmRoot"/>
       </p:par>
     </p:tnLst>
   </p:timing>
@@ -1066,7 +1430,7 @@
             <a:fld id="{C764DE79-268F-4C1A-8933-263129D2AF90}" type="datetimeFigureOut">
               <a:rPr lang="en-US" dirty="0"/>
               <a:pPr/>
-              <a:t>27/11/15</a:t>
+              <a:t>12/7/2015</a:t>
             </a:fld>
             <a:endParaRPr lang="en-US" dirty="0"/>
           </a:p>
@@ -1109,7 +1473,7 @@
             <a:fld id="{48F63A3B-78C7-47BE-AE5E-E10140E04643}" type="slidenum">
               <a:rPr lang="en-US" dirty="0"/>
               <a:pPr/>
-              <a:t>‹Nr.›</a:t>
+              <a:t>‹Nº›</a:t>
             </a:fld>
             <a:endParaRPr lang="en-US" dirty="0"/>
           </a:p>
@@ -1158,7 +1522,7 @@
   <p:timing>
     <p:tnLst>
       <p:par>
-        <p:cTn xmlns:p14="http://schemas.microsoft.com/office/powerpoint/2010/main" id="1" dur="indefinite" restart="never" nodeType="tmRoot"/>
+        <p:cTn id="1" dur="indefinite" restart="never" nodeType="tmRoot"/>
       </p:par>
     </p:tnLst>
   </p:timing>
@@ -1195,7 +1559,7 @@
   <p:timing>
     <p:tnLst>
       <p:par>
-        <p:cTn xmlns:p14="http://schemas.microsoft.com/office/powerpoint/2010/main" id="1" dur="indefinite" restart="never" nodeType="tmRoot"/>
+        <p:cTn id="1" dur="indefinite" restart="never" nodeType="tmRoot"/>
       </p:par>
     </p:tnLst>
   </p:timing>
@@ -1388,7 +1752,7 @@
             <a:fld id="{C764DE79-268F-4C1A-8933-263129D2AF90}" type="datetimeFigureOut">
               <a:rPr lang="en-US" dirty="0"/>
               <a:pPr/>
-              <a:t>27/11/15</a:t>
+              <a:t>12/7/2015</a:t>
             </a:fld>
             <a:endParaRPr lang="en-US" dirty="0"/>
           </a:p>
@@ -1431,7 +1795,7 @@
             <a:fld id="{48F63A3B-78C7-47BE-AE5E-E10140E04643}" type="slidenum">
               <a:rPr lang="en-US" dirty="0"/>
               <a:pPr/>
-              <a:t>‹Nr.›</a:t>
+              <a:t>‹Nº›</a:t>
             </a:fld>
             <a:endParaRPr lang="en-US" dirty="0"/>
           </a:p>
@@ -1622,7 +1986,7 @@
             <a:fld id="{C764DE79-268F-4C1A-8933-263129D2AF90}" type="datetimeFigureOut">
               <a:rPr lang="en-US" dirty="0"/>
               <a:pPr/>
-              <a:t>27/11/15</a:t>
+              <a:t>12/7/2015</a:t>
             </a:fld>
             <a:endParaRPr lang="en-US" dirty="0"/>
           </a:p>
@@ -1665,7 +2029,7 @@
             <a:fld id="{48F63A3B-78C7-47BE-AE5E-E10140E04643}" type="slidenum">
               <a:rPr lang="en-US" dirty="0"/>
               <a:pPr/>
-              <a:t>‹Nr.›</a:t>
+              <a:t>‹Nº›</a:t>
             </a:fld>
             <a:endParaRPr lang="en-US" dirty="0"/>
           </a:p>
@@ -1991,7 +2355,7 @@
             <a:fld id="{C764DE79-268F-4C1A-8933-263129D2AF90}" type="datetimeFigureOut">
               <a:rPr lang="en-US" dirty="0"/>
               <a:pPr/>
-              <a:t>27/11/15</a:t>
+              <a:t>12/7/2015</a:t>
             </a:fld>
             <a:endParaRPr lang="en-US" dirty="0"/>
           </a:p>
@@ -2034,7 +2398,7 @@
             <a:fld id="{48F63A3B-78C7-47BE-AE5E-E10140E04643}" type="slidenum">
               <a:rPr lang="en-US" dirty="0"/>
               <a:pPr/>
-              <a:t>‹Nr.›</a:t>
+              <a:t>‹Nº›</a:t>
             </a:fld>
             <a:endParaRPr lang="en-US" dirty="0"/>
           </a:p>
@@ -2111,7 +2475,7 @@
             <a:fld id="{C764DE79-268F-4C1A-8933-263129D2AF90}" type="datetimeFigureOut">
               <a:rPr lang="en-US" dirty="0"/>
               <a:pPr/>
-              <a:t>27/11/15</a:t>
+              <a:t>12/7/2015</a:t>
             </a:fld>
             <a:endParaRPr lang="en-US" dirty="0"/>
           </a:p>
@@ -2154,7 +2518,7 @@
             <a:fld id="{48F63A3B-78C7-47BE-AE5E-E10140E04643}" type="slidenum">
               <a:rPr lang="en-US" dirty="0"/>
               <a:pPr/>
-              <a:t>‹Nr.›</a:t>
+              <a:t>‹Nº›</a:t>
             </a:fld>
             <a:endParaRPr lang="en-US" dirty="0"/>
           </a:p>
@@ -2208,7 +2572,7 @@
             <a:fld id="{5001C876-01F7-4317-94B9-1AE222133113}" type="datetimeFigureOut">
               <a:rPr lang="es-ES" smtClean="0"/>
               <a:pPr/>
-              <a:t>27/11/15</a:t>
+              <a:t>07/12/2015</a:t>
             </a:fld>
             <a:endParaRPr lang="es-ES"/>
           </a:p>
@@ -2251,7 +2615,7 @@
             <a:fld id="{58140F73-F5A2-4B82-A2FA-BF1850CF1309}" type="slidenum">
               <a:rPr lang="es-ES" smtClean="0"/>
               <a:pPr/>
-              <a:t>‹Nr.›</a:t>
+              <a:t>‹Nº›</a:t>
             </a:fld>
             <a:endParaRPr lang="es-ES"/>
           </a:p>
@@ -2487,7 +2851,7 @@
             <a:fld id="{C764DE79-268F-4C1A-8933-263129D2AF90}" type="datetimeFigureOut">
               <a:rPr lang="en-US" dirty="0"/>
               <a:pPr/>
-              <a:t>27/11/15</a:t>
+              <a:t>12/7/2015</a:t>
             </a:fld>
             <a:endParaRPr lang="en-US" dirty="0"/>
           </a:p>
@@ -2530,7 +2894,7 @@
             <a:fld id="{48F63A3B-78C7-47BE-AE5E-E10140E04643}" type="slidenum">
               <a:rPr lang="en-US" dirty="0"/>
               <a:pPr/>
-              <a:t>‹Nr.›</a:t>
+              <a:t>‹Nº›</a:t>
             </a:fld>
             <a:endParaRPr lang="en-US" dirty="0"/>
           </a:p>
@@ -2746,7 +3110,7 @@
             <a:fld id="{C764DE79-268F-4C1A-8933-263129D2AF90}" type="datetimeFigureOut">
               <a:rPr lang="en-US" dirty="0"/>
               <a:pPr/>
-              <a:t>27/11/15</a:t>
+              <a:t>12/7/2015</a:t>
             </a:fld>
             <a:endParaRPr lang="en-US" dirty="0"/>
           </a:p>
@@ -2789,7 +3153,7 @@
             <a:fld id="{48F63A3B-78C7-47BE-AE5E-E10140E04643}" type="slidenum">
               <a:rPr lang="en-US" dirty="0"/>
               <a:pPr/>
-              <a:t>‹Nr.›</a:t>
+              <a:t>‹Nº›</a:t>
             </a:fld>
             <a:endParaRPr lang="en-US" dirty="0"/>
           </a:p>
@@ -2856,7 +3220,7 @@
           <a:lstStyle/>
           <a:p>
             <a:r>
-              <a:rPr lang="es-ES" smtClean="0"/>
+              <a:rPr lang="es-ES" dirty="0" smtClean="0"/>
               <a:t>Haga clic para modificar el estilo de título del patrón</a:t>
             </a:r>
             <a:endParaRPr lang="en-US" dirty="0"/>
@@ -2961,7 +3325,7 @@
             <a:fld id="{C764DE79-268F-4C1A-8933-263129D2AF90}" type="datetimeFigureOut">
               <a:rPr lang="en-US" dirty="0"/>
               <a:pPr/>
-              <a:t>27/11/15</a:t>
+              <a:t>12/7/2015</a:t>
             </a:fld>
             <a:endParaRPr lang="en-US" dirty="0"/>
           </a:p>
@@ -3040,7 +3404,7 @@
             <a:fld id="{48F63A3B-78C7-47BE-AE5E-E10140E04643}" type="slidenum">
               <a:rPr lang="en-US" dirty="0"/>
               <a:pPr/>
-              <a:t>‹Nr.›</a:t>
+              <a:t>‹Nº›</a:t>
             </a:fld>
             <a:endParaRPr lang="en-US" dirty="0"/>
           </a:p>
@@ -3054,8 +3418,8 @@
         </p:nvSpPr>
         <p:spPr>
           <a:xfrm rot="16200000">
-            <a:off x="-1116861" y="2287760"/>
-            <a:ext cx="3121367" cy="276999"/>
+            <a:off x="-1159341" y="2287760"/>
+            <a:ext cx="3206327" cy="276999"/>
           </a:xfrm>
           <a:prstGeom prst="rect">
             <a:avLst/>
@@ -3079,7 +3443,19 @@
                 <a:latin typeface="Arial" panose="020B0604020202020204" pitchFamily="34" charset="0"/>
                 <a:cs typeface="Arial" panose="020B0604020202020204" pitchFamily="34" charset="0"/>
               </a:rPr>
-              <a:t>© Editorial Planeta Colombiana S.A., 2015.</a:t>
+              <a:t>© Editorial Planeta Colombiana S.A., </a:t>
+            </a:r>
+            <a:r>
+              <a:rPr lang="es-ES" sz="1200" dirty="0" smtClean="0">
+                <a:solidFill>
+                  <a:schemeClr val="bg2">
+                    <a:lumMod val="90000"/>
+                  </a:schemeClr>
+                </a:solidFill>
+                <a:latin typeface="Arial" panose="020B0604020202020204" pitchFamily="34" charset="0"/>
+                <a:cs typeface="Arial" panose="020B0604020202020204" pitchFamily="34" charset="0"/>
+              </a:rPr>
+              <a:t>2016.</a:t>
             </a:r>
             <a:endParaRPr lang="es-ES" sz="1200" dirty="0">
               <a:solidFill>
@@ -3154,6 +3530,13 @@
     <p:sldLayoutId id="2147483670" r:id="rId20"/>
     <p:sldLayoutId id="2147483671" r:id="rId21"/>
   </p:sldLayoutIdLst>
+  <p:timing>
+    <p:tnLst>
+      <p:par>
+        <p:cTn id="1" dur="indefinite" restart="never" nodeType="tmRoot"/>
+      </p:par>
+    </p:tnLst>
+  </p:timing>
   <p:txStyles>
     <p:titleStyle>
       <a:lvl1pPr algn="l" defTabSz="1079998" rtl="0" eaLnBrk="1" latinLnBrk="0" hangingPunct="1">
@@ -4019,19 +4402,19 @@
         <p:nvCxnSpPr>
           <p:cNvPr id="589" name="Conector angular 588"/>
           <p:cNvCxnSpPr>
-            <a:stCxn id="626" idx="2"/>
+            <a:stCxn id="594" idx="0"/>
             <a:endCxn id="588" idx="0"/>
           </p:cNvCxnSpPr>
           <p:nvPr/>
         </p:nvCxnSpPr>
         <p:spPr>
-          <a:xfrm rot="5400000">
-            <a:off x="5033007" y="2237184"/>
-            <a:ext cx="278741" cy="918060"/>
+          <a:xfrm rot="16200000" flipV="1">
+            <a:off x="5168601" y="2380331"/>
+            <a:ext cx="7552" cy="918060"/>
           </a:xfrm>
           <a:prstGeom prst="bentConnector3">
             <a:avLst>
-              <a:gd name="adj1" fmla="val 50000"/>
+              <a:gd name="adj1" fmla="val 1955270"/>
             </a:avLst>
           </a:prstGeom>
           <a:ln w="12700">
@@ -4064,7 +4447,7 @@
         <p:spPr>
           <a:xfrm>
             <a:off x="4292253" y="3428921"/>
-            <a:ext cx="842187" cy="546861"/>
+            <a:ext cx="868514" cy="622379"/>
           </a:xfrm>
           <a:prstGeom prst="rect">
             <a:avLst/>
@@ -4100,16 +4483,6 @@
           <a:p>
             <a:pPr algn="ctr"/>
             <a:r>
-              <a:rPr lang="es-ES" sz="900" dirty="0">
-                <a:solidFill>
-                  <a:schemeClr val="tx1"/>
-                </a:solidFill>
-                <a:latin typeface="Arial" panose="020B0604020202020204" pitchFamily="34" charset="0"/>
-                <a:cs typeface="Arial" panose="020B0604020202020204" pitchFamily="34" charset="0"/>
-              </a:rPr>
-              <a:t>n</a:t>
-            </a:r>
-            <a:r>
               <a:rPr lang="es-ES" sz="900" dirty="0" smtClean="0">
                 <a:solidFill>
                   <a:schemeClr val="tx1"/>
@@ -4117,7 +4490,7 @@
                 <a:latin typeface="Arial" panose="020B0604020202020204" pitchFamily="34" charset="0"/>
                 <a:cs typeface="Arial" panose="020B0604020202020204" pitchFamily="34" charset="0"/>
               </a:rPr>
-              <a:t>úmeros menores que 1</a:t>
+              <a:t>numerador menor que el denominador</a:t>
             </a:r>
             <a:endParaRPr lang="es-ES" sz="900" dirty="0">
               <a:solidFill>
@@ -4572,7 +4945,7 @@
           </a:xfrm>
           <a:prstGeom prst="bentConnector3">
             <a:avLst>
-              <a:gd name="adj1" fmla="val 50000"/>
+              <a:gd name="adj1" fmla="val 85530"/>
             </a:avLst>
           </a:prstGeom>
           <a:ln w="12700">
@@ -5505,56 +5878,13 @@
       </p:sp>
       <p:cxnSp>
         <p:nvCxnSpPr>
-          <p:cNvPr id="629" name="Conector angular 628"/>
-          <p:cNvCxnSpPr>
-            <a:stCxn id="626" idx="2"/>
-            <a:endCxn id="594" idx="0"/>
-          </p:cNvCxnSpPr>
+          <p:cNvPr id="630" name="Conector angular 629"/>
+          <p:cNvCxnSpPr/>
           <p:nvPr/>
         </p:nvCxnSpPr>
         <p:spPr>
-          <a:xfrm rot="5400000">
-            <a:off x="5488261" y="2699990"/>
-            <a:ext cx="286293" cy="12700"/>
-          </a:xfrm>
-          <a:prstGeom prst="bentConnector3">
-            <a:avLst>
-              <a:gd name="adj1" fmla="val 50000"/>
-            </a:avLst>
-          </a:prstGeom>
-          <a:ln w="12700">
-            <a:solidFill>
-              <a:schemeClr val="tx1"/>
-            </a:solidFill>
-          </a:ln>
-        </p:spPr>
-        <p:style>
-          <a:lnRef idx="1">
-            <a:schemeClr val="accent1"/>
-          </a:lnRef>
-          <a:fillRef idx="0">
-            <a:schemeClr val="accent1"/>
-          </a:fillRef>
-          <a:effectRef idx="0">
-            <a:schemeClr val="accent1"/>
-          </a:effectRef>
-          <a:fontRef idx="minor">
-            <a:schemeClr val="tx1"/>
-          </a:fontRef>
-        </p:style>
-      </p:cxnSp>
-      <p:cxnSp>
-        <p:nvCxnSpPr>
-          <p:cNvPr id="630" name="Conector angular 629"/>
-          <p:cNvCxnSpPr>
-            <a:stCxn id="626" idx="2"/>
-            <a:endCxn id="628" idx="0"/>
-          </p:cNvCxnSpPr>
-          <p:nvPr/>
-        </p:nvCxnSpPr>
-        <p:spPr>
           <a:xfrm rot="16200000" flipH="1">
-            <a:off x="5967027" y="2221224"/>
+            <a:off x="5969126" y="2215484"/>
             <a:ext cx="286292" cy="957532"/>
           </a:xfrm>
           <a:prstGeom prst="bentConnector3">
@@ -5670,7 +6000,7 @@
         <p:spPr>
           <a:xfrm>
             <a:off x="5210313" y="3428921"/>
-            <a:ext cx="842187" cy="546861"/>
+            <a:ext cx="890135" cy="622379"/>
           </a:xfrm>
           <a:prstGeom prst="rect">
             <a:avLst/>
@@ -5723,7 +6053,7 @@
                 <a:latin typeface="Arial" panose="020B0604020202020204" pitchFamily="34" charset="0"/>
                 <a:cs typeface="Arial" panose="020B0604020202020204" pitchFamily="34" charset="0"/>
               </a:rPr>
-              <a:t>úmeros mayores que 1</a:t>
+              <a:t>umerador mayor que el denominador</a:t>
             </a:r>
             <a:endParaRPr lang="es-ES" sz="900" dirty="0">
               <a:solidFill>
@@ -5744,7 +6074,7 @@
         <p:spPr>
           <a:xfrm>
             <a:off x="6133355" y="3434222"/>
-            <a:ext cx="842187" cy="546861"/>
+            <a:ext cx="869951" cy="617078"/>
           </a:xfrm>
           <a:prstGeom prst="rect">
             <a:avLst/>
@@ -5780,16 +6110,6 @@
           <a:p>
             <a:pPr algn="ctr"/>
             <a:r>
-              <a:rPr lang="es-ES" sz="900" dirty="0">
-                <a:solidFill>
-                  <a:schemeClr val="tx1"/>
-                </a:solidFill>
-                <a:latin typeface="Arial" panose="020B0604020202020204" pitchFamily="34" charset="0"/>
-                <a:cs typeface="Arial" panose="020B0604020202020204" pitchFamily="34" charset="0"/>
-              </a:rPr>
-              <a:t>n</a:t>
-            </a:r>
-            <a:r>
               <a:rPr lang="es-ES" sz="900" dirty="0" smtClean="0">
                 <a:solidFill>
                   <a:schemeClr val="tx1"/>
@@ -5797,7 +6117,7 @@
                 <a:latin typeface="Arial" panose="020B0604020202020204" pitchFamily="34" charset="0"/>
                 <a:cs typeface="Arial" panose="020B0604020202020204" pitchFamily="34" charset="0"/>
               </a:rPr>
-              <a:t>úmeros iguales a 1</a:t>
+              <a:t>numerador igual que el denominador</a:t>
             </a:r>
             <a:endParaRPr lang="es-ES" sz="900" dirty="0">
               <a:solidFill>
@@ -5817,7 +6137,7 @@
         </p:nvSpPr>
         <p:spPr>
           <a:xfrm>
-            <a:off x="5072819" y="4173986"/>
+            <a:off x="5072020" y="4297952"/>
             <a:ext cx="1117174" cy="230832"/>
           </a:xfrm>
           <a:prstGeom prst="rect">
@@ -5846,46 +6166,6 @@
           </a:p>
         </p:txBody>
       </p:sp>
-      <p:cxnSp>
-        <p:nvCxnSpPr>
-          <p:cNvPr id="654" name="Conector angular 653"/>
-          <p:cNvCxnSpPr>
-            <a:stCxn id="642" idx="2"/>
-            <a:endCxn id="652" idx="0"/>
-          </p:cNvCxnSpPr>
-          <p:nvPr/>
-        </p:nvCxnSpPr>
-        <p:spPr>
-          <a:xfrm rot="5400000">
-            <a:off x="5532305" y="4074884"/>
-            <a:ext cx="198204" cy="1"/>
-          </a:xfrm>
-          <a:prstGeom prst="bentConnector3">
-            <a:avLst>
-              <a:gd name="adj1" fmla="val 50000"/>
-            </a:avLst>
-          </a:prstGeom>
-          <a:ln w="12700">
-            <a:solidFill>
-              <a:schemeClr val="tx1"/>
-            </a:solidFill>
-          </a:ln>
-        </p:spPr>
-        <p:style>
-          <a:lnRef idx="1">
-            <a:schemeClr val="accent1"/>
-          </a:lnRef>
-          <a:fillRef idx="0">
-            <a:schemeClr val="accent1"/>
-          </a:fillRef>
-          <a:effectRef idx="0">
-            <a:schemeClr val="accent1"/>
-          </a:effectRef>
-          <a:fontRef idx="minor">
-            <a:schemeClr val="tx1"/>
-          </a:fontRef>
-        </p:style>
-      </p:cxnSp>
       <p:sp>
         <p:nvSpPr>
           <p:cNvPr id="664" name="Rectángulo 663" descr="Nodo de segundo nivel"/>
@@ -7334,16 +7614,6 @@
           <a:p>
             <a:pPr algn="ctr"/>
             <a:r>
-              <a:rPr lang="es-ES" sz="900" dirty="0">
-                <a:solidFill>
-                  <a:schemeClr val="tx1"/>
-                </a:solidFill>
-                <a:latin typeface="Arial" panose="020B0604020202020204" pitchFamily="34" charset="0"/>
-                <a:cs typeface="Arial" panose="020B0604020202020204" pitchFamily="34" charset="0"/>
-              </a:rPr>
-              <a:t>f</a:t>
-            </a:r>
-            <a:r>
               <a:rPr lang="es-ES" sz="900" dirty="0" smtClean="0">
                 <a:solidFill>
                   <a:schemeClr val="tx1"/>
@@ -7351,7 +7621,17 @@
                 <a:latin typeface="Arial" panose="020B0604020202020204" pitchFamily="34" charset="0"/>
                 <a:cs typeface="Arial" panose="020B0604020202020204" pitchFamily="34" charset="0"/>
               </a:rPr>
-              <a:t>racción irreducible</a:t>
+              <a:t>una fracción </a:t>
+            </a:r>
+            <a:r>
+              <a:rPr lang="es-ES" sz="900" dirty="0" smtClean="0">
+                <a:solidFill>
+                  <a:schemeClr val="tx1"/>
+                </a:solidFill>
+                <a:latin typeface="Arial" panose="020B0604020202020204" pitchFamily="34" charset="0"/>
+                <a:cs typeface="Arial" panose="020B0604020202020204" pitchFamily="34" charset="0"/>
+              </a:rPr>
+              <a:t>irreducible</a:t>
             </a:r>
             <a:endParaRPr lang="es-ES" sz="900" dirty="0">
               <a:solidFill>
@@ -7550,7 +7830,7 @@
         </p:nvSpPr>
         <p:spPr>
           <a:xfrm>
-            <a:off x="4790729" y="4610445"/>
+            <a:off x="4813590" y="4757433"/>
             <a:ext cx="1634035" cy="230832"/>
           </a:xfrm>
           <a:prstGeom prst="rect">
@@ -7586,41 +7866,6 @@
           </a:p>
         </p:txBody>
       </p:sp>
-      <p:cxnSp>
-        <p:nvCxnSpPr>
-          <p:cNvPr id="698" name="Conector recto 697"/>
-          <p:cNvCxnSpPr/>
-          <p:nvPr/>
-        </p:nvCxnSpPr>
-        <p:spPr>
-          <a:xfrm flipV="1">
-            <a:off x="5616212" y="4460131"/>
-            <a:ext cx="6728" cy="150313"/>
-          </a:xfrm>
-          <a:prstGeom prst="line">
-            <a:avLst/>
-          </a:prstGeom>
-          <a:ln w="12700">
-            <a:solidFill>
-              <a:schemeClr val="tx1"/>
-            </a:solidFill>
-          </a:ln>
-        </p:spPr>
-        <p:style>
-          <a:lnRef idx="1">
-            <a:schemeClr val="accent1"/>
-          </a:lnRef>
-          <a:fillRef idx="0">
-            <a:schemeClr val="accent1"/>
-          </a:fillRef>
-          <a:effectRef idx="0">
-            <a:schemeClr val="accent1"/>
-          </a:effectRef>
-          <a:fontRef idx="minor">
-            <a:schemeClr val="tx1"/>
-          </a:fontRef>
-        </p:style>
-      </p:cxnSp>
       <p:sp>
         <p:nvSpPr>
           <p:cNvPr id="699" name="Rectángulo 698" descr="Nodo de cuarto nivel&#10;"/>
@@ -7629,7 +7874,7 @@
         </p:nvSpPr>
         <p:spPr>
           <a:xfrm>
-            <a:off x="4991399" y="4963963"/>
+            <a:off x="5004357" y="5303556"/>
             <a:ext cx="1246151" cy="353519"/>
           </a:xfrm>
           <a:prstGeom prst="rect">
@@ -7703,9 +7948,9 @@
           <p:nvPr/>
         </p:nvCxnSpPr>
         <p:spPr>
-          <a:xfrm flipH="1" flipV="1">
-            <a:off x="5607747" y="4841277"/>
-            <a:ext cx="6728" cy="122686"/>
+          <a:xfrm flipV="1">
+            <a:off x="5627433" y="4988265"/>
+            <a:ext cx="3175" cy="315291"/>
           </a:xfrm>
           <a:prstGeom prst="line">
             <a:avLst/>
@@ -7739,7 +7984,7 @@
         </p:nvSpPr>
         <p:spPr>
           <a:xfrm>
-            <a:off x="4997749" y="5496526"/>
+            <a:off x="5000515" y="5954136"/>
             <a:ext cx="1246151" cy="711029"/>
           </a:xfrm>
           <a:prstGeom prst="rect">
@@ -7813,9 +8058,9 @@
           <p:nvPr/>
         </p:nvCxnSpPr>
         <p:spPr>
-          <a:xfrm flipH="1" flipV="1">
-            <a:off x="5614475" y="5317482"/>
-            <a:ext cx="6350" cy="179044"/>
+          <a:xfrm flipV="1">
+            <a:off x="5623591" y="5657075"/>
+            <a:ext cx="3842" cy="297061"/>
           </a:xfrm>
           <a:prstGeom prst="line">
             <a:avLst/>
@@ -8263,6 +8508,76 @@
             <a:avLst>
               <a:gd name="adj1" fmla="val 50000"/>
             </a:avLst>
+          </a:prstGeom>
+          <a:ln w="12700">
+            <a:solidFill>
+              <a:schemeClr val="tx1"/>
+            </a:solidFill>
+          </a:ln>
+        </p:spPr>
+        <p:style>
+          <a:lnRef idx="1">
+            <a:schemeClr val="accent1"/>
+          </a:lnRef>
+          <a:fillRef idx="0">
+            <a:schemeClr val="accent1"/>
+          </a:fillRef>
+          <a:effectRef idx="0">
+            <a:schemeClr val="accent1"/>
+          </a:effectRef>
+          <a:fontRef idx="minor">
+            <a:schemeClr val="tx1"/>
+          </a:fontRef>
+        </p:style>
+      </p:cxnSp>
+      <p:cxnSp>
+        <p:nvCxnSpPr>
+          <p:cNvPr id="115" name="Conector recto 114"/>
+          <p:cNvCxnSpPr/>
+          <p:nvPr/>
+        </p:nvCxnSpPr>
+        <p:spPr>
+          <a:xfrm flipV="1">
+            <a:off x="5633916" y="4514598"/>
+            <a:ext cx="3842" cy="297061"/>
+          </a:xfrm>
+          <a:prstGeom prst="line">
+            <a:avLst/>
+          </a:prstGeom>
+          <a:ln w="12700">
+            <a:solidFill>
+              <a:schemeClr val="tx1"/>
+            </a:solidFill>
+          </a:ln>
+        </p:spPr>
+        <p:style>
+          <a:lnRef idx="1">
+            <a:schemeClr val="accent1"/>
+          </a:lnRef>
+          <a:fillRef idx="0">
+            <a:schemeClr val="accent1"/>
+          </a:fillRef>
+          <a:effectRef idx="0">
+            <a:schemeClr val="accent1"/>
+          </a:effectRef>
+          <a:fontRef idx="minor">
+            <a:schemeClr val="tx1"/>
+          </a:fontRef>
+        </p:style>
+      </p:cxnSp>
+      <p:cxnSp>
+        <p:nvCxnSpPr>
+          <p:cNvPr id="116" name="Conector recto 115"/>
+          <p:cNvCxnSpPr/>
+          <p:nvPr/>
+        </p:nvCxnSpPr>
+        <p:spPr>
+          <a:xfrm flipV="1">
+            <a:off x="5623457" y="4046536"/>
+            <a:ext cx="3842" cy="297061"/>
+          </a:xfrm>
+          <a:prstGeom prst="line">
+            <a:avLst/>
           </a:prstGeom>
           <a:ln w="12700">
             <a:solidFill>
@@ -8298,7 +8613,7 @@
   <p:timing>
     <p:tnLst>
       <p:par>
-        <p:cTn xmlns:p14="http://schemas.microsoft.com/office/powerpoint/2010/main" id="1" dur="indefinite" restart="never" nodeType="tmRoot"/>
+        <p:cTn id="1" dur="indefinite" restart="never" nodeType="tmRoot"/>
       </p:par>
     </p:tnLst>
   </p:timing>
@@ -8560,7 +8875,268 @@
   <a:extraClrSchemeLst/>
   <a:extLst>
     <a:ext uri="{05A4C25C-085E-4340-85A3-A5531E510DB2}">
-      <thm15:themeFamily xmlns="" xmlns:thm15="http://schemas.microsoft.com/office/thememl/2012/main" name="Office Theme" id="{62F939B6-93AF-4DB8-9C6B-D6C7DFDC589F}" vid="{4A3C46E8-61CC-4603-A589-7422A47A8E4A}"/>
+      <thm15:themeFamily xmlns:thm15="http://schemas.microsoft.com/office/thememl/2012/main" name="Office Theme" id="{62F939B6-93AF-4DB8-9C6B-D6C7DFDC589F}" vid="{4A3C46E8-61CC-4603-A589-7422A47A8E4A}"/>
+    </a:ext>
+  </a:extLst>
+</a:theme>
+</file>
+
+<file path=ppt/theme/theme2.xml><?xml version="1.0" encoding="utf-8"?>
+<a:theme xmlns:a="http://schemas.openxmlformats.org/drawingml/2006/main" name="Tema de Office">
+  <a:themeElements>
+    <a:clrScheme name="Office">
+      <a:dk1>
+        <a:sysClr val="windowText" lastClr="000000"/>
+      </a:dk1>
+      <a:lt1>
+        <a:sysClr val="window" lastClr="FFFFFF"/>
+      </a:lt1>
+      <a:dk2>
+        <a:srgbClr val="44546A"/>
+      </a:dk2>
+      <a:lt2>
+        <a:srgbClr val="E7E6E6"/>
+      </a:lt2>
+      <a:accent1>
+        <a:srgbClr val="5B9BD5"/>
+      </a:accent1>
+      <a:accent2>
+        <a:srgbClr val="ED7D31"/>
+      </a:accent2>
+      <a:accent3>
+        <a:srgbClr val="A5A5A5"/>
+      </a:accent3>
+      <a:accent4>
+        <a:srgbClr val="FFC000"/>
+      </a:accent4>
+      <a:accent5>
+        <a:srgbClr val="4472C4"/>
+      </a:accent5>
+      <a:accent6>
+        <a:srgbClr val="70AD47"/>
+      </a:accent6>
+      <a:hlink>
+        <a:srgbClr val="0563C1"/>
+      </a:hlink>
+      <a:folHlink>
+        <a:srgbClr val="954F72"/>
+      </a:folHlink>
+    </a:clrScheme>
+    <a:fontScheme name="Office">
+      <a:majorFont>
+        <a:latin typeface="Calibri Light" panose="020F0302020204030204"/>
+        <a:ea typeface=""/>
+        <a:cs typeface=""/>
+        <a:font script="Jpan" typeface="ＭＳ Ｐゴシック"/>
+        <a:font script="Hang" typeface="맑은 고딕"/>
+        <a:font script="Hans" typeface="宋体"/>
+        <a:font script="Hant" typeface="新細明體"/>
+        <a:font script="Arab" typeface="Times New Roman"/>
+        <a:font script="Hebr" typeface="Times New Roman"/>
+        <a:font script="Thai" typeface="Angsana New"/>
+        <a:font script="Ethi" typeface="Nyala"/>
+        <a:font script="Beng" typeface="Vrinda"/>
+        <a:font script="Gujr" typeface="Shruti"/>
+        <a:font script="Khmr" typeface="MoolBoran"/>
+        <a:font script="Knda" typeface="Tunga"/>
+        <a:font script="Guru" typeface="Raavi"/>
+        <a:font script="Cans" typeface="Euphemia"/>
+        <a:font script="Cher" typeface="Plantagenet Cherokee"/>
+        <a:font script="Yiii" typeface="Microsoft Yi Baiti"/>
+        <a:font script="Tibt" typeface="Microsoft Himalaya"/>
+        <a:font script="Thaa" typeface="MV Boli"/>
+        <a:font script="Deva" typeface="Mangal"/>
+        <a:font script="Telu" typeface="Gautami"/>
+        <a:font script="Taml" typeface="Latha"/>
+        <a:font script="Syrc" typeface="Estrangelo Edessa"/>
+        <a:font script="Orya" typeface="Kalinga"/>
+        <a:font script="Mlym" typeface="Kartika"/>
+        <a:font script="Laoo" typeface="DokChampa"/>
+        <a:font script="Sinh" typeface="Iskoola Pota"/>
+        <a:font script="Mong" typeface="Mongolian Baiti"/>
+        <a:font script="Viet" typeface="Times New Roman"/>
+        <a:font script="Uigh" typeface="Microsoft Uighur"/>
+        <a:font script="Geor" typeface="Sylfaen"/>
+      </a:majorFont>
+      <a:minorFont>
+        <a:latin typeface="Calibri" panose="020F0502020204030204"/>
+        <a:ea typeface=""/>
+        <a:cs typeface=""/>
+        <a:font script="Jpan" typeface="ＭＳ Ｐゴシック"/>
+        <a:font script="Hang" typeface="맑은 고딕"/>
+        <a:font script="Hans" typeface="宋体"/>
+        <a:font script="Hant" typeface="新細明體"/>
+        <a:font script="Arab" typeface="Arial"/>
+        <a:font script="Hebr" typeface="Arial"/>
+        <a:font script="Thai" typeface="Cordia New"/>
+        <a:font script="Ethi" typeface="Nyala"/>
+        <a:font script="Beng" typeface="Vrinda"/>
+        <a:font script="Gujr" typeface="Shruti"/>
+        <a:font script="Khmr" typeface="DaunPenh"/>
+        <a:font script="Knda" typeface="Tunga"/>
+        <a:font script="Guru" typeface="Raavi"/>
+        <a:font script="Cans" typeface="Euphemia"/>
+        <a:font script="Cher" typeface="Plantagenet Cherokee"/>
+        <a:font script="Yiii" typeface="Microsoft Yi Baiti"/>
+        <a:font script="Tibt" typeface="Microsoft Himalaya"/>
+        <a:font script="Thaa" typeface="MV Boli"/>
+        <a:font script="Deva" typeface="Mangal"/>
+        <a:font script="Telu" typeface="Gautami"/>
+        <a:font script="Taml" typeface="Latha"/>
+        <a:font script="Syrc" typeface="Estrangelo Edessa"/>
+        <a:font script="Orya" typeface="Kalinga"/>
+        <a:font script="Mlym" typeface="Kartika"/>
+        <a:font script="Laoo" typeface="DokChampa"/>
+        <a:font script="Sinh" typeface="Iskoola Pota"/>
+        <a:font script="Mong" typeface="Mongolian Baiti"/>
+        <a:font script="Viet" typeface="Arial"/>
+        <a:font script="Uigh" typeface="Microsoft Uighur"/>
+        <a:font script="Geor" typeface="Sylfaen"/>
+      </a:minorFont>
+    </a:fontScheme>
+    <a:fmtScheme name="Office">
+      <a:fillStyleLst>
+        <a:solidFill>
+          <a:schemeClr val="phClr"/>
+        </a:solidFill>
+        <a:gradFill rotWithShape="1">
+          <a:gsLst>
+            <a:gs pos="0">
+              <a:schemeClr val="phClr">
+                <a:lumMod val="110000"/>
+                <a:satMod val="105000"/>
+                <a:tint val="67000"/>
+              </a:schemeClr>
+            </a:gs>
+            <a:gs pos="50000">
+              <a:schemeClr val="phClr">
+                <a:lumMod val="105000"/>
+                <a:satMod val="103000"/>
+                <a:tint val="73000"/>
+              </a:schemeClr>
+            </a:gs>
+            <a:gs pos="100000">
+              <a:schemeClr val="phClr">
+                <a:lumMod val="105000"/>
+                <a:satMod val="109000"/>
+                <a:tint val="81000"/>
+              </a:schemeClr>
+            </a:gs>
+          </a:gsLst>
+          <a:lin ang="5400000" scaled="0"/>
+        </a:gradFill>
+        <a:gradFill rotWithShape="1">
+          <a:gsLst>
+            <a:gs pos="0">
+              <a:schemeClr val="phClr">
+                <a:satMod val="103000"/>
+                <a:lumMod val="102000"/>
+                <a:tint val="94000"/>
+              </a:schemeClr>
+            </a:gs>
+            <a:gs pos="50000">
+              <a:schemeClr val="phClr">
+                <a:satMod val="110000"/>
+                <a:lumMod val="100000"/>
+                <a:shade val="100000"/>
+              </a:schemeClr>
+            </a:gs>
+            <a:gs pos="100000">
+              <a:schemeClr val="phClr">
+                <a:lumMod val="99000"/>
+                <a:satMod val="120000"/>
+                <a:shade val="78000"/>
+              </a:schemeClr>
+            </a:gs>
+          </a:gsLst>
+          <a:lin ang="5400000" scaled="0"/>
+        </a:gradFill>
+      </a:fillStyleLst>
+      <a:lnStyleLst>
+        <a:ln w="6350" cap="flat" cmpd="sng" algn="ctr">
+          <a:solidFill>
+            <a:schemeClr val="phClr"/>
+          </a:solidFill>
+          <a:prstDash val="solid"/>
+          <a:miter lim="800000"/>
+        </a:ln>
+        <a:ln w="12700" cap="flat" cmpd="sng" algn="ctr">
+          <a:solidFill>
+            <a:schemeClr val="phClr"/>
+          </a:solidFill>
+          <a:prstDash val="solid"/>
+          <a:miter lim="800000"/>
+        </a:ln>
+        <a:ln w="19050" cap="flat" cmpd="sng" algn="ctr">
+          <a:solidFill>
+            <a:schemeClr val="phClr"/>
+          </a:solidFill>
+          <a:prstDash val="solid"/>
+          <a:miter lim="800000"/>
+        </a:ln>
+      </a:lnStyleLst>
+      <a:effectStyleLst>
+        <a:effectStyle>
+          <a:effectLst/>
+        </a:effectStyle>
+        <a:effectStyle>
+          <a:effectLst/>
+        </a:effectStyle>
+        <a:effectStyle>
+          <a:effectLst>
+            <a:outerShdw blurRad="57150" dist="19050" dir="5400000" algn="ctr" rotWithShape="0">
+              <a:srgbClr val="000000">
+                <a:alpha val="63000"/>
+              </a:srgbClr>
+            </a:outerShdw>
+          </a:effectLst>
+        </a:effectStyle>
+      </a:effectStyleLst>
+      <a:bgFillStyleLst>
+        <a:solidFill>
+          <a:schemeClr val="phClr"/>
+        </a:solidFill>
+        <a:solidFill>
+          <a:schemeClr val="phClr">
+            <a:tint val="95000"/>
+            <a:satMod val="170000"/>
+          </a:schemeClr>
+        </a:solidFill>
+        <a:gradFill rotWithShape="1">
+          <a:gsLst>
+            <a:gs pos="0">
+              <a:schemeClr val="phClr">
+                <a:tint val="93000"/>
+                <a:satMod val="150000"/>
+                <a:shade val="98000"/>
+                <a:lumMod val="102000"/>
+              </a:schemeClr>
+            </a:gs>
+            <a:gs pos="50000">
+              <a:schemeClr val="phClr">
+                <a:tint val="98000"/>
+                <a:satMod val="130000"/>
+                <a:shade val="90000"/>
+                <a:lumMod val="103000"/>
+              </a:schemeClr>
+            </a:gs>
+            <a:gs pos="100000">
+              <a:schemeClr val="phClr">
+                <a:shade val="63000"/>
+                <a:satMod val="120000"/>
+              </a:schemeClr>
+            </a:gs>
+          </a:gsLst>
+          <a:lin ang="5400000" scaled="0"/>
+        </a:gradFill>
+      </a:bgFillStyleLst>
+    </a:fmtScheme>
+  </a:themeElements>
+  <a:objectDefaults/>
+  <a:extraClrSchemeLst/>
+  <a:extLst>
+    <a:ext uri="{05A4C25C-085E-4340-85A3-A5531E510DB2}">
+      <thm15:themeFamily xmlns:thm15="http://schemas.microsoft.com/office/thememl/2012/main" name="Office Theme" id="{62F939B6-93AF-4DB8-9C6B-D6C7DFDC589F}" vid="{4A3C46E8-61CC-4603-A589-7422A47A8E4A}"/>
     </a:ext>
   </a:extLst>
 </a:theme>

</xml_diff>